<commit_message>
Présentation première mise en commun
</commit_message>
<xml_diff>
--- a/Présentation Éthique.pptx
+++ b/Présentation Éthique.pptx
@@ -5,18 +5,22 @@
     <p:sldMasterId id="2147483884" r:id="rId1"/>
   </p:sldMasterIdLst>
   <p:notesMasterIdLst>
-    <p:notesMasterId r:id="rId11"/>
+    <p:notesMasterId r:id="rId15"/>
   </p:notesMasterIdLst>
   <p:sldIdLst>
     <p:sldId id="273" r:id="rId2"/>
-    <p:sldId id="268" r:id="rId3"/>
-    <p:sldId id="292" r:id="rId4"/>
-    <p:sldId id="297" r:id="rId5"/>
-    <p:sldId id="298" r:id="rId6"/>
-    <p:sldId id="299" r:id="rId7"/>
-    <p:sldId id="300" r:id="rId8"/>
-    <p:sldId id="301" r:id="rId9"/>
-    <p:sldId id="296" r:id="rId10"/>
+    <p:sldId id="302" r:id="rId3"/>
+    <p:sldId id="303" r:id="rId4"/>
+    <p:sldId id="256" r:id="rId5"/>
+    <p:sldId id="257" r:id="rId6"/>
+    <p:sldId id="268" r:id="rId7"/>
+    <p:sldId id="292" r:id="rId8"/>
+    <p:sldId id="297" r:id="rId9"/>
+    <p:sldId id="298" r:id="rId10"/>
+    <p:sldId id="299" r:id="rId11"/>
+    <p:sldId id="300" r:id="rId12"/>
+    <p:sldId id="301" r:id="rId13"/>
+    <p:sldId id="296" r:id="rId14"/>
   </p:sldIdLst>
   <p:sldSz cx="12192000" cy="6858000"/>
   <p:notesSz cx="6858000" cy="9144000"/>
@@ -3238,8 +3242,8 @@
       </dsp:nvSpPr>
       <dsp:spPr>
         <a:xfrm>
-          <a:off x="21613" y="619"/>
-          <a:ext cx="1665000" cy="408802"/>
+          <a:off x="415363" y="619"/>
+          <a:ext cx="877500" cy="408802"/>
         </a:xfrm>
         <a:prstGeom prst="rect">
           <a:avLst/>
@@ -3308,8 +3312,8 @@
         </a:p>
       </dsp:txBody>
       <dsp:txXfrm>
-        <a:off x="21613" y="619"/>
-        <a:ext cx="1665000" cy="408802"/>
+        <a:off x="415363" y="619"/>
+        <a:ext cx="877500" cy="408802"/>
       </dsp:txXfrm>
     </dsp:sp>
     <dsp:sp modelId="{38778E45-4043-480B-8396-486A342B2C32}">
@@ -3319,8 +3323,8 @@
       </dsp:nvSpPr>
       <dsp:spPr>
         <a:xfrm>
-          <a:off x="381613" y="429861"/>
-          <a:ext cx="945000" cy="408802"/>
+          <a:off x="494113" y="429861"/>
+          <a:ext cx="720000" cy="408802"/>
         </a:xfrm>
         <a:prstGeom prst="rect">
           <a:avLst/>
@@ -3389,8 +3393,8 @@
         </a:p>
       </dsp:txBody>
       <dsp:txXfrm>
-        <a:off x="381613" y="429861"/>
-        <a:ext cx="945000" cy="408802"/>
+        <a:off x="494113" y="429861"/>
+        <a:ext cx="720000" cy="408802"/>
       </dsp:txXfrm>
     </dsp:sp>
     <dsp:sp modelId="{E858CC1B-228A-4E37-9049-03FF4CF8C9CB}">
@@ -3489,8 +3493,8 @@
       </dsp:nvSpPr>
       <dsp:spPr>
         <a:xfrm>
-          <a:off x="24877" y="656"/>
-          <a:ext cx="1890000" cy="287030"/>
+          <a:off x="47377" y="656"/>
+          <a:ext cx="1845000" cy="287030"/>
         </a:xfrm>
         <a:prstGeom prst="rect">
           <a:avLst/>
@@ -3559,8 +3563,8 @@
         </a:p>
       </dsp:txBody>
       <dsp:txXfrm>
-        <a:off x="24877" y="656"/>
-        <a:ext cx="1890000" cy="287030"/>
+        <a:off x="47377" y="656"/>
+        <a:ext cx="1845000" cy="287030"/>
       </dsp:txXfrm>
     </dsp:sp>
     <dsp:sp modelId="{909366D7-812F-439F-AF80-B3B98B0A6628}">
@@ -3570,8 +3574,8 @@
       </dsp:nvSpPr>
       <dsp:spPr>
         <a:xfrm>
-          <a:off x="441127" y="302037"/>
-          <a:ext cx="1057500" cy="287030"/>
+          <a:off x="429877" y="302037"/>
+          <a:ext cx="1080000" cy="287030"/>
         </a:xfrm>
         <a:prstGeom prst="rect">
           <a:avLst/>
@@ -3636,8 +3640,8 @@
         </a:p>
       </dsp:txBody>
       <dsp:txXfrm>
-        <a:off x="441127" y="302037"/>
-        <a:ext cx="1057500" cy="287030"/>
+        <a:off x="429877" y="302037"/>
+        <a:ext cx="1080000" cy="287030"/>
       </dsp:txXfrm>
     </dsp:sp>
     <dsp:sp modelId="{38778E45-4043-480B-8396-486A342B2C32}">
@@ -3801,8 +3805,8 @@
       </dsp:nvSpPr>
       <dsp:spPr>
         <a:xfrm>
-          <a:off x="339877" y="1206182"/>
-          <a:ext cx="1260000" cy="287030"/>
+          <a:off x="328627" y="1206182"/>
+          <a:ext cx="1282500" cy="287030"/>
         </a:xfrm>
         <a:prstGeom prst="rect">
           <a:avLst/>
@@ -3871,8 +3875,8 @@
         </a:p>
       </dsp:txBody>
       <dsp:txXfrm>
-        <a:off x="339877" y="1206182"/>
-        <a:ext cx="1260000" cy="287030"/>
+        <a:off x="328627" y="1206182"/>
+        <a:ext cx="1282500" cy="287030"/>
       </dsp:txXfrm>
     </dsp:sp>
   </dsp:spTree>
@@ -7970,7 +7974,7 @@
           <a:p>
             <a:fld id="{1E0AA58F-6E0A-4091-9E6B-3FF929A5CB43}" type="slidenum">
               <a:rPr lang="fr-CA" smtClean="0"/>
-              <a:t>‹#›</a:t>
+              <a:t>‹N°›</a:t>
             </a:fld>
             <a:endParaRPr lang="fr-CA"/>
           </a:p>
@@ -8267,7 +8271,7 @@
           <a:p>
             <a:fld id="{4324957A-28ED-4564-B596-BA8A4FF6B8FE}" type="datetime1">
               <a:rPr lang="en-CA" smtClean="0"/>
-              <a:t>16/12/2018</a:t>
+              <a:t>2018-12-16</a:t>
             </a:fld>
             <a:endParaRPr lang="en-CA"/>
           </a:p>
@@ -8399,7 +8403,7 @@
           <a:p>
             <a:fld id="{2849D840-EB1A-4BD0-9BBF-65787F9A4F51}" type="slidenum">
               <a:rPr lang="en-CA" smtClean="0"/>
-              <a:t>‹#›</a:t>
+              <a:t>‹N°›</a:t>
             </a:fld>
             <a:endParaRPr lang="en-CA"/>
           </a:p>
@@ -8620,7 +8624,7 @@
           <a:p>
             <a:fld id="{4DDA0149-C9AC-4CA4-985F-4DBE67ED4DBF}" type="datetime1">
               <a:rPr lang="en-CA" smtClean="0"/>
-              <a:t>16/12/2018</a:t>
+              <a:t>2018-12-16</a:t>
             </a:fld>
             <a:endParaRPr lang="en-CA"/>
           </a:p>
@@ -8752,7 +8756,7 @@
           <a:p>
             <a:fld id="{2849D840-EB1A-4BD0-9BBF-65787F9A4F51}" type="slidenum">
               <a:rPr lang="en-CA" smtClean="0"/>
-              <a:t>‹#›</a:t>
+              <a:t>‹N°›</a:t>
             </a:fld>
             <a:endParaRPr lang="en-CA"/>
           </a:p>
@@ -8961,7 +8965,7 @@
           <a:p>
             <a:fld id="{0401FC47-7360-4BA8-8822-14EF1ED17328}" type="datetime1">
               <a:rPr lang="en-CA" smtClean="0"/>
-              <a:t>16/12/2018</a:t>
+              <a:t>2018-12-16</a:t>
             </a:fld>
             <a:endParaRPr lang="en-CA"/>
           </a:p>
@@ -9093,7 +9097,7 @@
           <a:p>
             <a:fld id="{2849D840-EB1A-4BD0-9BBF-65787F9A4F51}" type="slidenum">
               <a:rPr lang="en-CA" smtClean="0"/>
-              <a:t>‹#›</a:t>
+              <a:t>‹N°›</a:t>
             </a:fld>
             <a:endParaRPr lang="en-CA"/>
           </a:p>
@@ -9365,7 +9369,7 @@
           <a:p>
             <a:fld id="{9D1EF933-CDFB-4272-9A3C-ABA1865F4583}" type="datetime1">
               <a:rPr lang="en-CA" smtClean="0"/>
-              <a:t>16/12/2018</a:t>
+              <a:t>2018-12-16</a:t>
             </a:fld>
             <a:endParaRPr lang="en-CA"/>
           </a:p>
@@ -9497,7 +9501,7 @@
           <a:p>
             <a:fld id="{2849D840-EB1A-4BD0-9BBF-65787F9A4F51}" type="slidenum">
               <a:rPr lang="en-CA" smtClean="0"/>
-              <a:t>‹#›</a:t>
+              <a:t>‹N°›</a:t>
             </a:fld>
             <a:endParaRPr lang="en-CA"/>
           </a:p>
@@ -9704,7 +9708,7 @@
           <a:p>
             <a:fld id="{A1D1E3BD-09E5-44BD-9E2A-F6D74FEA526F}" type="datetime1">
               <a:rPr lang="en-CA" smtClean="0"/>
-              <a:t>16/12/2018</a:t>
+              <a:t>2018-12-16</a:t>
             </a:fld>
             <a:endParaRPr lang="en-CA"/>
           </a:p>
@@ -9836,7 +9840,7 @@
           <a:p>
             <a:fld id="{2849D840-EB1A-4BD0-9BBF-65787F9A4F51}" type="slidenum">
               <a:rPr lang="en-CA" smtClean="0"/>
-              <a:t>‹#›</a:t>
+              <a:t>‹N°›</a:t>
             </a:fld>
             <a:endParaRPr lang="en-CA"/>
           </a:p>
@@ -10027,7 +10031,7 @@
           <a:p>
             <a:fld id="{ED24EA8A-7EF0-4288-9CB8-92B6515CC3DF}" type="datetime1">
               <a:rPr lang="en-CA" smtClean="0"/>
-              <a:t>16/12/2018</a:t>
+              <a:t>2018-12-16</a:t>
             </a:fld>
             <a:endParaRPr lang="en-CA"/>
           </a:p>
@@ -10159,7 +10163,7 @@
           <a:p>
             <a:fld id="{2849D840-EB1A-4BD0-9BBF-65787F9A4F51}" type="slidenum">
               <a:rPr lang="en-CA" smtClean="0"/>
-              <a:t>‹#›</a:t>
+              <a:t>‹N°›</a:t>
             </a:fld>
             <a:endParaRPr lang="en-CA"/>
           </a:p>
@@ -10426,7 +10430,7 @@
           <a:p>
             <a:fld id="{8AD25BF8-1BE2-48C1-82FF-BE6F11008824}" type="datetime1">
               <a:rPr lang="en-CA" smtClean="0"/>
-              <a:t>16/12/2018</a:t>
+              <a:t>2018-12-16</a:t>
             </a:fld>
             <a:endParaRPr lang="en-CA"/>
           </a:p>
@@ -10558,7 +10562,7 @@
           <a:p>
             <a:fld id="{2849D840-EB1A-4BD0-9BBF-65787F9A4F51}" type="slidenum">
               <a:rPr lang="en-CA" smtClean="0"/>
-              <a:t>‹#›</a:t>
+              <a:t>‹N°›</a:t>
             </a:fld>
             <a:endParaRPr lang="en-CA"/>
           </a:p>
@@ -10686,7 +10690,7 @@
           <a:p>
             <a:fld id="{6738CD10-FBE3-41CC-A47A-2D28D65C7B52}" type="datetime1">
               <a:rPr lang="en-CA" smtClean="0"/>
-              <a:t>16/12/2018</a:t>
+              <a:t>2018-12-16</a:t>
             </a:fld>
             <a:endParaRPr lang="en-CA"/>
           </a:p>
@@ -10813,7 +10817,7 @@
           <a:p>
             <a:fld id="{2849D840-EB1A-4BD0-9BBF-65787F9A4F51}" type="slidenum">
               <a:rPr lang="en-CA" smtClean="0"/>
-              <a:t>‹#›</a:t>
+              <a:t>‹N°›</a:t>
             </a:fld>
             <a:endParaRPr lang="en-CA"/>
           </a:p>
@@ -10951,7 +10955,7 @@
           <a:p>
             <a:fld id="{36151A7A-D331-4745-BBBE-7338ED061D44}" type="datetime1">
               <a:rPr lang="en-CA" smtClean="0"/>
-              <a:t>16/12/2018</a:t>
+              <a:t>2018-12-16</a:t>
             </a:fld>
             <a:endParaRPr lang="en-CA"/>
           </a:p>
@@ -11078,7 +11082,7 @@
           <a:p>
             <a:fld id="{2849D840-EB1A-4BD0-9BBF-65787F9A4F51}" type="slidenum">
               <a:rPr lang="en-CA" smtClean="0"/>
-              <a:t>‹#›</a:t>
+              <a:t>‹N°›</a:t>
             </a:fld>
             <a:endParaRPr lang="en-CA"/>
           </a:p>
@@ -11216,7 +11220,7 @@
           <a:p>
             <a:fld id="{1B9E97EC-8CCA-4B54-B971-F4E568F8A585}" type="datetime1">
               <a:rPr lang="en-CA" smtClean="0"/>
-              <a:t>16/12/2018</a:t>
+              <a:t>2018-12-16</a:t>
             </a:fld>
             <a:endParaRPr lang="en-CA"/>
           </a:p>
@@ -11343,7 +11347,7 @@
           <a:p>
             <a:fld id="{2849D840-EB1A-4BD0-9BBF-65787F9A4F51}" type="slidenum">
               <a:rPr lang="en-CA" smtClean="0"/>
-              <a:t>‹#›</a:t>
+              <a:t>‹N°›</a:t>
             </a:fld>
             <a:endParaRPr lang="en-CA"/>
           </a:p>
@@ -11517,7 +11521,7 @@
           <a:p>
             <a:fld id="{1B9E97EC-8CCA-4B54-B971-F4E568F8A585}" type="datetime1">
               <a:rPr lang="en-CA" smtClean="0"/>
-              <a:t>16/12/2018</a:t>
+              <a:t>2018-12-16</a:t>
             </a:fld>
             <a:endParaRPr lang="en-CA"/>
           </a:p>
@@ -11644,7 +11648,7 @@
           <a:p>
             <a:fld id="{2849D840-EB1A-4BD0-9BBF-65787F9A4F51}" type="slidenum">
               <a:rPr lang="en-CA" smtClean="0"/>
-              <a:t>‹#›</a:t>
+              <a:t>‹N°›</a:t>
             </a:fld>
             <a:endParaRPr lang="en-CA"/>
           </a:p>
@@ -11849,7 +11853,7 @@
           <a:p>
             <a:fld id="{15FDE6EE-5B80-4906-9FC0-5C68C122FCDC}" type="datetime1">
               <a:rPr lang="en-CA" smtClean="0"/>
-              <a:t>16/12/2018</a:t>
+              <a:t>2018-12-16</a:t>
             </a:fld>
             <a:endParaRPr lang="en-CA"/>
           </a:p>
@@ -11981,7 +11985,7 @@
           <a:p>
             <a:fld id="{2849D840-EB1A-4BD0-9BBF-65787F9A4F51}" type="slidenum">
               <a:rPr lang="en-CA" smtClean="0"/>
-              <a:t>‹#›</a:t>
+              <a:t>‹N°›</a:t>
             </a:fld>
             <a:endParaRPr lang="en-CA"/>
           </a:p>
@@ -12175,7 +12179,7 @@
           <a:p>
             <a:fld id="{CF5F4A69-FE9D-41FE-B8E0-D8BF733307A6}" type="datetime1">
               <a:rPr lang="en-CA" smtClean="0"/>
-              <a:t>16/12/2018</a:t>
+              <a:t>2018-12-16</a:t>
             </a:fld>
             <a:endParaRPr lang="en-CA"/>
           </a:p>
@@ -12307,7 +12311,7 @@
           <a:p>
             <a:fld id="{2849D840-EB1A-4BD0-9BBF-65787F9A4F51}" type="slidenum">
               <a:rPr lang="en-CA" smtClean="0"/>
-              <a:t>‹#›</a:t>
+              <a:t>‹N°›</a:t>
             </a:fld>
             <a:endParaRPr lang="en-CA"/>
           </a:p>
@@ -12640,7 +12644,7 @@
           <a:p>
             <a:fld id="{DBF39172-660D-4001-90ED-5531C0910D5E}" type="datetime1">
               <a:rPr lang="en-CA" smtClean="0"/>
-              <a:t>16/12/2018</a:t>
+              <a:t>2018-12-16</a:t>
             </a:fld>
             <a:endParaRPr lang="en-CA"/>
           </a:p>
@@ -12772,7 +12776,7 @@
           <a:p>
             <a:fld id="{2849D840-EB1A-4BD0-9BBF-65787F9A4F51}" type="slidenum">
               <a:rPr lang="en-CA" smtClean="0"/>
-              <a:t>‹#›</a:t>
+              <a:t>‹N°›</a:t>
             </a:fld>
             <a:endParaRPr lang="en-CA"/>
           </a:p>
@@ -12853,7 +12857,7 @@
           <a:p>
             <a:fld id="{156135FA-2BA0-40BA-B84D-C4BDA4C23F2C}" type="datetime1">
               <a:rPr lang="en-CA" smtClean="0"/>
-              <a:t>16/12/2018</a:t>
+              <a:t>2018-12-16</a:t>
             </a:fld>
             <a:endParaRPr lang="en-CA"/>
           </a:p>
@@ -12980,7 +12984,7 @@
           <a:p>
             <a:fld id="{2849D840-EB1A-4BD0-9BBF-65787F9A4F51}" type="slidenum">
               <a:rPr lang="en-CA" smtClean="0"/>
-              <a:t>‹#›</a:t>
+              <a:t>‹N°›</a:t>
             </a:fld>
             <a:endParaRPr lang="en-CA"/>
           </a:p>
@@ -13033,7 +13037,7 @@
           <a:p>
             <a:fld id="{B34C7E02-37A9-4739-9C22-F74DCE04F2D4}" type="datetime1">
               <a:rPr lang="en-CA" smtClean="0"/>
-              <a:t>16/12/2018</a:t>
+              <a:t>2018-12-16</a:t>
             </a:fld>
             <a:endParaRPr lang="en-CA"/>
           </a:p>
@@ -13160,7 +13164,7 @@
           <a:p>
             <a:fld id="{2849D840-EB1A-4BD0-9BBF-65787F9A4F51}" type="slidenum">
               <a:rPr lang="en-CA" smtClean="0"/>
-              <a:t>‹#›</a:t>
+              <a:t>‹N°›</a:t>
             </a:fld>
             <a:endParaRPr lang="en-CA"/>
           </a:p>
@@ -13369,7 +13373,7 @@
           <a:p>
             <a:fld id="{4206C45A-34D5-4342-9305-15B61504A0C9}" type="datetime1">
               <a:rPr lang="en-CA" smtClean="0"/>
-              <a:t>16/12/2018</a:t>
+              <a:t>2018-12-16</a:t>
             </a:fld>
             <a:endParaRPr lang="en-CA"/>
           </a:p>
@@ -13496,7 +13500,7 @@
           <a:p>
             <a:fld id="{2849D840-EB1A-4BD0-9BBF-65787F9A4F51}" type="slidenum">
               <a:rPr lang="en-CA" smtClean="0"/>
-              <a:t>‹#›</a:t>
+              <a:t>‹N°›</a:t>
             </a:fld>
             <a:endParaRPr lang="en-CA"/>
           </a:p>
@@ -15489,7 +15493,7 @@
           <a:p>
             <a:fld id="{2D0A754B-72FF-4374-9E40-529DDB56E22C}" type="datetime1">
               <a:rPr lang="en-CA" smtClean="0"/>
-              <a:t>16/12/2018</a:t>
+              <a:t>2018-12-16</a:t>
             </a:fld>
             <a:endParaRPr lang="en-CA"/>
           </a:p>
@@ -15568,7 +15572,7 @@
           <a:p>
             <a:fld id="{2849D840-EB1A-4BD0-9BBF-65787F9A4F51}" type="slidenum">
               <a:rPr lang="en-CA" smtClean="0"/>
-              <a:t>‹#›</a:t>
+              <a:t>‹N°›</a:t>
             </a:fld>
             <a:endParaRPr lang="en-CA"/>
           </a:p>
@@ -16157,7 +16161,1435 @@
 </p:sld>
 </file>
 
+<file path=ppt/slides/slide10.xml><?xml version="1.0" encoding="utf-8"?>
+<p:sld xmlns:a="http://schemas.openxmlformats.org/drawingml/2006/main" xmlns:r="http://schemas.openxmlformats.org/officeDocument/2006/relationships" xmlns:p="http://schemas.openxmlformats.org/presentationml/2006/main">
+  <p:cSld>
+    <p:spTree>
+      <p:nvGrpSpPr>
+        <p:cNvPr id="1" name=""/>
+        <p:cNvGrpSpPr/>
+        <p:nvPr/>
+      </p:nvGrpSpPr>
+      <p:grpSpPr>
+        <a:xfrm>
+          <a:off x="0" y="0"/>
+          <a:ext cx="0" cy="0"/>
+          <a:chOff x="0" y="0"/>
+          <a:chExt cx="0" cy="0"/>
+        </a:xfrm>
+      </p:grpSpPr>
+      <p:sp>
+        <p:nvSpPr>
+          <p:cNvPr id="2" name="Title 1">
+            <a:extLst>
+              <a:ext uri="{FF2B5EF4-FFF2-40B4-BE49-F238E27FC236}">
+                <a16:creationId xmlns:a16="http://schemas.microsoft.com/office/drawing/2014/main" id="{CA8AAA69-A4CF-4A1A-9124-055A3A40C899}"/>
+              </a:ext>
+            </a:extLst>
+          </p:cNvPr>
+          <p:cNvSpPr>
+            <a:spLocks noGrp="1"/>
+          </p:cNvSpPr>
+          <p:nvPr>
+            <p:ph type="title"/>
+          </p:nvPr>
+        </p:nvSpPr>
+        <p:spPr/>
+        <p:txBody>
+          <a:bodyPr/>
+          <a:lstStyle/>
+          <a:p>
+            <a:r>
+              <a:rPr lang="fr-CA" dirty="0"/>
+              <a:t>Implémentation: Protection des abeilles</a:t>
+            </a:r>
+          </a:p>
+        </p:txBody>
+      </p:sp>
+      <p:pic>
+        <p:nvPicPr>
+          <p:cNvPr id="1026" name="Picture 2" descr="https://lh3.googleusercontent.com/yOnr1XIBffccvVQ07XAYpRFTkqcG4G-LcREqSR9yOV1wSqcSc1uCm6tnrguIcmGD5gMXhPpYoWUysA2_63d7JdlmlDslJdqQ8r58Ym_AddABKkbUxBsQu6NkKI_hLbVc4DusrkjDvKfaATbk9X-OMmIfpxiBxHaplfMZCSPnIc6-bUQynb2H2tgzbFJj-AntPE4MRzEkQ1iwfhCz9aVLF4gd_ntmVNi4bW6e6u5ZUS9_nwWqX0LdN9ZTEavL9RpEGysTUcuWhsKJ2cG2BeCuLBZkjQW3TLvJQyvjB58QvKnOLrg4dU2GnppkHwb3NN0eIKE9fVM5QufMg36L2c2JqHGrY_xH6a3fp9o15DaiyoHZ1nVOrPdsgdK5krVWgI_cSczZD0i56n0zgkmmT_3ylMDYHlpNdqMIoCj6J1GelHBleuYHKiEbC_LKrnViV85UqXhMe6koiyzQr2aAKBs_ubRXeVSo8JjO7RqZhk3XVefi_3K5sUq4BAOdEU0Slk2MZiQapeHht0aS9oPif8yjtCHCqU9y3ehIq3eTsWfNzI2nJLUCWIPNaayY2ISSeWtnJJiOhoS1iWcIJyTBUWJHrwGEz0PPZDWxLbi56ZBw7Yy9WvtjUDrA2gg3Lw03P44aZC0_Ie_1PYD5WY5bcXUdjIMi=w950-h713-no">
+            <a:extLst>
+              <a:ext uri="{FF2B5EF4-FFF2-40B4-BE49-F238E27FC236}">
+                <a16:creationId xmlns:a16="http://schemas.microsoft.com/office/drawing/2014/main" id="{96307C14-EA19-45C4-8A1E-5D89AE3595C0}"/>
+              </a:ext>
+            </a:extLst>
+          </p:cNvPr>
+          <p:cNvPicPr>
+            <a:picLocks noChangeAspect="1" noChangeArrowheads="1"/>
+          </p:cNvPicPr>
+          <p:nvPr/>
+        </p:nvPicPr>
+        <p:blipFill>
+          <a:blip r:embed="rId2">
+            <a:extLst>
+              <a:ext uri="{28A0092B-C50C-407E-A947-70E740481C1C}">
+                <a14:useLocalDpi xmlns:a14="http://schemas.microsoft.com/office/drawing/2010/main" val="0"/>
+              </a:ext>
+            </a:extLst>
+          </a:blip>
+          <a:srcRect/>
+          <a:stretch>
+            <a:fillRect/>
+          </a:stretch>
+        </p:blipFill>
+        <p:spPr bwMode="auto">
+          <a:xfrm>
+            <a:off x="1791433" y="2206390"/>
+            <a:ext cx="3932360" cy="2947200"/>
+          </a:xfrm>
+          <a:prstGeom prst="rect">
+            <a:avLst/>
+          </a:prstGeom>
+          <a:noFill/>
+          <a:extLst>
+            <a:ext uri="{909E8E84-426E-40DD-AFC4-6F175D3DCCD1}">
+              <a14:hiddenFill xmlns:a14="http://schemas.microsoft.com/office/drawing/2010/main">
+                <a:solidFill>
+                  <a:srgbClr val="FFFFFF"/>
+                </a:solidFill>
+              </a14:hiddenFill>
+            </a:ext>
+          </a:extLst>
+        </p:spPr>
+      </p:pic>
+      <p:pic>
+        <p:nvPicPr>
+          <p:cNvPr id="1028" name="Picture 4" descr="https://lh3.googleusercontent.com/VWT3gWU-7jSnsoLRN3_0SpBLFn-_lVkfB0TxORpX8DaTqkMp-j5EfudqI2x9nM5xoqDdH2bR4Srus-hVx3Ym96ozgIb-aITT7wQkw-e83wUkrwqpVa7YnxJd59iZRniIWt9rQnLr95ZllJ1p6Wa4iJ5dAYFZ_HA_19V2-Ulf4iHjTqfkfC2dDqFQ3YGD4Ylt2Hakft-61bs-a6vXVkDLBMnvRLfLgIQ1G2uPi5MHMipl0R2PkNomXQxJhtjs-CjT8Rekhhq2lwdw5z8PQibBBYUWpUI9Xn9IznjTgotGd3wswg1t6ux-BP7nk67TzRXni3cRU54BJuVh7xXm_BqgX7yZBc5L0pkbV8i6dGy-aJ9XuqIUlfUwhLVJBhXXGRpfc-CzKOiSxdMtNH1tponL5GkDmus8jYQnQKeQN1JF4wTL3IZ1PGWFt4Z9bA5EhHFwLxhnR1f5fLUCcA6G6JjGUX_sXGam3LqEv2kgMn5-5txR577bT-alGQmZJKYst5BNfDXuwMqwkj3781Z9g9jIq0YNm-vvC-wMiVrXvwyEoMX-lYKw611OSsYHW4XK7XFeVts7JnmLGhT7_u6RT2Ci-TA2eyIF1gaoV_Rq7A0GDCadvRgjijG39qpwFCsTsKhFH3GDW9Vt_O7eG1ujz91eRQIt=w950-h713-no">
+            <a:extLst>
+              <a:ext uri="{FF2B5EF4-FFF2-40B4-BE49-F238E27FC236}">
+                <a16:creationId xmlns:a16="http://schemas.microsoft.com/office/drawing/2014/main" id="{E2844E6E-F5A8-4D0A-99C8-99B9BF9A7CA6}"/>
+              </a:ext>
+            </a:extLst>
+          </p:cNvPr>
+          <p:cNvPicPr>
+            <a:picLocks noChangeAspect="1" noChangeArrowheads="1"/>
+          </p:cNvPicPr>
+          <p:nvPr/>
+        </p:nvPicPr>
+        <p:blipFill>
+          <a:blip r:embed="rId3">
+            <a:extLst>
+              <a:ext uri="{28A0092B-C50C-407E-A947-70E740481C1C}">
+                <a14:useLocalDpi xmlns:a14="http://schemas.microsoft.com/office/drawing/2010/main" val="0"/>
+              </a:ext>
+            </a:extLst>
+          </a:blip>
+          <a:srcRect/>
+          <a:stretch>
+            <a:fillRect/>
+          </a:stretch>
+        </p:blipFill>
+        <p:spPr bwMode="auto">
+          <a:xfrm>
+            <a:off x="6096000" y="2206391"/>
+            <a:ext cx="3932360" cy="2947200"/>
+          </a:xfrm>
+          <a:prstGeom prst="rect">
+            <a:avLst/>
+          </a:prstGeom>
+          <a:noFill/>
+          <a:extLst>
+            <a:ext uri="{909E8E84-426E-40DD-AFC4-6F175D3DCCD1}">
+              <a14:hiddenFill xmlns:a14="http://schemas.microsoft.com/office/drawing/2010/main">
+                <a:solidFill>
+                  <a:srgbClr val="FFFFFF"/>
+                </a:solidFill>
+              </a14:hiddenFill>
+            </a:ext>
+          </a:extLst>
+        </p:spPr>
+      </p:pic>
+    </p:spTree>
+    <p:extLst>
+      <p:ext uri="{BB962C8B-B14F-4D97-AF65-F5344CB8AC3E}">
+        <p14:creationId xmlns:p14="http://schemas.microsoft.com/office/powerpoint/2010/main" val="1655134525"/>
+      </p:ext>
+    </p:extLst>
+  </p:cSld>
+  <p:clrMapOvr>
+    <a:masterClrMapping/>
+  </p:clrMapOvr>
+</p:sld>
+</file>
+
+<file path=ppt/slides/slide11.xml><?xml version="1.0" encoding="utf-8"?>
+<p:sld xmlns:a="http://schemas.openxmlformats.org/drawingml/2006/main" xmlns:r="http://schemas.openxmlformats.org/officeDocument/2006/relationships" xmlns:p="http://schemas.openxmlformats.org/presentationml/2006/main">
+  <p:cSld>
+    <p:spTree>
+      <p:nvGrpSpPr>
+        <p:cNvPr id="1" name=""/>
+        <p:cNvGrpSpPr/>
+        <p:nvPr/>
+      </p:nvGrpSpPr>
+      <p:grpSpPr>
+        <a:xfrm>
+          <a:off x="0" y="0"/>
+          <a:ext cx="0" cy="0"/>
+          <a:chOff x="0" y="0"/>
+          <a:chExt cx="0" cy="0"/>
+        </a:xfrm>
+      </p:grpSpPr>
+      <p:sp>
+        <p:nvSpPr>
+          <p:cNvPr id="2" name="Title 1">
+            <a:extLst>
+              <a:ext uri="{FF2B5EF4-FFF2-40B4-BE49-F238E27FC236}">
+                <a16:creationId xmlns:a16="http://schemas.microsoft.com/office/drawing/2014/main" id="{48F25800-205D-4CB5-991F-976D96D532B4}"/>
+              </a:ext>
+            </a:extLst>
+          </p:cNvPr>
+          <p:cNvSpPr>
+            <a:spLocks noGrp="1"/>
+          </p:cNvSpPr>
+          <p:nvPr>
+            <p:ph type="title"/>
+          </p:nvPr>
+        </p:nvSpPr>
+        <p:spPr/>
+        <p:txBody>
+          <a:bodyPr/>
+          <a:lstStyle/>
+          <a:p>
+            <a:r>
+              <a:rPr lang="fr-CA" dirty="0"/>
+              <a:t>Implémentation: Faciliter le travail des apiculteurs</a:t>
+            </a:r>
+          </a:p>
+        </p:txBody>
+      </p:sp>
+      <p:pic>
+        <p:nvPicPr>
+          <p:cNvPr id="4" name="Picture 3">
+            <a:extLst>
+              <a:ext uri="{FF2B5EF4-FFF2-40B4-BE49-F238E27FC236}">
+                <a16:creationId xmlns:a16="http://schemas.microsoft.com/office/drawing/2014/main" id="{9B0B7C5E-7640-4667-97A2-D0328B60CCAA}"/>
+              </a:ext>
+            </a:extLst>
+          </p:cNvPr>
+          <p:cNvPicPr>
+            <a:picLocks noChangeAspect="1"/>
+          </p:cNvPicPr>
+          <p:nvPr/>
+        </p:nvPicPr>
+        <p:blipFill>
+          <a:blip r:embed="rId2"/>
+          <a:stretch>
+            <a:fillRect/>
+          </a:stretch>
+        </p:blipFill>
+        <p:spPr>
+          <a:xfrm>
+            <a:off x="6756571" y="1667746"/>
+            <a:ext cx="3402814" cy="4266214"/>
+          </a:xfrm>
+          <a:prstGeom prst="rect">
+            <a:avLst/>
+          </a:prstGeom>
+        </p:spPr>
+      </p:pic>
+      <p:pic>
+        <p:nvPicPr>
+          <p:cNvPr id="5" name="Picture 4">
+            <a:extLst>
+              <a:ext uri="{FF2B5EF4-FFF2-40B4-BE49-F238E27FC236}">
+                <a16:creationId xmlns:a16="http://schemas.microsoft.com/office/drawing/2014/main" id="{26FA0CA1-51B3-4FB5-AA37-19633C1A907A}"/>
+              </a:ext>
+            </a:extLst>
+          </p:cNvPr>
+          <p:cNvPicPr>
+            <a:picLocks noChangeAspect="1"/>
+          </p:cNvPicPr>
+          <p:nvPr/>
+        </p:nvPicPr>
+        <p:blipFill>
+          <a:blip r:embed="rId3"/>
+          <a:stretch>
+            <a:fillRect/>
+          </a:stretch>
+        </p:blipFill>
+        <p:spPr>
+          <a:xfrm>
+            <a:off x="2862312" y="2511272"/>
+            <a:ext cx="3454836" cy="2985753"/>
+          </a:xfrm>
+          <a:prstGeom prst="rect">
+            <a:avLst/>
+          </a:prstGeom>
+        </p:spPr>
+      </p:pic>
+    </p:spTree>
+    <p:extLst>
+      <p:ext uri="{BB962C8B-B14F-4D97-AF65-F5344CB8AC3E}">
+        <p14:creationId xmlns:p14="http://schemas.microsoft.com/office/powerpoint/2010/main" val="1788884135"/>
+      </p:ext>
+    </p:extLst>
+  </p:cSld>
+  <p:clrMapOvr>
+    <a:masterClrMapping/>
+  </p:clrMapOvr>
+</p:sld>
+</file>
+
+<file path=ppt/slides/slide12.xml><?xml version="1.0" encoding="utf-8"?>
+<p:sld xmlns:a="http://schemas.openxmlformats.org/drawingml/2006/main" xmlns:r="http://schemas.openxmlformats.org/officeDocument/2006/relationships" xmlns:p="http://schemas.openxmlformats.org/presentationml/2006/main">
+  <p:cSld>
+    <p:spTree>
+      <p:nvGrpSpPr>
+        <p:cNvPr id="1" name=""/>
+        <p:cNvGrpSpPr/>
+        <p:nvPr/>
+      </p:nvGrpSpPr>
+      <p:grpSpPr>
+        <a:xfrm>
+          <a:off x="0" y="0"/>
+          <a:ext cx="0" cy="0"/>
+          <a:chOff x="0" y="0"/>
+          <a:chExt cx="0" cy="0"/>
+        </a:xfrm>
+      </p:grpSpPr>
+      <p:sp>
+        <p:nvSpPr>
+          <p:cNvPr id="2" name="Title 1">
+            <a:extLst>
+              <a:ext uri="{FF2B5EF4-FFF2-40B4-BE49-F238E27FC236}">
+                <a16:creationId xmlns:a16="http://schemas.microsoft.com/office/drawing/2014/main" id="{59FC4DC4-E9ED-4E9A-A51D-8E28E11A4CA0}"/>
+              </a:ext>
+            </a:extLst>
+          </p:cNvPr>
+          <p:cNvSpPr>
+            <a:spLocks noGrp="1"/>
+          </p:cNvSpPr>
+          <p:nvPr>
+            <p:ph type="title"/>
+          </p:nvPr>
+        </p:nvSpPr>
+        <p:spPr/>
+        <p:txBody>
+          <a:bodyPr/>
+          <a:lstStyle/>
+          <a:p>
+            <a:r>
+              <a:rPr lang="fr-CA" dirty="0"/>
+              <a:t>Implémentation: Rentabilité</a:t>
+            </a:r>
+          </a:p>
+        </p:txBody>
+      </p:sp>
+      <p:pic>
+        <p:nvPicPr>
+          <p:cNvPr id="2050" name="Picture 2" descr="https://lh3.googleusercontent.com/K0UPldPkZmGP3MIMEEgPRzJ0OoQzlXb5nOVYu50SDtKTyeKtauJa_4PLYZ3A1pUe73-9vkVsb0SwuWgM-9ryx9wQyzZXTzMWAodfQfVd4X2rYXQOrL2NQ0AMQLiI7EVJXx1i5-z1Dw_rjdGSEaGeGxSrmxFH4BN1GK6ybd4JQma0W8fYmD-E_LwqAnmM1Yg3YVorxgY3rqCnKp_OYDBRXjvAzhK_shPdrk35NVjgMeo0g3jIiukjboaIp5MN-fnAdJTvt-bP0jVXgkoGHGc0rRpwYjRLmIXp_qmFKn4Pk0SeqEEyESau8hFUFs1heW7upWYLQvLhsg1fGUrSPYnNDeNCCRiSLPSJ0axVN22YsS0HmtJMZXxkfIZoNQhsU_0PwHSabI-p5oaFNXBu8s-H1QDfOHTFUr70oWOx7lRh-eVJ8ioVOGhnYvJFEV7dNbDrNyGTrUpnz9hXj5XxmoMmWQfDAo2GcbH-TZ3GrKcaiGjlClSwajk6RXGvhSEASKUZDOFiXjsCNSztn45sKB2_86wyi71xfjl_m9yC0WNEg2yFJeEpaqNwfx5_fTtQziVPd1z3pITK2EjsI2JgFqq4Jb8heybJLbqAO3v_FeXvUoXok3md7yO6wX0xim-v36p5JEhG7cTo6ZafJOBZL0n4tJLD=w950-h713-no">
+            <a:extLst>
+              <a:ext uri="{FF2B5EF4-FFF2-40B4-BE49-F238E27FC236}">
+                <a16:creationId xmlns:a16="http://schemas.microsoft.com/office/drawing/2014/main" id="{FBB17C17-DF7B-4832-88F7-C901A1DD851E}"/>
+              </a:ext>
+            </a:extLst>
+          </p:cNvPr>
+          <p:cNvPicPr>
+            <a:picLocks noChangeAspect="1" noChangeArrowheads="1"/>
+          </p:cNvPicPr>
+          <p:nvPr/>
+        </p:nvPicPr>
+        <p:blipFill>
+          <a:blip r:embed="rId2">
+            <a:extLst>
+              <a:ext uri="{28A0092B-C50C-407E-A947-70E740481C1C}">
+                <a14:useLocalDpi xmlns:a14="http://schemas.microsoft.com/office/drawing/2010/main" val="0"/>
+              </a:ext>
+            </a:extLst>
+          </a:blip>
+          <a:srcRect/>
+          <a:stretch>
+            <a:fillRect/>
+          </a:stretch>
+        </p:blipFill>
+        <p:spPr bwMode="auto">
+          <a:xfrm>
+            <a:off x="2030218" y="1722449"/>
+            <a:ext cx="2652403" cy="1987906"/>
+          </a:xfrm>
+          <a:prstGeom prst="rect">
+            <a:avLst/>
+          </a:prstGeom>
+          <a:noFill/>
+          <a:extLst>
+            <a:ext uri="{909E8E84-426E-40DD-AFC4-6F175D3DCCD1}">
+              <a14:hiddenFill xmlns:a14="http://schemas.microsoft.com/office/drawing/2010/main">
+                <a:solidFill>
+                  <a:srgbClr val="FFFFFF"/>
+                </a:solidFill>
+              </a14:hiddenFill>
+            </a:ext>
+          </a:extLst>
+        </p:spPr>
+      </p:pic>
+      <p:pic>
+        <p:nvPicPr>
+          <p:cNvPr id="2052" name="Picture 4" descr="https://lh3.googleusercontent.com/I2uytFuJHhZLjBHwNXVGfbQgxe0zP2brdWrtyl2peCUbKchvlSEjJRXcfiP8S8AGXn20pTUV1tECH0s1Q5VWW1R5BqJqbi6EGKTjMuRGQoVici5FteSr3oTQBQooj5yTz2XP0ufkeMlN8m_WRAxJTdXWNP2SwE94-Xbrac3DL_TsngbsnZjIgHZxEfebfgLTY5QxVGohnmc7kZ5sz_BAbCH3SZrcg9JiNVFTLbKO7xmfG-NVDDcyZ8DMErdtxQRGHafQmDrSe1j0MHuIOGi3kq_DFy2mfbvqvDwgutn8Dss9FxRG2_LcK_YnkHncygFoo8VlBlzyGhopgZxVudqtEYbdZYGHruNVFqGx0YqygEx0MvZJdYC7jIF1auQiNCtEuYcUq5y_vI0VhnXSlx91gyctb10xhSfjy4nG8YeGjZTohjirogw3KiIO2p89GxmYXRCqOO9IA_fAwokZM8tBIgzRdRZH6kjbG1R0qqbgmeoossFzTGsThFQlTfhk-RLBkK5Ggktkg-G7QL3x1kM6AUGgOxtnhCqMprpnjnXgbY3HVPeDAAyMVDEJYUwaIdgo3q53vjHOI3kYeKF_QCVr8ox8peCtwcQrS3WffSnhDbGw08FitICoqqR0cr80_EkmrXfdO6AYx2nt0ZM20q1pYIr3=w950-h713-no">
+            <a:extLst>
+              <a:ext uri="{FF2B5EF4-FFF2-40B4-BE49-F238E27FC236}">
+                <a16:creationId xmlns:a16="http://schemas.microsoft.com/office/drawing/2014/main" id="{4B5F8318-479B-4E9F-852D-99BCC26C1F62}"/>
+              </a:ext>
+            </a:extLst>
+          </p:cNvPr>
+          <p:cNvPicPr>
+            <a:picLocks noChangeAspect="1" noChangeArrowheads="1"/>
+          </p:cNvPicPr>
+          <p:nvPr/>
+        </p:nvPicPr>
+        <p:blipFill>
+          <a:blip r:embed="rId3">
+            <a:extLst>
+              <a:ext uri="{28A0092B-C50C-407E-A947-70E740481C1C}">
+                <a14:useLocalDpi xmlns:a14="http://schemas.microsoft.com/office/drawing/2010/main" val="0"/>
+              </a:ext>
+            </a:extLst>
+          </a:blip>
+          <a:srcRect/>
+          <a:stretch>
+            <a:fillRect/>
+          </a:stretch>
+        </p:blipFill>
+        <p:spPr bwMode="auto">
+          <a:xfrm>
+            <a:off x="2030218" y="3946604"/>
+            <a:ext cx="2652403" cy="1987906"/>
+          </a:xfrm>
+          <a:prstGeom prst="rect">
+            <a:avLst/>
+          </a:prstGeom>
+          <a:noFill/>
+          <a:extLst>
+            <a:ext uri="{909E8E84-426E-40DD-AFC4-6F175D3DCCD1}">
+              <a14:hiddenFill xmlns:a14="http://schemas.microsoft.com/office/drawing/2010/main">
+                <a:solidFill>
+                  <a:srgbClr val="FFFFFF"/>
+                </a:solidFill>
+              </a14:hiddenFill>
+            </a:ext>
+          </a:extLst>
+        </p:spPr>
+      </p:pic>
+      <p:pic>
+        <p:nvPicPr>
+          <p:cNvPr id="2054" name="Picture 6" descr="Image result for Lora">
+            <a:extLst>
+              <a:ext uri="{FF2B5EF4-FFF2-40B4-BE49-F238E27FC236}">
+                <a16:creationId xmlns:a16="http://schemas.microsoft.com/office/drawing/2014/main" id="{9F390F15-AA2B-4548-8AD4-FB34153ED56E}"/>
+              </a:ext>
+            </a:extLst>
+          </p:cNvPr>
+          <p:cNvPicPr>
+            <a:picLocks noChangeAspect="1" noChangeArrowheads="1"/>
+          </p:cNvPicPr>
+          <p:nvPr/>
+        </p:nvPicPr>
+        <p:blipFill>
+          <a:blip r:embed="rId4">
+            <a:extLst>
+              <a:ext uri="{28A0092B-C50C-407E-A947-70E740481C1C}">
+                <a14:useLocalDpi xmlns:a14="http://schemas.microsoft.com/office/drawing/2010/main" val="0"/>
+              </a:ext>
+            </a:extLst>
+          </a:blip>
+          <a:srcRect/>
+          <a:stretch>
+            <a:fillRect/>
+          </a:stretch>
+        </p:blipFill>
+        <p:spPr bwMode="auto">
+          <a:xfrm>
+            <a:off x="6271131" y="1469683"/>
+            <a:ext cx="2476500" cy="2476500"/>
+          </a:xfrm>
+          <a:prstGeom prst="rect">
+            <a:avLst/>
+          </a:prstGeom>
+          <a:noFill/>
+          <a:extLst>
+            <a:ext uri="{909E8E84-426E-40DD-AFC4-6F175D3DCCD1}">
+              <a14:hiddenFill xmlns:a14="http://schemas.microsoft.com/office/drawing/2010/main">
+                <a:solidFill>
+                  <a:srgbClr val="FFFFFF"/>
+                </a:solidFill>
+              </a14:hiddenFill>
+            </a:ext>
+          </a:extLst>
+        </p:spPr>
+      </p:pic>
+      <p:pic>
+        <p:nvPicPr>
+          <p:cNvPr id="2058" name="Picture 10" descr="Image result for bare pcb">
+            <a:extLst>
+              <a:ext uri="{FF2B5EF4-FFF2-40B4-BE49-F238E27FC236}">
+                <a16:creationId xmlns:a16="http://schemas.microsoft.com/office/drawing/2014/main" id="{25EBCA8D-1F86-41A5-9D2E-59B5AF6C9866}"/>
+              </a:ext>
+            </a:extLst>
+          </p:cNvPr>
+          <p:cNvPicPr>
+            <a:picLocks noChangeAspect="1" noChangeArrowheads="1"/>
+          </p:cNvPicPr>
+          <p:nvPr/>
+        </p:nvPicPr>
+        <p:blipFill>
+          <a:blip r:embed="rId5">
+            <a:extLst>
+              <a:ext uri="{28A0092B-C50C-407E-A947-70E740481C1C}">
+                <a14:useLocalDpi xmlns:a14="http://schemas.microsoft.com/office/drawing/2010/main" val="0"/>
+              </a:ext>
+            </a:extLst>
+          </a:blip>
+          <a:srcRect/>
+          <a:stretch>
+            <a:fillRect/>
+          </a:stretch>
+        </p:blipFill>
+        <p:spPr bwMode="auto">
+          <a:xfrm>
+            <a:off x="6317697" y="3765911"/>
+            <a:ext cx="1867999" cy="2053373"/>
+          </a:xfrm>
+          <a:prstGeom prst="rect">
+            <a:avLst/>
+          </a:prstGeom>
+          <a:noFill/>
+          <a:extLst>
+            <a:ext uri="{909E8E84-426E-40DD-AFC4-6F175D3DCCD1}">
+              <a14:hiddenFill xmlns:a14="http://schemas.microsoft.com/office/drawing/2010/main">
+                <a:solidFill>
+                  <a:srgbClr val="FFFFFF"/>
+                </a:solidFill>
+              </a14:hiddenFill>
+            </a:ext>
+          </a:extLst>
+        </p:spPr>
+      </p:pic>
+    </p:spTree>
+    <p:extLst>
+      <p:ext uri="{BB962C8B-B14F-4D97-AF65-F5344CB8AC3E}">
+        <p14:creationId xmlns:p14="http://schemas.microsoft.com/office/powerpoint/2010/main" val="1819236007"/>
+      </p:ext>
+    </p:extLst>
+  </p:cSld>
+  <p:clrMapOvr>
+    <a:masterClrMapping/>
+  </p:clrMapOvr>
+</p:sld>
+</file>
+
+<file path=ppt/slides/slide13.xml><?xml version="1.0" encoding="utf-8"?>
+<p:sld xmlns:a="http://schemas.openxmlformats.org/drawingml/2006/main" xmlns:r="http://schemas.openxmlformats.org/officeDocument/2006/relationships" xmlns:p="http://schemas.openxmlformats.org/presentationml/2006/main">
+  <p:cSld>
+    <p:spTree>
+      <p:nvGrpSpPr>
+        <p:cNvPr id="1" name=""/>
+        <p:cNvGrpSpPr/>
+        <p:nvPr/>
+      </p:nvGrpSpPr>
+      <p:grpSpPr>
+        <a:xfrm>
+          <a:off x="0" y="0"/>
+          <a:ext cx="0" cy="0"/>
+          <a:chOff x="0" y="0"/>
+          <a:chExt cx="0" cy="0"/>
+        </a:xfrm>
+      </p:grpSpPr>
+      <p:sp>
+        <p:nvSpPr>
+          <p:cNvPr id="2" name="Title 1">
+            <a:extLst>
+              <a:ext uri="{FF2B5EF4-FFF2-40B4-BE49-F238E27FC236}">
+                <a16:creationId xmlns:a16="http://schemas.microsoft.com/office/drawing/2014/main" id="{44B37F9B-C59D-4FE8-A1F1-61858FD27BCC}"/>
+              </a:ext>
+            </a:extLst>
+          </p:cNvPr>
+          <p:cNvSpPr>
+            <a:spLocks noGrp="1"/>
+          </p:cNvSpPr>
+          <p:nvPr>
+            <p:ph type="title"/>
+          </p:nvPr>
+        </p:nvSpPr>
+        <p:spPr/>
+        <p:txBody>
+          <a:bodyPr/>
+          <a:lstStyle/>
+          <a:p>
+            <a:r>
+              <a:rPr lang="fr-CA" dirty="0"/>
+              <a:t>Démonstration et période de questions</a:t>
+            </a:r>
+          </a:p>
+        </p:txBody>
+      </p:sp>
+      <p:pic>
+        <p:nvPicPr>
+          <p:cNvPr id="4" name="Content Placeholder 3">
+            <a:extLst>
+              <a:ext uri="{FF2B5EF4-FFF2-40B4-BE49-F238E27FC236}">
+                <a16:creationId xmlns:a16="http://schemas.microsoft.com/office/drawing/2014/main" id="{49A41C85-2E60-4FD4-9126-6B9D17FFEEA8}"/>
+              </a:ext>
+            </a:extLst>
+          </p:cNvPr>
+          <p:cNvPicPr>
+            <a:picLocks noChangeAspect="1"/>
+          </p:cNvPicPr>
+          <p:nvPr/>
+        </p:nvPicPr>
+        <p:blipFill>
+          <a:blip r:embed="rId2">
+            <a:extLst>
+              <a:ext uri="{28A0092B-C50C-407E-A947-70E740481C1C}">
+                <a14:useLocalDpi xmlns:a14="http://schemas.microsoft.com/office/drawing/2010/main" val="0"/>
+              </a:ext>
+            </a:extLst>
+          </a:blip>
+          <a:stretch>
+            <a:fillRect/>
+          </a:stretch>
+        </p:blipFill>
+        <p:spPr>
+          <a:xfrm>
+            <a:off x="3658579" y="1905000"/>
+            <a:ext cx="5123714" cy="3778250"/>
+          </a:xfrm>
+          <a:prstGeom prst="rect">
+            <a:avLst/>
+          </a:prstGeom>
+        </p:spPr>
+      </p:pic>
+    </p:spTree>
+    <p:extLst>
+      <p:ext uri="{BB962C8B-B14F-4D97-AF65-F5344CB8AC3E}">
+        <p14:creationId xmlns:p14="http://schemas.microsoft.com/office/powerpoint/2010/main" val="2113370033"/>
+      </p:ext>
+    </p:extLst>
+  </p:cSld>
+  <p:clrMapOvr>
+    <a:masterClrMapping/>
+  </p:clrMapOvr>
+</p:sld>
+</file>
+
 <file path=ppt/slides/slide2.xml><?xml version="1.0" encoding="utf-8"?>
+<p:sld xmlns:a="http://schemas.openxmlformats.org/drawingml/2006/main" xmlns:r="http://schemas.openxmlformats.org/officeDocument/2006/relationships" xmlns:p="http://schemas.openxmlformats.org/presentationml/2006/main">
+  <p:cSld>
+    <p:spTree>
+      <p:nvGrpSpPr>
+        <p:cNvPr id="1" name=""/>
+        <p:cNvGrpSpPr/>
+        <p:nvPr/>
+      </p:nvGrpSpPr>
+      <p:grpSpPr>
+        <a:xfrm>
+          <a:off x="0" y="0"/>
+          <a:ext cx="0" cy="0"/>
+          <a:chOff x="0" y="0"/>
+          <a:chExt cx="0" cy="0"/>
+        </a:xfrm>
+      </p:grpSpPr>
+      <p:sp>
+        <p:nvSpPr>
+          <p:cNvPr id="2" name="Titre 1">
+            <a:extLst>
+              <a:ext uri="{FF2B5EF4-FFF2-40B4-BE49-F238E27FC236}">
+                <a16:creationId xmlns:a16="http://schemas.microsoft.com/office/drawing/2014/main" id="{33A3844F-2569-43C0-8097-1935F514448F}"/>
+              </a:ext>
+            </a:extLst>
+          </p:cNvPr>
+          <p:cNvSpPr>
+            <a:spLocks noGrp="1"/>
+          </p:cNvSpPr>
+          <p:nvPr>
+            <p:ph type="title"/>
+          </p:nvPr>
+        </p:nvSpPr>
+        <p:spPr/>
+        <p:txBody>
+          <a:bodyPr/>
+          <a:lstStyle/>
+          <a:p>
+            <a:endParaRPr lang="fr-CA" dirty="0"/>
+          </a:p>
+        </p:txBody>
+      </p:sp>
+      <p:pic>
+        <p:nvPicPr>
+          <p:cNvPr id="4" name="Média en ligne 3">
+            <a:hlinkClick r:id="" action="ppaction://media"/>
+            <a:extLst>
+              <a:ext uri="{FF2B5EF4-FFF2-40B4-BE49-F238E27FC236}">
+                <a16:creationId xmlns:a16="http://schemas.microsoft.com/office/drawing/2014/main" id="{ADDC4739-E4A9-4DD5-A2DF-2125C7FDF418}"/>
+              </a:ext>
+            </a:extLst>
+          </p:cNvPr>
+          <p:cNvPicPr>
+            <a:picLocks noGrp="1" noRot="1" noChangeAspect="1"/>
+          </p:cNvPicPr>
+          <p:nvPr>
+            <p:ph idx="1"/>
+            <a:videoFile r:link="rId1"/>
+          </p:nvPr>
+        </p:nvPicPr>
+        <p:blipFill>
+          <a:blip r:embed="rId3"/>
+          <a:stretch>
+            <a:fillRect/>
+          </a:stretch>
+        </p:blipFill>
+        <p:spPr>
+          <a:xfrm>
+            <a:off x="2180823" y="494304"/>
+            <a:ext cx="8573035" cy="4822333"/>
+          </a:xfrm>
+          <a:prstGeom prst="rect">
+            <a:avLst/>
+          </a:prstGeom>
+        </p:spPr>
+      </p:pic>
+    </p:spTree>
+    <p:extLst>
+      <p:ext uri="{BB962C8B-B14F-4D97-AF65-F5344CB8AC3E}">
+        <p14:creationId xmlns:p14="http://schemas.microsoft.com/office/powerpoint/2010/main" val="2710471729"/>
+      </p:ext>
+    </p:extLst>
+  </p:cSld>
+  <p:clrMapOvr>
+    <a:masterClrMapping/>
+  </p:clrMapOvr>
+</p:sld>
+</file>
+
+<file path=ppt/slides/slide3.xml><?xml version="1.0" encoding="utf-8"?>
+<p:sld xmlns:a="http://schemas.openxmlformats.org/drawingml/2006/main" xmlns:r="http://schemas.openxmlformats.org/officeDocument/2006/relationships" xmlns:p="http://schemas.openxmlformats.org/presentationml/2006/main">
+  <p:cSld>
+    <p:spTree>
+      <p:nvGrpSpPr>
+        <p:cNvPr id="1" name=""/>
+        <p:cNvGrpSpPr/>
+        <p:nvPr/>
+      </p:nvGrpSpPr>
+      <p:grpSpPr>
+        <a:xfrm>
+          <a:off x="0" y="0"/>
+          <a:ext cx="0" cy="0"/>
+          <a:chOff x="0" y="0"/>
+          <a:chExt cx="0" cy="0"/>
+        </a:xfrm>
+      </p:grpSpPr>
+      <p:sp>
+        <p:nvSpPr>
+          <p:cNvPr id="2" name="Titre 1">
+            <a:extLst>
+              <a:ext uri="{FF2B5EF4-FFF2-40B4-BE49-F238E27FC236}">
+                <a16:creationId xmlns:a16="http://schemas.microsoft.com/office/drawing/2014/main" id="{AA4DA5B5-37B9-4363-92A4-0980DDBD537B}"/>
+              </a:ext>
+            </a:extLst>
+          </p:cNvPr>
+          <p:cNvSpPr>
+            <a:spLocks noGrp="1"/>
+          </p:cNvSpPr>
+          <p:nvPr>
+            <p:ph type="title"/>
+          </p:nvPr>
+        </p:nvSpPr>
+        <p:spPr/>
+        <p:txBody>
+          <a:bodyPr/>
+          <a:lstStyle/>
+          <a:p>
+            <a:r>
+              <a:rPr lang="fr-CA" b="1" dirty="0"/>
+              <a:t>Définition et finalité du projet </a:t>
+            </a:r>
+            <a:endParaRPr lang="fr-CA" dirty="0"/>
+          </a:p>
+        </p:txBody>
+      </p:sp>
+      <p:sp>
+        <p:nvSpPr>
+          <p:cNvPr id="3" name="Espace réservé du contenu 2">
+            <a:extLst>
+              <a:ext uri="{FF2B5EF4-FFF2-40B4-BE49-F238E27FC236}">
+                <a16:creationId xmlns:a16="http://schemas.microsoft.com/office/drawing/2014/main" id="{B4C59757-69B2-4FF1-8935-05E170FEF823}"/>
+              </a:ext>
+            </a:extLst>
+          </p:cNvPr>
+          <p:cNvSpPr>
+            <a:spLocks noGrp="1"/>
+          </p:cNvSpPr>
+          <p:nvPr>
+            <p:ph idx="1"/>
+          </p:nvPr>
+        </p:nvSpPr>
+        <p:spPr>
+          <a:xfrm>
+            <a:off x="2592925" y="2116428"/>
+            <a:ext cx="8915400" cy="3777622"/>
+          </a:xfrm>
+        </p:spPr>
+        <p:txBody>
+          <a:bodyPr/>
+          <a:lstStyle/>
+          <a:p>
+            <a:r>
+              <a:rPr lang="fr-CA" dirty="0"/>
+              <a:t>Module qui s’intègre à tout type de ruche et qui permet de monitorer </a:t>
+            </a:r>
+          </a:p>
+          <a:p>
+            <a:pPr lvl="1"/>
+            <a:r>
+              <a:rPr lang="fr-CA" dirty="0"/>
+              <a:t>Position</a:t>
+            </a:r>
+          </a:p>
+          <a:p>
+            <a:pPr lvl="1"/>
+            <a:r>
+              <a:rPr lang="fr-CA" dirty="0"/>
+              <a:t>Température</a:t>
+            </a:r>
+          </a:p>
+          <a:p>
+            <a:pPr lvl="1"/>
+            <a:r>
+              <a:rPr lang="fr-CA" dirty="0"/>
+              <a:t>Poids</a:t>
+            </a:r>
+          </a:p>
+          <a:p>
+            <a:pPr lvl="1"/>
+            <a:r>
+              <a:rPr lang="fr-CA" dirty="0"/>
+              <a:t>Qualité de l’air</a:t>
+            </a:r>
+          </a:p>
+          <a:p>
+            <a:pPr lvl="1"/>
+            <a:r>
+              <a:rPr lang="fr-CA" dirty="0"/>
+              <a:t>Dangers imminents</a:t>
+            </a:r>
+          </a:p>
+          <a:p>
+            <a:r>
+              <a:rPr lang="fr-CA" dirty="0"/>
+              <a:t>Apiculteurs et leurs abeilles</a:t>
+            </a:r>
+          </a:p>
+          <a:p>
+            <a:r>
+              <a:rPr lang="fr-CA" dirty="0"/>
+              <a:t>Ouvert à tout type de clientèle</a:t>
+            </a:r>
+          </a:p>
+        </p:txBody>
+      </p:sp>
+    </p:spTree>
+    <p:extLst>
+      <p:ext uri="{BB962C8B-B14F-4D97-AF65-F5344CB8AC3E}">
+        <p14:creationId xmlns:p14="http://schemas.microsoft.com/office/powerpoint/2010/main" val="1503906427"/>
+      </p:ext>
+    </p:extLst>
+  </p:cSld>
+  <p:clrMapOvr>
+    <a:masterClrMapping/>
+  </p:clrMapOvr>
+</p:sld>
+</file>
+
+<file path=ppt/slides/slide4.xml><?xml version="1.0" encoding="utf-8"?>
+<p:sld xmlns:a="http://schemas.openxmlformats.org/drawingml/2006/main" xmlns:r="http://schemas.openxmlformats.org/officeDocument/2006/relationships" xmlns:p="http://schemas.openxmlformats.org/presentationml/2006/main">
+  <p:cSld>
+    <p:spTree>
+      <p:nvGrpSpPr>
+        <p:cNvPr id="1" name=""/>
+        <p:cNvGrpSpPr/>
+        <p:nvPr/>
+      </p:nvGrpSpPr>
+      <p:grpSpPr>
+        <a:xfrm>
+          <a:off x="0" y="0"/>
+          <a:ext cx="0" cy="0"/>
+          <a:chOff x="0" y="0"/>
+          <a:chExt cx="0" cy="0"/>
+        </a:xfrm>
+      </p:grpSpPr>
+      <p:sp>
+        <p:nvSpPr>
+          <p:cNvPr id="4" name="TextBox 3">
+            <a:extLst>
+              <a:ext uri="{FF2B5EF4-FFF2-40B4-BE49-F238E27FC236}">
+                <a16:creationId xmlns:a16="http://schemas.microsoft.com/office/drawing/2014/main" id="{1326EBD1-4857-4831-A34D-591433424DBB}"/>
+              </a:ext>
+            </a:extLst>
+          </p:cNvPr>
+          <p:cNvSpPr txBox="1"/>
+          <p:nvPr/>
+        </p:nvSpPr>
+        <p:spPr>
+          <a:xfrm>
+            <a:off x="5246077" y="3033345"/>
+            <a:ext cx="1699846" cy="769441"/>
+          </a:xfrm>
+          <a:prstGeom prst="rect">
+            <a:avLst/>
+          </a:prstGeom>
+          <a:noFill/>
+          <a:ln>
+            <a:solidFill>
+              <a:schemeClr val="tx1"/>
+            </a:solidFill>
+          </a:ln>
+        </p:spPr>
+        <p:txBody>
+          <a:bodyPr wrap="square" rtlCol="0">
+            <a:spAutoFit/>
+          </a:bodyPr>
+          <a:lstStyle/>
+          <a:p>
+            <a:r>
+              <a:rPr lang="en-CA" sz="4400" dirty="0" err="1"/>
+              <a:t>Défis</a:t>
+            </a:r>
+            <a:endParaRPr lang="en-CA" sz="5400" dirty="0"/>
+          </a:p>
+        </p:txBody>
+      </p:sp>
+      <p:sp>
+        <p:nvSpPr>
+          <p:cNvPr id="5" name="TextBox 4">
+            <a:extLst>
+              <a:ext uri="{FF2B5EF4-FFF2-40B4-BE49-F238E27FC236}">
+                <a16:creationId xmlns:a16="http://schemas.microsoft.com/office/drawing/2014/main" id="{A5D0788B-D9DA-4AE1-B011-CB8305D08EF6}"/>
+              </a:ext>
+            </a:extLst>
+          </p:cNvPr>
+          <p:cNvSpPr txBox="1"/>
+          <p:nvPr/>
+        </p:nvSpPr>
+        <p:spPr>
+          <a:xfrm>
+            <a:off x="4443044" y="1081383"/>
+            <a:ext cx="3305909" cy="646331"/>
+          </a:xfrm>
+          <a:prstGeom prst="rect">
+            <a:avLst/>
+          </a:prstGeom>
+          <a:noFill/>
+          <a:ln>
+            <a:solidFill>
+              <a:schemeClr val="tx1"/>
+            </a:solidFill>
+          </a:ln>
+        </p:spPr>
+        <p:txBody>
+          <a:bodyPr wrap="square" rtlCol="0">
+            <a:spAutoFit/>
+          </a:bodyPr>
+          <a:lstStyle/>
+          <a:p>
+            <a:pPr algn="ctr"/>
+            <a:r>
+              <a:rPr lang="en-CA" sz="3600" dirty="0" err="1"/>
+              <a:t>Économique</a:t>
+            </a:r>
+            <a:endParaRPr lang="en-CA" sz="4400" dirty="0"/>
+          </a:p>
+        </p:txBody>
+      </p:sp>
+      <p:sp>
+        <p:nvSpPr>
+          <p:cNvPr id="6" name="TextBox 5">
+            <a:extLst>
+              <a:ext uri="{FF2B5EF4-FFF2-40B4-BE49-F238E27FC236}">
+                <a16:creationId xmlns:a16="http://schemas.microsoft.com/office/drawing/2014/main" id="{64719C85-A8BF-4DF6-8DDD-0491184F54C1}"/>
+              </a:ext>
+            </a:extLst>
+          </p:cNvPr>
+          <p:cNvSpPr txBox="1"/>
+          <p:nvPr/>
+        </p:nvSpPr>
+        <p:spPr>
+          <a:xfrm>
+            <a:off x="1822940" y="3110288"/>
+            <a:ext cx="1526931" cy="646331"/>
+          </a:xfrm>
+          <a:prstGeom prst="rect">
+            <a:avLst/>
+          </a:prstGeom>
+          <a:noFill/>
+          <a:ln>
+            <a:solidFill>
+              <a:schemeClr val="tx1"/>
+            </a:solidFill>
+          </a:ln>
+        </p:spPr>
+        <p:txBody>
+          <a:bodyPr wrap="square" rtlCol="0">
+            <a:spAutoFit/>
+          </a:bodyPr>
+          <a:lstStyle/>
+          <a:p>
+            <a:r>
+              <a:rPr lang="en-CA" sz="3600" dirty="0"/>
+              <a:t>Social</a:t>
+            </a:r>
+            <a:endParaRPr lang="en-CA" sz="4400" dirty="0"/>
+          </a:p>
+        </p:txBody>
+      </p:sp>
+      <p:sp>
+        <p:nvSpPr>
+          <p:cNvPr id="7" name="TextBox 6">
+            <a:extLst>
+              <a:ext uri="{FF2B5EF4-FFF2-40B4-BE49-F238E27FC236}">
+                <a16:creationId xmlns:a16="http://schemas.microsoft.com/office/drawing/2014/main" id="{D3CAA142-D08C-46B1-9AC8-27C45F1500C0}"/>
+              </a:ext>
+            </a:extLst>
+          </p:cNvPr>
+          <p:cNvSpPr txBox="1"/>
+          <p:nvPr/>
+        </p:nvSpPr>
+        <p:spPr>
+          <a:xfrm>
+            <a:off x="4056183" y="5139195"/>
+            <a:ext cx="4079633" cy="646331"/>
+          </a:xfrm>
+          <a:prstGeom prst="rect">
+            <a:avLst/>
+          </a:prstGeom>
+          <a:noFill/>
+          <a:ln>
+            <a:solidFill>
+              <a:schemeClr val="tx1"/>
+            </a:solidFill>
+          </a:ln>
+        </p:spPr>
+        <p:txBody>
+          <a:bodyPr wrap="square" rtlCol="0">
+            <a:spAutoFit/>
+          </a:bodyPr>
+          <a:lstStyle/>
+          <a:p>
+            <a:r>
+              <a:rPr lang="en-CA" sz="3600" dirty="0" err="1"/>
+              <a:t>Environnemental</a:t>
+            </a:r>
+            <a:endParaRPr lang="en-CA" sz="4400" dirty="0"/>
+          </a:p>
+        </p:txBody>
+      </p:sp>
+      <p:sp>
+        <p:nvSpPr>
+          <p:cNvPr id="8" name="TextBox 7">
+            <a:extLst>
+              <a:ext uri="{FF2B5EF4-FFF2-40B4-BE49-F238E27FC236}">
+                <a16:creationId xmlns:a16="http://schemas.microsoft.com/office/drawing/2014/main" id="{2E319D2A-B7F1-4E3F-89D4-617D468E87BA}"/>
+              </a:ext>
+            </a:extLst>
+          </p:cNvPr>
+          <p:cNvSpPr txBox="1"/>
+          <p:nvPr/>
+        </p:nvSpPr>
+        <p:spPr>
+          <a:xfrm>
+            <a:off x="8974013" y="3110289"/>
+            <a:ext cx="1395047" cy="646331"/>
+          </a:xfrm>
+          <a:prstGeom prst="rect">
+            <a:avLst/>
+          </a:prstGeom>
+          <a:noFill/>
+          <a:ln>
+            <a:solidFill>
+              <a:schemeClr val="tx1"/>
+            </a:solidFill>
+          </a:ln>
+        </p:spPr>
+        <p:txBody>
+          <a:bodyPr wrap="square" rtlCol="0">
+            <a:spAutoFit/>
+          </a:bodyPr>
+          <a:lstStyle/>
+          <a:p>
+            <a:r>
+              <a:rPr lang="en-CA" sz="3600" dirty="0" err="1"/>
+              <a:t>Légal</a:t>
+            </a:r>
+            <a:endParaRPr lang="en-CA" sz="4400" dirty="0"/>
+          </a:p>
+        </p:txBody>
+      </p:sp>
+      <p:cxnSp>
+        <p:nvCxnSpPr>
+          <p:cNvPr id="10" name="Straight Arrow Connector 9">
+            <a:extLst>
+              <a:ext uri="{FF2B5EF4-FFF2-40B4-BE49-F238E27FC236}">
+                <a16:creationId xmlns:a16="http://schemas.microsoft.com/office/drawing/2014/main" id="{F4073090-02B2-428A-9BE3-7C5EE672EC62}"/>
+              </a:ext>
+            </a:extLst>
+          </p:cNvPr>
+          <p:cNvCxnSpPr>
+            <a:cxnSpLocks/>
+            <a:stCxn id="5" idx="2"/>
+            <a:endCxn id="4" idx="0"/>
+          </p:cNvCxnSpPr>
+          <p:nvPr/>
+        </p:nvCxnSpPr>
+        <p:spPr>
+          <a:xfrm>
+            <a:off x="6095999" y="1727714"/>
+            <a:ext cx="1" cy="1305631"/>
+          </a:xfrm>
+          <a:prstGeom prst="straightConnector1">
+            <a:avLst/>
+          </a:prstGeom>
+          <a:ln>
+            <a:tailEnd type="triangle"/>
+          </a:ln>
+        </p:spPr>
+        <p:style>
+          <a:lnRef idx="1">
+            <a:schemeClr val="accent1"/>
+          </a:lnRef>
+          <a:fillRef idx="0">
+            <a:schemeClr val="accent1"/>
+          </a:fillRef>
+          <a:effectRef idx="0">
+            <a:schemeClr val="accent1"/>
+          </a:effectRef>
+          <a:fontRef idx="minor">
+            <a:schemeClr val="tx1"/>
+          </a:fontRef>
+        </p:style>
+      </p:cxnSp>
+      <p:cxnSp>
+        <p:nvCxnSpPr>
+          <p:cNvPr id="16" name="Straight Arrow Connector 15">
+            <a:extLst>
+              <a:ext uri="{FF2B5EF4-FFF2-40B4-BE49-F238E27FC236}">
+                <a16:creationId xmlns:a16="http://schemas.microsoft.com/office/drawing/2014/main" id="{521DF92E-F87B-4431-8A71-46207BAB0549}"/>
+              </a:ext>
+            </a:extLst>
+          </p:cNvPr>
+          <p:cNvCxnSpPr>
+            <a:stCxn id="6" idx="3"/>
+            <a:endCxn id="4" idx="1"/>
+          </p:cNvCxnSpPr>
+          <p:nvPr/>
+        </p:nvCxnSpPr>
+        <p:spPr>
+          <a:xfrm flipV="1">
+            <a:off x="3349871" y="3418066"/>
+            <a:ext cx="1896206" cy="15388"/>
+          </a:xfrm>
+          <a:prstGeom prst="straightConnector1">
+            <a:avLst/>
+          </a:prstGeom>
+          <a:ln>
+            <a:tailEnd type="triangle"/>
+          </a:ln>
+        </p:spPr>
+        <p:style>
+          <a:lnRef idx="1">
+            <a:schemeClr val="accent1"/>
+          </a:lnRef>
+          <a:fillRef idx="0">
+            <a:schemeClr val="accent1"/>
+          </a:fillRef>
+          <a:effectRef idx="0">
+            <a:schemeClr val="accent1"/>
+          </a:effectRef>
+          <a:fontRef idx="minor">
+            <a:schemeClr val="tx1"/>
+          </a:fontRef>
+        </p:style>
+      </p:cxnSp>
+      <p:cxnSp>
+        <p:nvCxnSpPr>
+          <p:cNvPr id="18" name="Straight Arrow Connector 17">
+            <a:extLst>
+              <a:ext uri="{FF2B5EF4-FFF2-40B4-BE49-F238E27FC236}">
+                <a16:creationId xmlns:a16="http://schemas.microsoft.com/office/drawing/2014/main" id="{A2E2B531-927A-44FC-8451-9F38118E6F9C}"/>
+              </a:ext>
+            </a:extLst>
+          </p:cNvPr>
+          <p:cNvCxnSpPr>
+            <a:stCxn id="8" idx="1"/>
+            <a:endCxn id="4" idx="3"/>
+          </p:cNvCxnSpPr>
+          <p:nvPr/>
+        </p:nvCxnSpPr>
+        <p:spPr>
+          <a:xfrm flipH="1" flipV="1">
+            <a:off x="6945923" y="3418066"/>
+            <a:ext cx="2028090" cy="15389"/>
+          </a:xfrm>
+          <a:prstGeom prst="straightConnector1">
+            <a:avLst/>
+          </a:prstGeom>
+          <a:ln>
+            <a:tailEnd type="triangle"/>
+          </a:ln>
+        </p:spPr>
+        <p:style>
+          <a:lnRef idx="1">
+            <a:schemeClr val="accent1"/>
+          </a:lnRef>
+          <a:fillRef idx="0">
+            <a:schemeClr val="accent1"/>
+          </a:fillRef>
+          <a:effectRef idx="0">
+            <a:schemeClr val="accent1"/>
+          </a:effectRef>
+          <a:fontRef idx="minor">
+            <a:schemeClr val="tx1"/>
+          </a:fontRef>
+        </p:style>
+      </p:cxnSp>
+      <p:cxnSp>
+        <p:nvCxnSpPr>
+          <p:cNvPr id="20" name="Straight Arrow Connector 19">
+            <a:extLst>
+              <a:ext uri="{FF2B5EF4-FFF2-40B4-BE49-F238E27FC236}">
+                <a16:creationId xmlns:a16="http://schemas.microsoft.com/office/drawing/2014/main" id="{53CFFADB-5B42-4AA0-972A-6F2DE8E75E76}"/>
+              </a:ext>
+            </a:extLst>
+          </p:cNvPr>
+          <p:cNvCxnSpPr>
+            <a:stCxn id="7" idx="0"/>
+            <a:endCxn id="4" idx="2"/>
+          </p:cNvCxnSpPr>
+          <p:nvPr/>
+        </p:nvCxnSpPr>
+        <p:spPr>
+          <a:xfrm flipV="1">
+            <a:off x="6096000" y="3802786"/>
+            <a:ext cx="0" cy="1336409"/>
+          </a:xfrm>
+          <a:prstGeom prst="straightConnector1">
+            <a:avLst/>
+          </a:prstGeom>
+          <a:ln>
+            <a:tailEnd type="triangle"/>
+          </a:ln>
+        </p:spPr>
+        <p:style>
+          <a:lnRef idx="1">
+            <a:schemeClr val="accent1"/>
+          </a:lnRef>
+          <a:fillRef idx="0">
+            <a:schemeClr val="accent1"/>
+          </a:fillRef>
+          <a:effectRef idx="0">
+            <a:schemeClr val="accent1"/>
+          </a:effectRef>
+          <a:fontRef idx="minor">
+            <a:schemeClr val="tx1"/>
+          </a:fontRef>
+        </p:style>
+      </p:cxnSp>
+    </p:spTree>
+    <p:extLst>
+      <p:ext uri="{BB962C8B-B14F-4D97-AF65-F5344CB8AC3E}">
+        <p14:creationId xmlns:p14="http://schemas.microsoft.com/office/powerpoint/2010/main" val="752424227"/>
+      </p:ext>
+    </p:extLst>
+  </p:cSld>
+  <p:clrMapOvr>
+    <a:masterClrMapping/>
+  </p:clrMapOvr>
+</p:sld>
+</file>
+
+<file path=ppt/slides/slide5.xml><?xml version="1.0" encoding="utf-8"?>
+<p:sld xmlns:a="http://schemas.openxmlformats.org/drawingml/2006/main" xmlns:r="http://schemas.openxmlformats.org/officeDocument/2006/relationships" xmlns:p="http://schemas.openxmlformats.org/presentationml/2006/main">
+  <p:cSld>
+    <p:spTree>
+      <p:nvGrpSpPr>
+        <p:cNvPr id="1" name=""/>
+        <p:cNvGrpSpPr/>
+        <p:nvPr/>
+      </p:nvGrpSpPr>
+      <p:grpSpPr>
+        <a:xfrm>
+          <a:off x="0" y="0"/>
+          <a:ext cx="0" cy="0"/>
+          <a:chOff x="0" y="0"/>
+          <a:chExt cx="0" cy="0"/>
+        </a:xfrm>
+      </p:grpSpPr>
+      <p:sp>
+        <p:nvSpPr>
+          <p:cNvPr id="4" name="TextBox 3">
+            <a:extLst>
+              <a:ext uri="{FF2B5EF4-FFF2-40B4-BE49-F238E27FC236}">
+                <a16:creationId xmlns:a16="http://schemas.microsoft.com/office/drawing/2014/main" id="{8496E773-06F6-4193-B827-83CC23D2D9B0}"/>
+              </a:ext>
+            </a:extLst>
+          </p:cNvPr>
+          <p:cNvSpPr txBox="1"/>
+          <p:nvPr/>
+        </p:nvSpPr>
+        <p:spPr>
+          <a:xfrm>
+            <a:off x="3121267" y="1093175"/>
+            <a:ext cx="6734910" cy="646331"/>
+          </a:xfrm>
+          <a:prstGeom prst="rect">
+            <a:avLst/>
+          </a:prstGeom>
+          <a:noFill/>
+          <a:ln>
+            <a:solidFill>
+              <a:schemeClr val="tx1"/>
+            </a:solidFill>
+          </a:ln>
+        </p:spPr>
+        <p:txBody>
+          <a:bodyPr wrap="square" rtlCol="0">
+            <a:spAutoFit/>
+          </a:bodyPr>
+          <a:lstStyle/>
+          <a:p>
+            <a:r>
+              <a:rPr lang="en-CA" sz="3600" dirty="0"/>
+              <a:t>1 - Conservation des </a:t>
+            </a:r>
+            <a:r>
+              <a:rPr lang="en-CA" sz="3600" dirty="0" err="1"/>
+              <a:t>abeilles</a:t>
+            </a:r>
+            <a:endParaRPr lang="en-CA" sz="3600" dirty="0"/>
+          </a:p>
+        </p:txBody>
+      </p:sp>
+      <p:sp>
+        <p:nvSpPr>
+          <p:cNvPr id="5" name="TextBox 4">
+            <a:extLst>
+              <a:ext uri="{FF2B5EF4-FFF2-40B4-BE49-F238E27FC236}">
+                <a16:creationId xmlns:a16="http://schemas.microsoft.com/office/drawing/2014/main" id="{4867A4D4-F475-419D-A945-D19F08351F33}"/>
+              </a:ext>
+            </a:extLst>
+          </p:cNvPr>
+          <p:cNvSpPr txBox="1"/>
+          <p:nvPr/>
+        </p:nvSpPr>
+        <p:spPr>
+          <a:xfrm>
+            <a:off x="3121267" y="2819398"/>
+            <a:ext cx="8229602" cy="769441"/>
+          </a:xfrm>
+          <a:prstGeom prst="rect">
+            <a:avLst/>
+          </a:prstGeom>
+          <a:noFill/>
+          <a:ln>
+            <a:solidFill>
+              <a:schemeClr val="tx1"/>
+            </a:solidFill>
+          </a:ln>
+        </p:spPr>
+        <p:txBody>
+          <a:bodyPr wrap="square" rtlCol="0">
+            <a:spAutoFit/>
+          </a:bodyPr>
+          <a:lstStyle/>
+          <a:p>
+            <a:r>
+              <a:rPr lang="en-CA" sz="4400" dirty="0"/>
+              <a:t>2 - </a:t>
+            </a:r>
+            <a:r>
+              <a:rPr lang="en-CA" sz="3600" dirty="0" err="1"/>
+              <a:t>Atteindre</a:t>
+            </a:r>
+            <a:r>
+              <a:rPr lang="en-CA" sz="3600" dirty="0"/>
+              <a:t> les </a:t>
+            </a:r>
+            <a:r>
+              <a:rPr lang="en-CA" sz="3600" dirty="0" err="1"/>
+              <a:t>objectifs</a:t>
+            </a:r>
+            <a:r>
+              <a:rPr lang="en-CA" sz="3600" dirty="0"/>
+              <a:t> de ventes</a:t>
+            </a:r>
+            <a:endParaRPr lang="en-CA" sz="4400" dirty="0"/>
+          </a:p>
+        </p:txBody>
+      </p:sp>
+      <p:sp>
+        <p:nvSpPr>
+          <p:cNvPr id="6" name="TextBox 5">
+            <a:extLst>
+              <a:ext uri="{FF2B5EF4-FFF2-40B4-BE49-F238E27FC236}">
+                <a16:creationId xmlns:a16="http://schemas.microsoft.com/office/drawing/2014/main" id="{6FDE0949-A647-41E2-9FDB-C906D0A1C64E}"/>
+              </a:ext>
+            </a:extLst>
+          </p:cNvPr>
+          <p:cNvSpPr txBox="1"/>
+          <p:nvPr/>
+        </p:nvSpPr>
+        <p:spPr>
+          <a:xfrm>
+            <a:off x="3121267" y="4536827"/>
+            <a:ext cx="7587764" cy="769441"/>
+          </a:xfrm>
+          <a:prstGeom prst="rect">
+            <a:avLst/>
+          </a:prstGeom>
+          <a:noFill/>
+          <a:ln>
+            <a:solidFill>
+              <a:schemeClr val="tx1"/>
+            </a:solidFill>
+          </a:ln>
+        </p:spPr>
+        <p:txBody>
+          <a:bodyPr wrap="square" rtlCol="0">
+            <a:spAutoFit/>
+          </a:bodyPr>
+          <a:lstStyle/>
+          <a:p>
+            <a:r>
+              <a:rPr lang="en-CA" sz="4400" dirty="0"/>
+              <a:t>3 - </a:t>
+            </a:r>
+            <a:r>
+              <a:rPr lang="en-CA" sz="3600" dirty="0" err="1"/>
+              <a:t>Faciliter</a:t>
+            </a:r>
+            <a:r>
+              <a:rPr lang="en-CA" sz="3600" dirty="0"/>
+              <a:t> la vie aux </a:t>
+            </a:r>
+            <a:r>
+              <a:rPr lang="en-CA" sz="3600" dirty="0" err="1"/>
+              <a:t>apiculteurs</a:t>
+            </a:r>
+            <a:endParaRPr lang="en-CA" sz="4400" dirty="0"/>
+          </a:p>
+        </p:txBody>
+      </p:sp>
+    </p:spTree>
+    <p:extLst>
+      <p:ext uri="{BB962C8B-B14F-4D97-AF65-F5344CB8AC3E}">
+        <p14:creationId xmlns:p14="http://schemas.microsoft.com/office/powerpoint/2010/main" val="4108082058"/>
+      </p:ext>
+    </p:extLst>
+  </p:cSld>
+  <p:clrMapOvr>
+    <a:masterClrMapping/>
+  </p:clrMapOvr>
+</p:sld>
+</file>
+
+<file path=ppt/slides/slide6.xml><?xml version="1.0" encoding="utf-8"?>
 <p:sld xmlns:a="http://schemas.openxmlformats.org/drawingml/2006/main" xmlns:r="http://schemas.openxmlformats.org/officeDocument/2006/relationships" xmlns:p="http://schemas.openxmlformats.org/presentationml/2006/main">
   <p:cSld>
     <p:spTree>
@@ -16255,7 +17687,7 @@
 </p:sld>
 </file>
 
-<file path=ppt/slides/slide3.xml><?xml version="1.0" encoding="utf-8"?>
+<file path=ppt/slides/slide7.xml><?xml version="1.0" encoding="utf-8"?>
 <p:sld xmlns:a="http://schemas.openxmlformats.org/drawingml/2006/main" xmlns:r="http://schemas.openxmlformats.org/officeDocument/2006/relationships" xmlns:p="http://schemas.openxmlformats.org/presentationml/2006/main">
   <p:cSld>
     <p:spTree>
@@ -16973,7 +18405,7 @@
 </p:sld>
 </file>
 
-<file path=ppt/slides/slide4.xml><?xml version="1.0" encoding="utf-8"?>
+<file path=ppt/slides/slide8.xml><?xml version="1.0" encoding="utf-8"?>
 <p:sld xmlns:a="http://schemas.openxmlformats.org/drawingml/2006/main" xmlns:r="http://schemas.openxmlformats.org/officeDocument/2006/relationships" xmlns:p="http://schemas.openxmlformats.org/presentationml/2006/main">
   <p:cSld>
     <p:spTree>
@@ -17071,7 +18503,7 @@
 </p:sld>
 </file>
 
-<file path=ppt/slides/slide5.xml><?xml version="1.0" encoding="utf-8"?>
+<file path=ppt/slides/slide9.xml><?xml version="1.0" encoding="utf-8"?>
 <p:sld xmlns:a="http://schemas.openxmlformats.org/drawingml/2006/main" xmlns:r="http://schemas.openxmlformats.org/officeDocument/2006/relationships" xmlns:p="http://schemas.openxmlformats.org/presentationml/2006/main">
   <p:cSld>
     <p:spTree>
@@ -17148,616 +18580,6 @@
     <p:extLst>
       <p:ext uri="{BB962C8B-B14F-4D97-AF65-F5344CB8AC3E}">
         <p14:creationId xmlns:p14="http://schemas.microsoft.com/office/powerpoint/2010/main" val="3967243267"/>
-      </p:ext>
-    </p:extLst>
-  </p:cSld>
-  <p:clrMapOvr>
-    <a:masterClrMapping/>
-  </p:clrMapOvr>
-</p:sld>
-</file>
-
-<file path=ppt/slides/slide6.xml><?xml version="1.0" encoding="utf-8"?>
-<p:sld xmlns:a="http://schemas.openxmlformats.org/drawingml/2006/main" xmlns:r="http://schemas.openxmlformats.org/officeDocument/2006/relationships" xmlns:p="http://schemas.openxmlformats.org/presentationml/2006/main">
-  <p:cSld>
-    <p:spTree>
-      <p:nvGrpSpPr>
-        <p:cNvPr id="1" name=""/>
-        <p:cNvGrpSpPr/>
-        <p:nvPr/>
-      </p:nvGrpSpPr>
-      <p:grpSpPr>
-        <a:xfrm>
-          <a:off x="0" y="0"/>
-          <a:ext cx="0" cy="0"/>
-          <a:chOff x="0" y="0"/>
-          <a:chExt cx="0" cy="0"/>
-        </a:xfrm>
-      </p:grpSpPr>
-      <p:sp>
-        <p:nvSpPr>
-          <p:cNvPr id="2" name="Title 1">
-            <a:extLst>
-              <a:ext uri="{FF2B5EF4-FFF2-40B4-BE49-F238E27FC236}">
-                <a16:creationId xmlns:a16="http://schemas.microsoft.com/office/drawing/2014/main" id="{CA8AAA69-A4CF-4A1A-9124-055A3A40C899}"/>
-              </a:ext>
-            </a:extLst>
-          </p:cNvPr>
-          <p:cNvSpPr>
-            <a:spLocks noGrp="1"/>
-          </p:cNvSpPr>
-          <p:nvPr>
-            <p:ph type="title"/>
-          </p:nvPr>
-        </p:nvSpPr>
-        <p:spPr/>
-        <p:txBody>
-          <a:bodyPr/>
-          <a:lstStyle/>
-          <a:p>
-            <a:r>
-              <a:rPr lang="fr-CA" dirty="0"/>
-              <a:t>Implémentation: Protection des abeilles</a:t>
-            </a:r>
-          </a:p>
-        </p:txBody>
-      </p:sp>
-      <p:pic>
-        <p:nvPicPr>
-          <p:cNvPr id="1026" name="Picture 2" descr="https://lh3.googleusercontent.com/yOnr1XIBffccvVQ07XAYpRFTkqcG4G-LcREqSR9yOV1wSqcSc1uCm6tnrguIcmGD5gMXhPpYoWUysA2_63d7JdlmlDslJdqQ8r58Ym_AddABKkbUxBsQu6NkKI_hLbVc4DusrkjDvKfaATbk9X-OMmIfpxiBxHaplfMZCSPnIc6-bUQynb2H2tgzbFJj-AntPE4MRzEkQ1iwfhCz9aVLF4gd_ntmVNi4bW6e6u5ZUS9_nwWqX0LdN9ZTEavL9RpEGysTUcuWhsKJ2cG2BeCuLBZkjQW3TLvJQyvjB58QvKnOLrg4dU2GnppkHwb3NN0eIKE9fVM5QufMg36L2c2JqHGrY_xH6a3fp9o15DaiyoHZ1nVOrPdsgdK5krVWgI_cSczZD0i56n0zgkmmT_3ylMDYHlpNdqMIoCj6J1GelHBleuYHKiEbC_LKrnViV85UqXhMe6koiyzQr2aAKBs_ubRXeVSo8JjO7RqZhk3XVefi_3K5sUq4BAOdEU0Slk2MZiQapeHht0aS9oPif8yjtCHCqU9y3ehIq3eTsWfNzI2nJLUCWIPNaayY2ISSeWtnJJiOhoS1iWcIJyTBUWJHrwGEz0PPZDWxLbi56ZBw7Yy9WvtjUDrA2gg3Lw03P44aZC0_Ie_1PYD5WY5bcXUdjIMi=w950-h713-no">
-            <a:extLst>
-              <a:ext uri="{FF2B5EF4-FFF2-40B4-BE49-F238E27FC236}">
-                <a16:creationId xmlns:a16="http://schemas.microsoft.com/office/drawing/2014/main" id="{96307C14-EA19-45C4-8A1E-5D89AE3595C0}"/>
-              </a:ext>
-            </a:extLst>
-          </p:cNvPr>
-          <p:cNvPicPr>
-            <a:picLocks noChangeAspect="1" noChangeArrowheads="1"/>
-          </p:cNvPicPr>
-          <p:nvPr/>
-        </p:nvPicPr>
-        <p:blipFill>
-          <a:blip r:embed="rId2">
-            <a:extLst>
-              <a:ext uri="{28A0092B-C50C-407E-A947-70E740481C1C}">
-                <a14:useLocalDpi xmlns:a14="http://schemas.microsoft.com/office/drawing/2010/main" val="0"/>
-              </a:ext>
-            </a:extLst>
-          </a:blip>
-          <a:srcRect/>
-          <a:stretch>
-            <a:fillRect/>
-          </a:stretch>
-        </p:blipFill>
-        <p:spPr bwMode="auto">
-          <a:xfrm>
-            <a:off x="1791433" y="2206390"/>
-            <a:ext cx="3932360" cy="2947200"/>
-          </a:xfrm>
-          <a:prstGeom prst="rect">
-            <a:avLst/>
-          </a:prstGeom>
-          <a:noFill/>
-          <a:extLst>
-            <a:ext uri="{909E8E84-426E-40DD-AFC4-6F175D3DCCD1}">
-              <a14:hiddenFill xmlns:a14="http://schemas.microsoft.com/office/drawing/2010/main">
-                <a:solidFill>
-                  <a:srgbClr val="FFFFFF"/>
-                </a:solidFill>
-              </a14:hiddenFill>
-            </a:ext>
-          </a:extLst>
-        </p:spPr>
-      </p:pic>
-      <p:pic>
-        <p:nvPicPr>
-          <p:cNvPr id="1028" name="Picture 4" descr="https://lh3.googleusercontent.com/VWT3gWU-7jSnsoLRN3_0SpBLFn-_lVkfB0TxORpX8DaTqkMp-j5EfudqI2x9nM5xoqDdH2bR4Srus-hVx3Ym96ozgIb-aITT7wQkw-e83wUkrwqpVa7YnxJd59iZRniIWt9rQnLr95ZllJ1p6Wa4iJ5dAYFZ_HA_19V2-Ulf4iHjTqfkfC2dDqFQ3YGD4Ylt2Hakft-61bs-a6vXVkDLBMnvRLfLgIQ1G2uPi5MHMipl0R2PkNomXQxJhtjs-CjT8Rekhhq2lwdw5z8PQibBBYUWpUI9Xn9IznjTgotGd3wswg1t6ux-BP7nk67TzRXni3cRU54BJuVh7xXm_BqgX7yZBc5L0pkbV8i6dGy-aJ9XuqIUlfUwhLVJBhXXGRpfc-CzKOiSxdMtNH1tponL5GkDmus8jYQnQKeQN1JF4wTL3IZ1PGWFt4Z9bA5EhHFwLxhnR1f5fLUCcA6G6JjGUX_sXGam3LqEv2kgMn5-5txR577bT-alGQmZJKYst5BNfDXuwMqwkj3781Z9g9jIq0YNm-vvC-wMiVrXvwyEoMX-lYKw611OSsYHW4XK7XFeVts7JnmLGhT7_u6RT2Ci-TA2eyIF1gaoV_Rq7A0GDCadvRgjijG39qpwFCsTsKhFH3GDW9Vt_O7eG1ujz91eRQIt=w950-h713-no">
-            <a:extLst>
-              <a:ext uri="{FF2B5EF4-FFF2-40B4-BE49-F238E27FC236}">
-                <a16:creationId xmlns:a16="http://schemas.microsoft.com/office/drawing/2014/main" id="{E2844E6E-F5A8-4D0A-99C8-99B9BF9A7CA6}"/>
-              </a:ext>
-            </a:extLst>
-          </p:cNvPr>
-          <p:cNvPicPr>
-            <a:picLocks noChangeAspect="1" noChangeArrowheads="1"/>
-          </p:cNvPicPr>
-          <p:nvPr/>
-        </p:nvPicPr>
-        <p:blipFill>
-          <a:blip r:embed="rId3">
-            <a:extLst>
-              <a:ext uri="{28A0092B-C50C-407E-A947-70E740481C1C}">
-                <a14:useLocalDpi xmlns:a14="http://schemas.microsoft.com/office/drawing/2010/main" val="0"/>
-              </a:ext>
-            </a:extLst>
-          </a:blip>
-          <a:srcRect/>
-          <a:stretch>
-            <a:fillRect/>
-          </a:stretch>
-        </p:blipFill>
-        <p:spPr bwMode="auto">
-          <a:xfrm>
-            <a:off x="6096000" y="2206391"/>
-            <a:ext cx="3932360" cy="2947200"/>
-          </a:xfrm>
-          <a:prstGeom prst="rect">
-            <a:avLst/>
-          </a:prstGeom>
-          <a:noFill/>
-          <a:extLst>
-            <a:ext uri="{909E8E84-426E-40DD-AFC4-6F175D3DCCD1}">
-              <a14:hiddenFill xmlns:a14="http://schemas.microsoft.com/office/drawing/2010/main">
-                <a:solidFill>
-                  <a:srgbClr val="FFFFFF"/>
-                </a:solidFill>
-              </a14:hiddenFill>
-            </a:ext>
-          </a:extLst>
-        </p:spPr>
-      </p:pic>
-    </p:spTree>
-    <p:extLst>
-      <p:ext uri="{BB962C8B-B14F-4D97-AF65-F5344CB8AC3E}">
-        <p14:creationId xmlns:p14="http://schemas.microsoft.com/office/powerpoint/2010/main" val="1655134525"/>
-      </p:ext>
-    </p:extLst>
-  </p:cSld>
-  <p:clrMapOvr>
-    <a:masterClrMapping/>
-  </p:clrMapOvr>
-</p:sld>
-</file>
-
-<file path=ppt/slides/slide7.xml><?xml version="1.0" encoding="utf-8"?>
-<p:sld xmlns:a="http://schemas.openxmlformats.org/drawingml/2006/main" xmlns:r="http://schemas.openxmlformats.org/officeDocument/2006/relationships" xmlns:p="http://schemas.openxmlformats.org/presentationml/2006/main">
-  <p:cSld>
-    <p:spTree>
-      <p:nvGrpSpPr>
-        <p:cNvPr id="1" name=""/>
-        <p:cNvGrpSpPr/>
-        <p:nvPr/>
-      </p:nvGrpSpPr>
-      <p:grpSpPr>
-        <a:xfrm>
-          <a:off x="0" y="0"/>
-          <a:ext cx="0" cy="0"/>
-          <a:chOff x="0" y="0"/>
-          <a:chExt cx="0" cy="0"/>
-        </a:xfrm>
-      </p:grpSpPr>
-      <p:sp>
-        <p:nvSpPr>
-          <p:cNvPr id="2" name="Title 1">
-            <a:extLst>
-              <a:ext uri="{FF2B5EF4-FFF2-40B4-BE49-F238E27FC236}">
-                <a16:creationId xmlns:a16="http://schemas.microsoft.com/office/drawing/2014/main" id="{48F25800-205D-4CB5-991F-976D96D532B4}"/>
-              </a:ext>
-            </a:extLst>
-          </p:cNvPr>
-          <p:cNvSpPr>
-            <a:spLocks noGrp="1"/>
-          </p:cNvSpPr>
-          <p:nvPr>
-            <p:ph type="title"/>
-          </p:nvPr>
-        </p:nvSpPr>
-        <p:spPr/>
-        <p:txBody>
-          <a:bodyPr/>
-          <a:lstStyle/>
-          <a:p>
-            <a:r>
-              <a:rPr lang="fr-CA" dirty="0"/>
-              <a:t>Implémentation: Faciliter le travail des apiculteurs</a:t>
-            </a:r>
-          </a:p>
-        </p:txBody>
-      </p:sp>
-      <p:pic>
-        <p:nvPicPr>
-          <p:cNvPr id="4" name="Picture 3">
-            <a:extLst>
-              <a:ext uri="{FF2B5EF4-FFF2-40B4-BE49-F238E27FC236}">
-                <a16:creationId xmlns:a16="http://schemas.microsoft.com/office/drawing/2014/main" id="{9B0B7C5E-7640-4667-97A2-D0328B60CCAA}"/>
-              </a:ext>
-            </a:extLst>
-          </p:cNvPr>
-          <p:cNvPicPr>
-            <a:picLocks noChangeAspect="1"/>
-          </p:cNvPicPr>
-          <p:nvPr/>
-        </p:nvPicPr>
-        <p:blipFill>
-          <a:blip r:embed="rId2"/>
-          <a:stretch>
-            <a:fillRect/>
-          </a:stretch>
-        </p:blipFill>
-        <p:spPr>
-          <a:xfrm>
-            <a:off x="6756571" y="1667746"/>
-            <a:ext cx="3402814" cy="4266214"/>
-          </a:xfrm>
-          <a:prstGeom prst="rect">
-            <a:avLst/>
-          </a:prstGeom>
-        </p:spPr>
-      </p:pic>
-      <p:pic>
-        <p:nvPicPr>
-          <p:cNvPr id="5" name="Picture 4">
-            <a:extLst>
-              <a:ext uri="{FF2B5EF4-FFF2-40B4-BE49-F238E27FC236}">
-                <a16:creationId xmlns:a16="http://schemas.microsoft.com/office/drawing/2014/main" id="{26FA0CA1-51B3-4FB5-AA37-19633C1A907A}"/>
-              </a:ext>
-            </a:extLst>
-          </p:cNvPr>
-          <p:cNvPicPr>
-            <a:picLocks noChangeAspect="1"/>
-          </p:cNvPicPr>
-          <p:nvPr/>
-        </p:nvPicPr>
-        <p:blipFill>
-          <a:blip r:embed="rId3"/>
-          <a:stretch>
-            <a:fillRect/>
-          </a:stretch>
-        </p:blipFill>
-        <p:spPr>
-          <a:xfrm>
-            <a:off x="2862312" y="2511272"/>
-            <a:ext cx="3454836" cy="2985753"/>
-          </a:xfrm>
-          <a:prstGeom prst="rect">
-            <a:avLst/>
-          </a:prstGeom>
-        </p:spPr>
-      </p:pic>
-    </p:spTree>
-    <p:extLst>
-      <p:ext uri="{BB962C8B-B14F-4D97-AF65-F5344CB8AC3E}">
-        <p14:creationId xmlns:p14="http://schemas.microsoft.com/office/powerpoint/2010/main" val="1788884135"/>
-      </p:ext>
-    </p:extLst>
-  </p:cSld>
-  <p:clrMapOvr>
-    <a:masterClrMapping/>
-  </p:clrMapOvr>
-</p:sld>
-</file>
-
-<file path=ppt/slides/slide8.xml><?xml version="1.0" encoding="utf-8"?>
-<p:sld xmlns:a="http://schemas.openxmlformats.org/drawingml/2006/main" xmlns:r="http://schemas.openxmlformats.org/officeDocument/2006/relationships" xmlns:p="http://schemas.openxmlformats.org/presentationml/2006/main">
-  <p:cSld>
-    <p:spTree>
-      <p:nvGrpSpPr>
-        <p:cNvPr id="1" name=""/>
-        <p:cNvGrpSpPr/>
-        <p:nvPr/>
-      </p:nvGrpSpPr>
-      <p:grpSpPr>
-        <a:xfrm>
-          <a:off x="0" y="0"/>
-          <a:ext cx="0" cy="0"/>
-          <a:chOff x="0" y="0"/>
-          <a:chExt cx="0" cy="0"/>
-        </a:xfrm>
-      </p:grpSpPr>
-      <p:sp>
-        <p:nvSpPr>
-          <p:cNvPr id="2" name="Title 1">
-            <a:extLst>
-              <a:ext uri="{FF2B5EF4-FFF2-40B4-BE49-F238E27FC236}">
-                <a16:creationId xmlns:a16="http://schemas.microsoft.com/office/drawing/2014/main" id="{59FC4DC4-E9ED-4E9A-A51D-8E28E11A4CA0}"/>
-              </a:ext>
-            </a:extLst>
-          </p:cNvPr>
-          <p:cNvSpPr>
-            <a:spLocks noGrp="1"/>
-          </p:cNvSpPr>
-          <p:nvPr>
-            <p:ph type="title"/>
-          </p:nvPr>
-        </p:nvSpPr>
-        <p:spPr/>
-        <p:txBody>
-          <a:bodyPr/>
-          <a:lstStyle/>
-          <a:p>
-            <a:r>
-              <a:rPr lang="fr-CA" dirty="0"/>
-              <a:t>Implémentation: Rentabilité</a:t>
-            </a:r>
-          </a:p>
-        </p:txBody>
-      </p:sp>
-      <p:pic>
-        <p:nvPicPr>
-          <p:cNvPr id="2050" name="Picture 2" descr="https://lh3.googleusercontent.com/K0UPldPkZmGP3MIMEEgPRzJ0OoQzlXb5nOVYu50SDtKTyeKtauJa_4PLYZ3A1pUe73-9vkVsb0SwuWgM-9ryx9wQyzZXTzMWAodfQfVd4X2rYXQOrL2NQ0AMQLiI7EVJXx1i5-z1Dw_rjdGSEaGeGxSrmxFH4BN1GK6ybd4JQma0W8fYmD-E_LwqAnmM1Yg3YVorxgY3rqCnKp_OYDBRXjvAzhK_shPdrk35NVjgMeo0g3jIiukjboaIp5MN-fnAdJTvt-bP0jVXgkoGHGc0rRpwYjRLmIXp_qmFKn4Pk0SeqEEyESau8hFUFs1heW7upWYLQvLhsg1fGUrSPYnNDeNCCRiSLPSJ0axVN22YsS0HmtJMZXxkfIZoNQhsU_0PwHSabI-p5oaFNXBu8s-H1QDfOHTFUr70oWOx7lRh-eVJ8ioVOGhnYvJFEV7dNbDrNyGTrUpnz9hXj5XxmoMmWQfDAo2GcbH-TZ3GrKcaiGjlClSwajk6RXGvhSEASKUZDOFiXjsCNSztn45sKB2_86wyi71xfjl_m9yC0WNEg2yFJeEpaqNwfx5_fTtQziVPd1z3pITK2EjsI2JgFqq4Jb8heybJLbqAO3v_FeXvUoXok3md7yO6wX0xim-v36p5JEhG7cTo6ZafJOBZL0n4tJLD=w950-h713-no">
-            <a:extLst>
-              <a:ext uri="{FF2B5EF4-FFF2-40B4-BE49-F238E27FC236}">
-                <a16:creationId xmlns:a16="http://schemas.microsoft.com/office/drawing/2014/main" id="{FBB17C17-DF7B-4832-88F7-C901A1DD851E}"/>
-              </a:ext>
-            </a:extLst>
-          </p:cNvPr>
-          <p:cNvPicPr>
-            <a:picLocks noChangeAspect="1" noChangeArrowheads="1"/>
-          </p:cNvPicPr>
-          <p:nvPr/>
-        </p:nvPicPr>
-        <p:blipFill>
-          <a:blip r:embed="rId2">
-            <a:extLst>
-              <a:ext uri="{28A0092B-C50C-407E-A947-70E740481C1C}">
-                <a14:useLocalDpi xmlns:a14="http://schemas.microsoft.com/office/drawing/2010/main" val="0"/>
-              </a:ext>
-            </a:extLst>
-          </a:blip>
-          <a:srcRect/>
-          <a:stretch>
-            <a:fillRect/>
-          </a:stretch>
-        </p:blipFill>
-        <p:spPr bwMode="auto">
-          <a:xfrm>
-            <a:off x="2030218" y="1722449"/>
-            <a:ext cx="2652403" cy="1987906"/>
-          </a:xfrm>
-          <a:prstGeom prst="rect">
-            <a:avLst/>
-          </a:prstGeom>
-          <a:noFill/>
-          <a:extLst>
-            <a:ext uri="{909E8E84-426E-40DD-AFC4-6F175D3DCCD1}">
-              <a14:hiddenFill xmlns:a14="http://schemas.microsoft.com/office/drawing/2010/main">
-                <a:solidFill>
-                  <a:srgbClr val="FFFFFF"/>
-                </a:solidFill>
-              </a14:hiddenFill>
-            </a:ext>
-          </a:extLst>
-        </p:spPr>
-      </p:pic>
-      <p:pic>
-        <p:nvPicPr>
-          <p:cNvPr id="2052" name="Picture 4" descr="https://lh3.googleusercontent.com/I2uytFuJHhZLjBHwNXVGfbQgxe0zP2brdWrtyl2peCUbKchvlSEjJRXcfiP8S8AGXn20pTUV1tECH0s1Q5VWW1R5BqJqbi6EGKTjMuRGQoVici5FteSr3oTQBQooj5yTz2XP0ufkeMlN8m_WRAxJTdXWNP2SwE94-Xbrac3DL_TsngbsnZjIgHZxEfebfgLTY5QxVGohnmc7kZ5sz_BAbCH3SZrcg9JiNVFTLbKO7xmfG-NVDDcyZ8DMErdtxQRGHafQmDrSe1j0MHuIOGi3kq_DFy2mfbvqvDwgutn8Dss9FxRG2_LcK_YnkHncygFoo8VlBlzyGhopgZxVudqtEYbdZYGHruNVFqGx0YqygEx0MvZJdYC7jIF1auQiNCtEuYcUq5y_vI0VhnXSlx91gyctb10xhSfjy4nG8YeGjZTohjirogw3KiIO2p89GxmYXRCqOO9IA_fAwokZM8tBIgzRdRZH6kjbG1R0qqbgmeoossFzTGsThFQlTfhk-RLBkK5Ggktkg-G7QL3x1kM6AUGgOxtnhCqMprpnjnXgbY3HVPeDAAyMVDEJYUwaIdgo3q53vjHOI3kYeKF_QCVr8ox8peCtwcQrS3WffSnhDbGw08FitICoqqR0cr80_EkmrXfdO6AYx2nt0ZM20q1pYIr3=w950-h713-no">
-            <a:extLst>
-              <a:ext uri="{FF2B5EF4-FFF2-40B4-BE49-F238E27FC236}">
-                <a16:creationId xmlns:a16="http://schemas.microsoft.com/office/drawing/2014/main" id="{4B5F8318-479B-4E9F-852D-99BCC26C1F62}"/>
-              </a:ext>
-            </a:extLst>
-          </p:cNvPr>
-          <p:cNvPicPr>
-            <a:picLocks noChangeAspect="1" noChangeArrowheads="1"/>
-          </p:cNvPicPr>
-          <p:nvPr/>
-        </p:nvPicPr>
-        <p:blipFill>
-          <a:blip r:embed="rId3">
-            <a:extLst>
-              <a:ext uri="{28A0092B-C50C-407E-A947-70E740481C1C}">
-                <a14:useLocalDpi xmlns:a14="http://schemas.microsoft.com/office/drawing/2010/main" val="0"/>
-              </a:ext>
-            </a:extLst>
-          </a:blip>
-          <a:srcRect/>
-          <a:stretch>
-            <a:fillRect/>
-          </a:stretch>
-        </p:blipFill>
-        <p:spPr bwMode="auto">
-          <a:xfrm>
-            <a:off x="2030218" y="3946604"/>
-            <a:ext cx="2652403" cy="1987906"/>
-          </a:xfrm>
-          <a:prstGeom prst="rect">
-            <a:avLst/>
-          </a:prstGeom>
-          <a:noFill/>
-          <a:extLst>
-            <a:ext uri="{909E8E84-426E-40DD-AFC4-6F175D3DCCD1}">
-              <a14:hiddenFill xmlns:a14="http://schemas.microsoft.com/office/drawing/2010/main">
-                <a:solidFill>
-                  <a:srgbClr val="FFFFFF"/>
-                </a:solidFill>
-              </a14:hiddenFill>
-            </a:ext>
-          </a:extLst>
-        </p:spPr>
-      </p:pic>
-      <p:pic>
-        <p:nvPicPr>
-          <p:cNvPr id="2054" name="Picture 6" descr="Image result for Lora">
-            <a:extLst>
-              <a:ext uri="{FF2B5EF4-FFF2-40B4-BE49-F238E27FC236}">
-                <a16:creationId xmlns:a16="http://schemas.microsoft.com/office/drawing/2014/main" id="{9F390F15-AA2B-4548-8AD4-FB34153ED56E}"/>
-              </a:ext>
-            </a:extLst>
-          </p:cNvPr>
-          <p:cNvPicPr>
-            <a:picLocks noChangeAspect="1" noChangeArrowheads="1"/>
-          </p:cNvPicPr>
-          <p:nvPr/>
-        </p:nvPicPr>
-        <p:blipFill>
-          <a:blip r:embed="rId4">
-            <a:extLst>
-              <a:ext uri="{28A0092B-C50C-407E-A947-70E740481C1C}">
-                <a14:useLocalDpi xmlns:a14="http://schemas.microsoft.com/office/drawing/2010/main" val="0"/>
-              </a:ext>
-            </a:extLst>
-          </a:blip>
-          <a:srcRect/>
-          <a:stretch>
-            <a:fillRect/>
-          </a:stretch>
-        </p:blipFill>
-        <p:spPr bwMode="auto">
-          <a:xfrm>
-            <a:off x="6271131" y="1469683"/>
-            <a:ext cx="2476500" cy="2476500"/>
-          </a:xfrm>
-          <a:prstGeom prst="rect">
-            <a:avLst/>
-          </a:prstGeom>
-          <a:noFill/>
-          <a:extLst>
-            <a:ext uri="{909E8E84-426E-40DD-AFC4-6F175D3DCCD1}">
-              <a14:hiddenFill xmlns:a14="http://schemas.microsoft.com/office/drawing/2010/main">
-                <a:solidFill>
-                  <a:srgbClr val="FFFFFF"/>
-                </a:solidFill>
-              </a14:hiddenFill>
-            </a:ext>
-          </a:extLst>
-        </p:spPr>
-      </p:pic>
-      <p:pic>
-        <p:nvPicPr>
-          <p:cNvPr id="2058" name="Picture 10" descr="Image result for bare pcb">
-            <a:extLst>
-              <a:ext uri="{FF2B5EF4-FFF2-40B4-BE49-F238E27FC236}">
-                <a16:creationId xmlns:a16="http://schemas.microsoft.com/office/drawing/2014/main" id="{25EBCA8D-1F86-41A5-9D2E-59B5AF6C9866}"/>
-              </a:ext>
-            </a:extLst>
-          </p:cNvPr>
-          <p:cNvPicPr>
-            <a:picLocks noChangeAspect="1" noChangeArrowheads="1"/>
-          </p:cNvPicPr>
-          <p:nvPr/>
-        </p:nvPicPr>
-        <p:blipFill>
-          <a:blip r:embed="rId5">
-            <a:extLst>
-              <a:ext uri="{28A0092B-C50C-407E-A947-70E740481C1C}">
-                <a14:useLocalDpi xmlns:a14="http://schemas.microsoft.com/office/drawing/2010/main" val="0"/>
-              </a:ext>
-            </a:extLst>
-          </a:blip>
-          <a:srcRect/>
-          <a:stretch>
-            <a:fillRect/>
-          </a:stretch>
-        </p:blipFill>
-        <p:spPr bwMode="auto">
-          <a:xfrm>
-            <a:off x="6317697" y="3765911"/>
-            <a:ext cx="1867999" cy="2053373"/>
-          </a:xfrm>
-          <a:prstGeom prst="rect">
-            <a:avLst/>
-          </a:prstGeom>
-          <a:noFill/>
-          <a:extLst>
-            <a:ext uri="{909E8E84-426E-40DD-AFC4-6F175D3DCCD1}">
-              <a14:hiddenFill xmlns:a14="http://schemas.microsoft.com/office/drawing/2010/main">
-                <a:solidFill>
-                  <a:srgbClr val="FFFFFF"/>
-                </a:solidFill>
-              </a14:hiddenFill>
-            </a:ext>
-          </a:extLst>
-        </p:spPr>
-      </p:pic>
-    </p:spTree>
-    <p:extLst>
-      <p:ext uri="{BB962C8B-B14F-4D97-AF65-F5344CB8AC3E}">
-        <p14:creationId xmlns:p14="http://schemas.microsoft.com/office/powerpoint/2010/main" val="1819236007"/>
-      </p:ext>
-    </p:extLst>
-  </p:cSld>
-  <p:clrMapOvr>
-    <a:masterClrMapping/>
-  </p:clrMapOvr>
-</p:sld>
-</file>
-
-<file path=ppt/slides/slide9.xml><?xml version="1.0" encoding="utf-8"?>
-<p:sld xmlns:a="http://schemas.openxmlformats.org/drawingml/2006/main" xmlns:r="http://schemas.openxmlformats.org/officeDocument/2006/relationships" xmlns:p="http://schemas.openxmlformats.org/presentationml/2006/main">
-  <p:cSld>
-    <p:spTree>
-      <p:nvGrpSpPr>
-        <p:cNvPr id="1" name=""/>
-        <p:cNvGrpSpPr/>
-        <p:nvPr/>
-      </p:nvGrpSpPr>
-      <p:grpSpPr>
-        <a:xfrm>
-          <a:off x="0" y="0"/>
-          <a:ext cx="0" cy="0"/>
-          <a:chOff x="0" y="0"/>
-          <a:chExt cx="0" cy="0"/>
-        </a:xfrm>
-      </p:grpSpPr>
-      <p:sp>
-        <p:nvSpPr>
-          <p:cNvPr id="2" name="Title 1">
-            <a:extLst>
-              <a:ext uri="{FF2B5EF4-FFF2-40B4-BE49-F238E27FC236}">
-                <a16:creationId xmlns:a16="http://schemas.microsoft.com/office/drawing/2014/main" id="{44B37F9B-C59D-4FE8-A1F1-61858FD27BCC}"/>
-              </a:ext>
-            </a:extLst>
-          </p:cNvPr>
-          <p:cNvSpPr>
-            <a:spLocks noGrp="1"/>
-          </p:cNvSpPr>
-          <p:nvPr>
-            <p:ph type="title"/>
-          </p:nvPr>
-        </p:nvSpPr>
-        <p:spPr/>
-        <p:txBody>
-          <a:bodyPr/>
-          <a:lstStyle/>
-          <a:p>
-            <a:r>
-              <a:rPr lang="fr-CA" dirty="0"/>
-              <a:t>Démonstration et période de questions</a:t>
-            </a:r>
-          </a:p>
-        </p:txBody>
-      </p:sp>
-      <p:pic>
-        <p:nvPicPr>
-          <p:cNvPr id="4" name="Content Placeholder 3">
-            <a:extLst>
-              <a:ext uri="{FF2B5EF4-FFF2-40B4-BE49-F238E27FC236}">
-                <a16:creationId xmlns:a16="http://schemas.microsoft.com/office/drawing/2014/main" id="{49A41C85-2E60-4FD4-9126-6B9D17FFEEA8}"/>
-              </a:ext>
-            </a:extLst>
-          </p:cNvPr>
-          <p:cNvPicPr>
-            <a:picLocks noChangeAspect="1"/>
-          </p:cNvPicPr>
-          <p:nvPr/>
-        </p:nvPicPr>
-        <p:blipFill>
-          <a:blip r:embed="rId2">
-            <a:extLst>
-              <a:ext uri="{28A0092B-C50C-407E-A947-70E740481C1C}">
-                <a14:useLocalDpi xmlns:a14="http://schemas.microsoft.com/office/drawing/2010/main" val="0"/>
-              </a:ext>
-            </a:extLst>
-          </a:blip>
-          <a:stretch>
-            <a:fillRect/>
-          </a:stretch>
-        </p:blipFill>
-        <p:spPr>
-          <a:xfrm>
-            <a:off x="3658579" y="1905000"/>
-            <a:ext cx="5123714" cy="3778250"/>
-          </a:xfrm>
-          <a:prstGeom prst="rect">
-            <a:avLst/>
-          </a:prstGeom>
-        </p:spPr>
-      </p:pic>
-    </p:spTree>
-    <p:extLst>
-      <p:ext uri="{BB962C8B-B14F-4D97-AF65-F5344CB8AC3E}">
-        <p14:creationId xmlns:p14="http://schemas.microsoft.com/office/powerpoint/2010/main" val="2113370033"/>
       </p:ext>
     </p:extLst>
   </p:cSld>

</xml_diff>

<commit_message>
Ajout de la partie sur la veille technologique
</commit_message>
<xml_diff>
--- a/Présentation Éthique.pptx
+++ b/Présentation Éthique.pptx
@@ -5,7 +5,7 @@
     <p:sldMasterId id="2147483884" r:id="rId1"/>
   </p:sldMasterIdLst>
   <p:notesMasterIdLst>
-    <p:notesMasterId r:id="rId15"/>
+    <p:notesMasterId r:id="rId18"/>
   </p:notesMasterIdLst>
   <p:sldIdLst>
     <p:sldId id="273" r:id="rId2"/>
@@ -17,10 +17,13 @@
     <p:sldId id="292" r:id="rId8"/>
     <p:sldId id="297" r:id="rId9"/>
     <p:sldId id="298" r:id="rId10"/>
-    <p:sldId id="299" r:id="rId11"/>
-    <p:sldId id="300" r:id="rId12"/>
-    <p:sldId id="301" r:id="rId13"/>
-    <p:sldId id="296" r:id="rId14"/>
+    <p:sldId id="304" r:id="rId11"/>
+    <p:sldId id="269" r:id="rId12"/>
+    <p:sldId id="274" r:id="rId13"/>
+    <p:sldId id="299" r:id="rId14"/>
+    <p:sldId id="300" r:id="rId15"/>
+    <p:sldId id="301" r:id="rId16"/>
+    <p:sldId id="296" r:id="rId17"/>
   </p:sldIdLst>
   <p:sldSz cx="12192000" cy="6858000"/>
   <p:notesSz cx="6858000" cy="9144000"/>
@@ -3048,13 +3051,8 @@
         <a:p>
           <a:r>
             <a:rPr lang="fr-CA" dirty="0"/>
-            <a:t>Assurer la rentabilité du </a:t>
+            <a:t>Assurer la rentabilité du produit</a:t>
           </a:r>
-          <a:r>
-            <a:rPr lang="fr-CA" dirty="0" err="1"/>
-            <a:t>poduit</a:t>
-          </a:r>
-          <a:endParaRPr lang="fr-CA" dirty="0"/>
         </a:p>
       </dgm:t>
     </dgm:pt>
@@ -4223,13 +4221,8 @@
           </a:pPr>
           <a:r>
             <a:rPr lang="fr-CA" sz="3500" kern="1200" dirty="0"/>
-            <a:t>Assurer la rentabilité du </a:t>
+            <a:t>Assurer la rentabilité du produit</a:t>
           </a:r>
-          <a:r>
-            <a:rPr lang="fr-CA" sz="3500" kern="1200" dirty="0" err="1"/>
-            <a:t>poduit</a:t>
-          </a:r>
-          <a:endParaRPr lang="fr-CA" sz="3500" kern="1200" dirty="0"/>
         </a:p>
       </dsp:txBody>
       <dsp:txXfrm rot="10800000">
@@ -7974,7 +7967,7 @@
           <a:p>
             <a:fld id="{1E0AA58F-6E0A-4091-9E6B-3FF929A5CB43}" type="slidenum">
               <a:rPr lang="fr-CA" smtClean="0"/>
-              <a:t>‹N°›</a:t>
+              <a:t>‹#›</a:t>
             </a:fld>
             <a:endParaRPr lang="fr-CA"/>
           </a:p>
@@ -8403,7 +8396,7 @@
           <a:p>
             <a:fld id="{2849D840-EB1A-4BD0-9BBF-65787F9A4F51}" type="slidenum">
               <a:rPr lang="en-CA" smtClean="0"/>
-              <a:t>‹N°›</a:t>
+              <a:t>‹#›</a:t>
             </a:fld>
             <a:endParaRPr lang="en-CA"/>
           </a:p>
@@ -8756,7 +8749,7 @@
           <a:p>
             <a:fld id="{2849D840-EB1A-4BD0-9BBF-65787F9A4F51}" type="slidenum">
               <a:rPr lang="en-CA" smtClean="0"/>
-              <a:t>‹N°›</a:t>
+              <a:t>‹#›</a:t>
             </a:fld>
             <a:endParaRPr lang="en-CA"/>
           </a:p>
@@ -9097,7 +9090,7 @@
           <a:p>
             <a:fld id="{2849D840-EB1A-4BD0-9BBF-65787F9A4F51}" type="slidenum">
               <a:rPr lang="en-CA" smtClean="0"/>
-              <a:t>‹N°›</a:t>
+              <a:t>‹#›</a:t>
             </a:fld>
             <a:endParaRPr lang="en-CA"/>
           </a:p>
@@ -9501,7 +9494,7 @@
           <a:p>
             <a:fld id="{2849D840-EB1A-4BD0-9BBF-65787F9A4F51}" type="slidenum">
               <a:rPr lang="en-CA" smtClean="0"/>
-              <a:t>‹N°›</a:t>
+              <a:t>‹#›</a:t>
             </a:fld>
             <a:endParaRPr lang="en-CA"/>
           </a:p>
@@ -9840,7 +9833,7 @@
           <a:p>
             <a:fld id="{2849D840-EB1A-4BD0-9BBF-65787F9A4F51}" type="slidenum">
               <a:rPr lang="en-CA" smtClean="0"/>
-              <a:t>‹N°›</a:t>
+              <a:t>‹#›</a:t>
             </a:fld>
             <a:endParaRPr lang="en-CA"/>
           </a:p>
@@ -10163,7 +10156,7 @@
           <a:p>
             <a:fld id="{2849D840-EB1A-4BD0-9BBF-65787F9A4F51}" type="slidenum">
               <a:rPr lang="en-CA" smtClean="0"/>
-              <a:t>‹N°›</a:t>
+              <a:t>‹#›</a:t>
             </a:fld>
             <a:endParaRPr lang="en-CA"/>
           </a:p>
@@ -10562,7 +10555,7 @@
           <a:p>
             <a:fld id="{2849D840-EB1A-4BD0-9BBF-65787F9A4F51}" type="slidenum">
               <a:rPr lang="en-CA" smtClean="0"/>
-              <a:t>‹N°›</a:t>
+              <a:t>‹#›</a:t>
             </a:fld>
             <a:endParaRPr lang="en-CA"/>
           </a:p>
@@ -10817,7 +10810,7 @@
           <a:p>
             <a:fld id="{2849D840-EB1A-4BD0-9BBF-65787F9A4F51}" type="slidenum">
               <a:rPr lang="en-CA" smtClean="0"/>
-              <a:t>‹N°›</a:t>
+              <a:t>‹#›</a:t>
             </a:fld>
             <a:endParaRPr lang="en-CA"/>
           </a:p>
@@ -11082,7 +11075,7 @@
           <a:p>
             <a:fld id="{2849D840-EB1A-4BD0-9BBF-65787F9A4F51}" type="slidenum">
               <a:rPr lang="en-CA" smtClean="0"/>
-              <a:t>‹N°›</a:t>
+              <a:t>‹#›</a:t>
             </a:fld>
             <a:endParaRPr lang="en-CA"/>
           </a:p>
@@ -11347,7 +11340,7 @@
           <a:p>
             <a:fld id="{2849D840-EB1A-4BD0-9BBF-65787F9A4F51}" type="slidenum">
               <a:rPr lang="en-CA" smtClean="0"/>
-              <a:t>‹N°›</a:t>
+              <a:t>‹#›</a:t>
             </a:fld>
             <a:endParaRPr lang="en-CA"/>
           </a:p>
@@ -11648,7 +11641,7 @@
           <a:p>
             <a:fld id="{2849D840-EB1A-4BD0-9BBF-65787F9A4F51}" type="slidenum">
               <a:rPr lang="en-CA" smtClean="0"/>
-              <a:t>‹N°›</a:t>
+              <a:t>‹#›</a:t>
             </a:fld>
             <a:endParaRPr lang="en-CA"/>
           </a:p>
@@ -11985,7 +11978,7 @@
           <a:p>
             <a:fld id="{2849D840-EB1A-4BD0-9BBF-65787F9A4F51}" type="slidenum">
               <a:rPr lang="en-CA" smtClean="0"/>
-              <a:t>‹N°›</a:t>
+              <a:t>‹#›</a:t>
             </a:fld>
             <a:endParaRPr lang="en-CA"/>
           </a:p>
@@ -12311,7 +12304,7 @@
           <a:p>
             <a:fld id="{2849D840-EB1A-4BD0-9BBF-65787F9A4F51}" type="slidenum">
               <a:rPr lang="en-CA" smtClean="0"/>
-              <a:t>‹N°›</a:t>
+              <a:t>‹#›</a:t>
             </a:fld>
             <a:endParaRPr lang="en-CA"/>
           </a:p>
@@ -12776,7 +12769,7 @@
           <a:p>
             <a:fld id="{2849D840-EB1A-4BD0-9BBF-65787F9A4F51}" type="slidenum">
               <a:rPr lang="en-CA" smtClean="0"/>
-              <a:t>‹N°›</a:t>
+              <a:t>‹#›</a:t>
             </a:fld>
             <a:endParaRPr lang="en-CA"/>
           </a:p>
@@ -12984,7 +12977,7 @@
           <a:p>
             <a:fld id="{2849D840-EB1A-4BD0-9BBF-65787F9A4F51}" type="slidenum">
               <a:rPr lang="en-CA" smtClean="0"/>
-              <a:t>‹N°›</a:t>
+              <a:t>‹#›</a:t>
             </a:fld>
             <a:endParaRPr lang="en-CA"/>
           </a:p>
@@ -13164,7 +13157,7 @@
           <a:p>
             <a:fld id="{2849D840-EB1A-4BD0-9BBF-65787F9A4F51}" type="slidenum">
               <a:rPr lang="en-CA" smtClean="0"/>
-              <a:t>‹N°›</a:t>
+              <a:t>‹#›</a:t>
             </a:fld>
             <a:endParaRPr lang="en-CA"/>
           </a:p>
@@ -13500,7 +13493,7 @@
           <a:p>
             <a:fld id="{2849D840-EB1A-4BD0-9BBF-65787F9A4F51}" type="slidenum">
               <a:rPr lang="en-CA" smtClean="0"/>
-              <a:t>‹N°›</a:t>
+              <a:t>‹#›</a:t>
             </a:fld>
             <a:endParaRPr lang="en-CA"/>
           </a:p>
@@ -15572,7 +15565,7 @@
           <a:p>
             <a:fld id="{2849D840-EB1A-4BD0-9BBF-65787F9A4F51}" type="slidenum">
               <a:rPr lang="en-CA" smtClean="0"/>
-              <a:t>‹N°›</a:t>
+              <a:t>‹#›</a:t>
             </a:fld>
             <a:endParaRPr lang="en-CA"/>
           </a:p>
@@ -16183,6 +16176,445 @@
           <p:cNvPr id="2" name="Title 1">
             <a:extLst>
               <a:ext uri="{FF2B5EF4-FFF2-40B4-BE49-F238E27FC236}">
+                <a16:creationId xmlns:a16="http://schemas.microsoft.com/office/drawing/2014/main" id="{532BB36A-66E0-4644-AB8F-8DCB79605DD1}"/>
+              </a:ext>
+            </a:extLst>
+          </p:cNvPr>
+          <p:cNvSpPr>
+            <a:spLocks noGrp="1"/>
+          </p:cNvSpPr>
+          <p:nvPr>
+            <p:ph type="title"/>
+          </p:nvPr>
+        </p:nvSpPr>
+        <p:spPr/>
+        <p:txBody>
+          <a:bodyPr/>
+          <a:lstStyle/>
+          <a:p>
+            <a:r>
+              <a:rPr lang="fr-CA" dirty="0"/>
+              <a:t>Veille – Points à considérer</a:t>
+            </a:r>
+            <a:br>
+              <a:rPr lang="fr-CA" dirty="0"/>
+            </a:br>
+            <a:endParaRPr lang="fr-CA" dirty="0"/>
+          </a:p>
+        </p:txBody>
+      </p:sp>
+      <p:sp>
+        <p:nvSpPr>
+          <p:cNvPr id="4" name="Content Placeholder 3">
+            <a:extLst>
+              <a:ext uri="{FF2B5EF4-FFF2-40B4-BE49-F238E27FC236}">
+                <a16:creationId xmlns:a16="http://schemas.microsoft.com/office/drawing/2014/main" id="{1BEF1B98-B4FA-4650-897D-714D995AABAC}"/>
+              </a:ext>
+            </a:extLst>
+          </p:cNvPr>
+          <p:cNvSpPr>
+            <a:spLocks noGrp="1"/>
+          </p:cNvSpPr>
+          <p:nvPr>
+            <p:ph idx="1"/>
+          </p:nvPr>
+        </p:nvSpPr>
+        <p:spPr/>
+        <p:txBody>
+          <a:bodyPr/>
+          <a:lstStyle/>
+          <a:p>
+            <a:r>
+              <a:rPr lang="fr-CA" dirty="0"/>
+              <a:t>Conditions de survie/besoins des abeilles</a:t>
+            </a:r>
+          </a:p>
+          <a:p>
+            <a:pPr lvl="1"/>
+            <a:r>
+              <a:rPr lang="fr-CA" dirty="0"/>
+              <a:t>Température</a:t>
+            </a:r>
+          </a:p>
+          <a:p>
+            <a:pPr lvl="1"/>
+            <a:r>
+              <a:rPr lang="fr-CA" dirty="0"/>
+              <a:t>Accès à l’eau</a:t>
+            </a:r>
+          </a:p>
+          <a:p>
+            <a:pPr lvl="1"/>
+            <a:r>
+              <a:rPr lang="fr-CA" dirty="0"/>
+              <a:t>Vents tenus au minimum</a:t>
+            </a:r>
+          </a:p>
+          <a:p>
+            <a:r>
+              <a:rPr lang="fr-CA" dirty="0"/>
+              <a:t>Conditions de travail/requis de l’apiculteur</a:t>
+            </a:r>
+          </a:p>
+          <a:p>
+            <a:pPr lvl="1"/>
+            <a:r>
+              <a:rPr lang="fr-CA" dirty="0"/>
+              <a:t>Détection d’essaimage</a:t>
+            </a:r>
+          </a:p>
+          <a:p>
+            <a:pPr lvl="1"/>
+            <a:r>
+              <a:rPr lang="fr-CA" dirty="0"/>
+              <a:t>Poids de la ruche </a:t>
+            </a:r>
+            <a:r>
+              <a:rPr lang="fr-CA" dirty="0">
+                <a:cs typeface="Calibri" panose="020F0502020204030204" pitchFamily="34" charset="0"/>
+              </a:rPr>
+              <a:t>→ Volume de miel</a:t>
+            </a:r>
+            <a:endParaRPr lang="fr-CA" dirty="0"/>
+          </a:p>
+          <a:p>
+            <a:r>
+              <a:rPr lang="fr-CA" dirty="0"/>
+              <a:t>Produits existants</a:t>
+            </a:r>
+          </a:p>
+          <a:p>
+            <a:pPr lvl="1"/>
+            <a:r>
+              <a:rPr lang="fr-CA" dirty="0"/>
+              <a:t>Prix élevé</a:t>
+            </a:r>
+          </a:p>
+        </p:txBody>
+      </p:sp>
+    </p:spTree>
+    <p:extLst>
+      <p:ext uri="{BB962C8B-B14F-4D97-AF65-F5344CB8AC3E}">
+        <p14:creationId xmlns:p14="http://schemas.microsoft.com/office/powerpoint/2010/main" val="2646153592"/>
+      </p:ext>
+    </p:extLst>
+  </p:cSld>
+  <p:clrMapOvr>
+    <a:masterClrMapping/>
+  </p:clrMapOvr>
+</p:sld>
+</file>
+
+<file path=ppt/slides/slide11.xml><?xml version="1.0" encoding="utf-8"?>
+<p:sld xmlns:a="http://schemas.openxmlformats.org/drawingml/2006/main" xmlns:r="http://schemas.openxmlformats.org/officeDocument/2006/relationships" xmlns:p="http://schemas.openxmlformats.org/presentationml/2006/main">
+  <p:cSld>
+    <p:spTree>
+      <p:nvGrpSpPr>
+        <p:cNvPr id="1" name=""/>
+        <p:cNvGrpSpPr/>
+        <p:nvPr/>
+      </p:nvGrpSpPr>
+      <p:grpSpPr>
+        <a:xfrm>
+          <a:off x="0" y="0"/>
+          <a:ext cx="0" cy="0"/>
+          <a:chOff x="0" y="0"/>
+          <a:chExt cx="0" cy="0"/>
+        </a:xfrm>
+      </p:grpSpPr>
+      <p:sp>
+        <p:nvSpPr>
+          <p:cNvPr id="2" name="Title 1">
+            <a:extLst>
+              <a:ext uri="{FF2B5EF4-FFF2-40B4-BE49-F238E27FC236}">
+                <a16:creationId xmlns:a16="http://schemas.microsoft.com/office/drawing/2014/main" id="{532BB36A-66E0-4644-AB8F-8DCB79605DD1}"/>
+              </a:ext>
+            </a:extLst>
+          </p:cNvPr>
+          <p:cNvSpPr>
+            <a:spLocks noGrp="1"/>
+          </p:cNvSpPr>
+          <p:nvPr>
+            <p:ph type="title"/>
+          </p:nvPr>
+        </p:nvSpPr>
+        <p:spPr/>
+        <p:txBody>
+          <a:bodyPr/>
+          <a:lstStyle/>
+          <a:p>
+            <a:r>
+              <a:rPr lang="en-CA" dirty="0" err="1"/>
+              <a:t>Entrevues</a:t>
+            </a:r>
+            <a:r>
+              <a:rPr lang="en-CA" dirty="0"/>
+              <a:t> </a:t>
+            </a:r>
+            <a:r>
+              <a:rPr lang="en-CA" dirty="0" err="1"/>
+              <a:t>potentielles</a:t>
+            </a:r>
+            <a:endParaRPr lang="en-CA" dirty="0"/>
+          </a:p>
+        </p:txBody>
+      </p:sp>
+      <p:sp>
+        <p:nvSpPr>
+          <p:cNvPr id="4" name="Content Placeholder 3">
+            <a:extLst>
+              <a:ext uri="{FF2B5EF4-FFF2-40B4-BE49-F238E27FC236}">
+                <a16:creationId xmlns:a16="http://schemas.microsoft.com/office/drawing/2014/main" id="{561C8BA9-4D5B-4077-A438-4CBFA09C3FD0}"/>
+              </a:ext>
+            </a:extLst>
+          </p:cNvPr>
+          <p:cNvSpPr>
+            <a:spLocks noGrp="1"/>
+          </p:cNvSpPr>
+          <p:nvPr>
+            <p:ph idx="1"/>
+          </p:nvPr>
+        </p:nvSpPr>
+        <p:spPr/>
+        <p:txBody>
+          <a:bodyPr>
+            <a:normAutofit/>
+          </a:bodyPr>
+          <a:lstStyle/>
+          <a:p>
+            <a:r>
+              <a:rPr lang="fr-CA" dirty="0"/>
+              <a:t>Profil-type #1 : Apiculteur</a:t>
+            </a:r>
+          </a:p>
+          <a:p>
+            <a:pPr lvl="1"/>
+            <a:r>
+              <a:rPr lang="fr-CA" dirty="0"/>
+              <a:t>Caractéristiques</a:t>
+            </a:r>
+          </a:p>
+          <a:p>
+            <a:pPr lvl="2"/>
+            <a:r>
+              <a:rPr lang="fr-CA" dirty="0"/>
+              <a:t>Vivant principalement de l’apiculture</a:t>
+            </a:r>
+          </a:p>
+          <a:p>
+            <a:pPr lvl="1"/>
+            <a:r>
+              <a:rPr lang="fr-CA" dirty="0"/>
+              <a:t>Questions</a:t>
+            </a:r>
+          </a:p>
+          <a:p>
+            <a:pPr lvl="2"/>
+            <a:r>
+              <a:rPr lang="fr-CA" dirty="0"/>
+              <a:t>Type/nombre de ruches</a:t>
+            </a:r>
+          </a:p>
+          <a:p>
+            <a:pPr lvl="2"/>
+            <a:r>
+              <a:rPr lang="fr-CA" dirty="0"/>
+              <a:t>Type d’exploitation</a:t>
+            </a:r>
+          </a:p>
+          <a:p>
+            <a:pPr lvl="2"/>
+            <a:r>
+              <a:rPr lang="fr-CA" dirty="0"/>
+              <a:t>Routine de récolte du miel</a:t>
+            </a:r>
+          </a:p>
+          <a:p>
+            <a:pPr lvl="2"/>
+            <a:r>
+              <a:rPr lang="fr-CA" dirty="0"/>
+              <a:t>Ouverture face à la technologie</a:t>
+            </a:r>
+          </a:p>
+        </p:txBody>
+      </p:sp>
+    </p:spTree>
+    <p:extLst>
+      <p:ext uri="{BB962C8B-B14F-4D97-AF65-F5344CB8AC3E}">
+        <p14:creationId xmlns:p14="http://schemas.microsoft.com/office/powerpoint/2010/main" val="1402609215"/>
+      </p:ext>
+    </p:extLst>
+  </p:cSld>
+  <p:clrMapOvr>
+    <a:masterClrMapping/>
+  </p:clrMapOvr>
+</p:sld>
+</file>
+
+<file path=ppt/slides/slide12.xml><?xml version="1.0" encoding="utf-8"?>
+<p:sld xmlns:a="http://schemas.openxmlformats.org/drawingml/2006/main" xmlns:r="http://schemas.openxmlformats.org/officeDocument/2006/relationships" xmlns:p="http://schemas.openxmlformats.org/presentationml/2006/main">
+  <p:cSld>
+    <p:spTree>
+      <p:nvGrpSpPr>
+        <p:cNvPr id="1" name=""/>
+        <p:cNvGrpSpPr/>
+        <p:nvPr/>
+      </p:nvGrpSpPr>
+      <p:grpSpPr>
+        <a:xfrm>
+          <a:off x="0" y="0"/>
+          <a:ext cx="0" cy="0"/>
+          <a:chOff x="0" y="0"/>
+          <a:chExt cx="0" cy="0"/>
+        </a:xfrm>
+      </p:grpSpPr>
+      <p:sp>
+        <p:nvSpPr>
+          <p:cNvPr id="2" name="Title 1">
+            <a:extLst>
+              <a:ext uri="{FF2B5EF4-FFF2-40B4-BE49-F238E27FC236}">
+                <a16:creationId xmlns:a16="http://schemas.microsoft.com/office/drawing/2014/main" id="{532BB36A-66E0-4644-AB8F-8DCB79605DD1}"/>
+              </a:ext>
+            </a:extLst>
+          </p:cNvPr>
+          <p:cNvSpPr>
+            <a:spLocks noGrp="1"/>
+          </p:cNvSpPr>
+          <p:nvPr>
+            <p:ph type="title"/>
+          </p:nvPr>
+        </p:nvSpPr>
+        <p:spPr/>
+        <p:txBody>
+          <a:bodyPr/>
+          <a:lstStyle/>
+          <a:p>
+            <a:r>
+              <a:rPr lang="en-CA" dirty="0" err="1"/>
+              <a:t>Entrevues</a:t>
+            </a:r>
+            <a:r>
+              <a:rPr lang="en-CA" dirty="0"/>
+              <a:t> </a:t>
+            </a:r>
+            <a:r>
+              <a:rPr lang="en-CA" dirty="0" err="1"/>
+              <a:t>potentielles</a:t>
+            </a:r>
+            <a:endParaRPr lang="en-CA" dirty="0"/>
+          </a:p>
+        </p:txBody>
+      </p:sp>
+      <p:sp>
+        <p:nvSpPr>
+          <p:cNvPr id="4" name="Content Placeholder 3">
+            <a:extLst>
+              <a:ext uri="{FF2B5EF4-FFF2-40B4-BE49-F238E27FC236}">
+                <a16:creationId xmlns:a16="http://schemas.microsoft.com/office/drawing/2014/main" id="{561C8BA9-4D5B-4077-A438-4CBFA09C3FD0}"/>
+              </a:ext>
+            </a:extLst>
+          </p:cNvPr>
+          <p:cNvSpPr>
+            <a:spLocks noGrp="1"/>
+          </p:cNvSpPr>
+          <p:nvPr>
+            <p:ph idx="1"/>
+          </p:nvPr>
+        </p:nvSpPr>
+        <p:spPr/>
+        <p:txBody>
+          <a:bodyPr>
+            <a:normAutofit/>
+          </a:bodyPr>
+          <a:lstStyle/>
+          <a:p>
+            <a:r>
+              <a:rPr lang="fr-CA" dirty="0"/>
+              <a:t>Profil-type #2 : Agriculteur</a:t>
+            </a:r>
+          </a:p>
+          <a:p>
+            <a:pPr lvl="1"/>
+            <a:r>
+              <a:rPr lang="fr-CA" dirty="0"/>
+              <a:t>Caractéristiques</a:t>
+            </a:r>
+          </a:p>
+          <a:p>
+            <a:pPr lvl="2"/>
+            <a:r>
+              <a:rPr lang="fr-CA" dirty="0"/>
+              <a:t>Jeune et ouvert aux nouvelles technologies</a:t>
+            </a:r>
+          </a:p>
+          <a:p>
+            <a:pPr lvl="1"/>
+            <a:r>
+              <a:rPr lang="fr-CA" dirty="0"/>
+              <a:t>Questions</a:t>
+            </a:r>
+          </a:p>
+          <a:p>
+            <a:pPr lvl="2"/>
+            <a:r>
+              <a:rPr lang="fr-CA" dirty="0"/>
+              <a:t>Opinions sur les ruches sur les fermes</a:t>
+            </a:r>
+          </a:p>
+          <a:p>
+            <a:pPr lvl="2"/>
+            <a:r>
+              <a:rPr lang="fr-CA" dirty="0"/>
+              <a:t>Opinions sur l’utilisation de technologies dans le milieu agricole</a:t>
+            </a:r>
+          </a:p>
+          <a:p>
+            <a:pPr lvl="2"/>
+            <a:r>
+              <a:rPr lang="fr-CA" dirty="0"/>
+              <a:t>Opinion sur le produit de ruche intelligente</a:t>
+            </a:r>
+          </a:p>
+          <a:p>
+            <a:endParaRPr lang="fr-CA" dirty="0"/>
+          </a:p>
+        </p:txBody>
+      </p:sp>
+    </p:spTree>
+    <p:extLst>
+      <p:ext uri="{BB962C8B-B14F-4D97-AF65-F5344CB8AC3E}">
+        <p14:creationId xmlns:p14="http://schemas.microsoft.com/office/powerpoint/2010/main" val="4965632"/>
+      </p:ext>
+    </p:extLst>
+  </p:cSld>
+  <p:clrMapOvr>
+    <a:masterClrMapping/>
+  </p:clrMapOvr>
+</p:sld>
+</file>
+
+<file path=ppt/slides/slide13.xml><?xml version="1.0" encoding="utf-8"?>
+<p:sld xmlns:a="http://schemas.openxmlformats.org/drawingml/2006/main" xmlns:r="http://schemas.openxmlformats.org/officeDocument/2006/relationships" xmlns:p="http://schemas.openxmlformats.org/presentationml/2006/main">
+  <p:cSld>
+    <p:spTree>
+      <p:nvGrpSpPr>
+        <p:cNvPr id="1" name=""/>
+        <p:cNvGrpSpPr/>
+        <p:nvPr/>
+      </p:nvGrpSpPr>
+      <p:grpSpPr>
+        <a:xfrm>
+          <a:off x="0" y="0"/>
+          <a:ext cx="0" cy="0"/>
+          <a:chOff x="0" y="0"/>
+          <a:chExt cx="0" cy="0"/>
+        </a:xfrm>
+      </p:grpSpPr>
+      <p:sp>
+        <p:nvSpPr>
+          <p:cNvPr id="2" name="Title 1">
+            <a:extLst>
+              <a:ext uri="{FF2B5EF4-FFF2-40B4-BE49-F238E27FC236}">
                 <a16:creationId xmlns:a16="http://schemas.microsoft.com/office/drawing/2014/main" id="{CA8AAA69-A4CF-4A1A-9124-055A3A40C899}"/>
               </a:ext>
             </a:extLst>
@@ -16313,7 +16745,7 @@
 </p:sld>
 </file>
 
-<file path=ppt/slides/slide11.xml><?xml version="1.0" encoding="utf-8"?>
+<file path=ppt/slides/slide14.xml><?xml version="1.0" encoding="utf-8"?>
 <p:sld xmlns:a="http://schemas.openxmlformats.org/drawingml/2006/main" xmlns:r="http://schemas.openxmlformats.org/officeDocument/2006/relationships" xmlns:p="http://schemas.openxmlformats.org/presentationml/2006/main">
   <p:cSld>
     <p:spTree>
@@ -16431,7 +16863,7 @@
 </p:sld>
 </file>
 
-<file path=ppt/slides/slide12.xml><?xml version="1.0" encoding="utf-8"?>
+<file path=ppt/slides/slide15.xml><?xml version="1.0" encoding="utf-8"?>
 <p:sld xmlns:a="http://schemas.openxmlformats.org/drawingml/2006/main" xmlns:r="http://schemas.openxmlformats.org/officeDocument/2006/relationships" xmlns:p="http://schemas.openxmlformats.org/presentationml/2006/main">
   <p:cSld>
     <p:spTree>
@@ -16677,7 +17109,7 @@
 </p:sld>
 </file>
 
-<file path=ppt/slides/slide13.xml><?xml version="1.0" encoding="utf-8"?>
+<file path=ppt/slides/slide16.xml><?xml version="1.0" encoding="utf-8"?>
 <p:sld xmlns:a="http://schemas.openxmlformats.org/drawingml/2006/main" xmlns:r="http://schemas.openxmlformats.org/officeDocument/2006/relationships" xmlns:p="http://schemas.openxmlformats.org/presentationml/2006/main">
   <p:cSld>
     <p:spTree>
@@ -18561,7 +18993,7 @@
           <p:nvPr>
             <p:extLst>
               <p:ext uri="{D42A27DB-BD31-4B8C-83A1-F6EECF244321}">
-                <p14:modId xmlns:p14="http://schemas.microsoft.com/office/powerpoint/2010/main" val="3475517507"/>
+                <p14:modId xmlns:p14="http://schemas.microsoft.com/office/powerpoint/2010/main" val="3775440030"/>
               </p:ext>
             </p:extLst>
           </p:nvPr>

</xml_diff>

<commit_message>
Ajout de la section 2
</commit_message>
<xml_diff>
--- a/Présentation Éthique.pptx
+++ b/Présentation Éthique.pptx
@@ -5,7 +5,7 @@
     <p:sldMasterId id="2147483884" r:id="rId1"/>
   </p:sldMasterIdLst>
   <p:notesMasterIdLst>
-    <p:notesMasterId r:id="rId18"/>
+    <p:notesMasterId r:id="rId19"/>
   </p:notesMasterIdLst>
   <p:sldIdLst>
     <p:sldId id="273" r:id="rId2"/>
@@ -15,15 +15,16 @@
     <p:sldId id="257" r:id="rId6"/>
     <p:sldId id="268" r:id="rId7"/>
     <p:sldId id="292" r:id="rId8"/>
-    <p:sldId id="297" r:id="rId9"/>
-    <p:sldId id="298" r:id="rId10"/>
-    <p:sldId id="304" r:id="rId11"/>
-    <p:sldId id="269" r:id="rId12"/>
-    <p:sldId id="274" r:id="rId13"/>
-    <p:sldId id="299" r:id="rId14"/>
-    <p:sldId id="300" r:id="rId15"/>
-    <p:sldId id="301" r:id="rId16"/>
-    <p:sldId id="296" r:id="rId17"/>
+    <p:sldId id="305" r:id="rId9"/>
+    <p:sldId id="297" r:id="rId10"/>
+    <p:sldId id="298" r:id="rId11"/>
+    <p:sldId id="304" r:id="rId12"/>
+    <p:sldId id="269" r:id="rId13"/>
+    <p:sldId id="274" r:id="rId14"/>
+    <p:sldId id="299" r:id="rId15"/>
+    <p:sldId id="300" r:id="rId16"/>
+    <p:sldId id="301" r:id="rId17"/>
+    <p:sldId id="296" r:id="rId18"/>
   </p:sldIdLst>
   <p:sldSz cx="12192000" cy="6858000"/>
   <p:notesSz cx="6858000" cy="9144000"/>
@@ -16176,7 +16177,7 @@
           <p:cNvPr id="2" name="Title 1">
             <a:extLst>
               <a:ext uri="{FF2B5EF4-FFF2-40B4-BE49-F238E27FC236}">
-                <a16:creationId xmlns:a16="http://schemas.microsoft.com/office/drawing/2014/main" id="{532BB36A-66E0-4644-AB8F-8DCB79605DD1}"/>
+                <a16:creationId xmlns:a16="http://schemas.microsoft.com/office/drawing/2014/main" id="{8EA0546E-ECF2-4914-9E36-FE0E3B5746E7}"/>
               </a:ext>
             </a:extLst>
           </p:cNvPr>
@@ -16194,108 +16195,43 @@
           <a:p>
             <a:r>
               <a:rPr lang="fr-CA" dirty="0"/>
-              <a:t>Veille – Points à considérer</a:t>
-            </a:r>
-            <a:br>
-              <a:rPr lang="fr-CA" dirty="0"/>
-            </a:br>
-            <a:endParaRPr lang="fr-CA" dirty="0"/>
+              <a:t>Priorisation des défis</a:t>
+            </a:r>
           </a:p>
         </p:txBody>
       </p:sp>
-      <p:sp>
-        <p:nvSpPr>
-          <p:cNvPr id="4" name="Content Placeholder 3">
+      <p:graphicFrame>
+        <p:nvGraphicFramePr>
+          <p:cNvPr id="4" name="Diagram 3">
             <a:extLst>
               <a:ext uri="{FF2B5EF4-FFF2-40B4-BE49-F238E27FC236}">
-                <a16:creationId xmlns:a16="http://schemas.microsoft.com/office/drawing/2014/main" id="{1BEF1B98-B4FA-4650-897D-714D995AABAC}"/>
+                <a16:creationId xmlns:a16="http://schemas.microsoft.com/office/drawing/2014/main" id="{411E8622-A333-401D-82C1-957ACAA21FF3}"/>
               </a:ext>
             </a:extLst>
           </p:cNvPr>
-          <p:cNvSpPr>
-            <a:spLocks noGrp="1"/>
-          </p:cNvSpPr>
+          <p:cNvGraphicFramePr/>
           <p:nvPr>
-            <p:ph idx="1"/>
+            <p:extLst>
+              <p:ext uri="{D42A27DB-BD31-4B8C-83A1-F6EECF244321}">
+                <p14:modId xmlns:p14="http://schemas.microsoft.com/office/powerpoint/2010/main" val="3775440030"/>
+              </p:ext>
+            </p:extLst>
           </p:nvPr>
-        </p:nvSpPr>
-        <p:spPr/>
-        <p:txBody>
-          <a:bodyPr/>
-          <a:lstStyle/>
-          <a:p>
-            <a:r>
-              <a:rPr lang="fr-CA" dirty="0"/>
-              <a:t>Conditions de survie/besoins des abeilles</a:t>
-            </a:r>
-          </a:p>
-          <a:p>
-            <a:pPr lvl="1"/>
-            <a:r>
-              <a:rPr lang="fr-CA" dirty="0"/>
-              <a:t>Température</a:t>
-            </a:r>
-          </a:p>
-          <a:p>
-            <a:pPr lvl="1"/>
-            <a:r>
-              <a:rPr lang="fr-CA" dirty="0"/>
-              <a:t>Accès à l’eau</a:t>
-            </a:r>
-          </a:p>
-          <a:p>
-            <a:pPr lvl="1"/>
-            <a:r>
-              <a:rPr lang="fr-CA" dirty="0"/>
-              <a:t>Vents tenus au minimum</a:t>
-            </a:r>
-          </a:p>
-          <a:p>
-            <a:r>
-              <a:rPr lang="fr-CA" dirty="0"/>
-              <a:t>Conditions de travail/requis de l’apiculteur</a:t>
-            </a:r>
-          </a:p>
-          <a:p>
-            <a:pPr lvl="1"/>
-            <a:r>
-              <a:rPr lang="fr-CA" dirty="0"/>
-              <a:t>Détection d’essaimage</a:t>
-            </a:r>
-          </a:p>
-          <a:p>
-            <a:pPr lvl="1"/>
-            <a:r>
-              <a:rPr lang="fr-CA" dirty="0"/>
-              <a:t>Poids de la ruche </a:t>
-            </a:r>
-            <a:r>
-              <a:rPr lang="fr-CA" dirty="0">
-                <a:cs typeface="Calibri" panose="020F0502020204030204" pitchFamily="34" charset="0"/>
-              </a:rPr>
-              <a:t>→ Volume de miel</a:t>
-            </a:r>
-            <a:endParaRPr lang="fr-CA" dirty="0"/>
-          </a:p>
-          <a:p>
-            <a:r>
-              <a:rPr lang="fr-CA" dirty="0"/>
-              <a:t>Produits existants</a:t>
-            </a:r>
-          </a:p>
-          <a:p>
-            <a:pPr lvl="1"/>
-            <a:r>
-              <a:rPr lang="fr-CA" dirty="0"/>
-              <a:t>Prix élevé</a:t>
-            </a:r>
-          </a:p>
-        </p:txBody>
-      </p:sp>
+        </p:nvGraphicFramePr>
+        <p:xfrm>
+          <a:off x="2032000" y="1670537"/>
+          <a:ext cx="8128000" cy="4467795"/>
+        </p:xfrm>
+        <a:graphic>
+          <a:graphicData uri="http://schemas.openxmlformats.org/drawingml/2006/diagram">
+            <dgm:relIds xmlns:dgm="http://schemas.openxmlformats.org/drawingml/2006/diagram" xmlns:r="http://schemas.openxmlformats.org/officeDocument/2006/relationships" r:dm="rId2" r:lo="rId3" r:qs="rId4" r:cs="rId5"/>
+          </a:graphicData>
+        </a:graphic>
+      </p:graphicFrame>
     </p:spTree>
     <p:extLst>
       <p:ext uri="{BB962C8B-B14F-4D97-AF65-F5344CB8AC3E}">
-        <p14:creationId xmlns:p14="http://schemas.microsoft.com/office/powerpoint/2010/main" val="2646153592"/>
+        <p14:creationId xmlns:p14="http://schemas.microsoft.com/office/powerpoint/2010/main" val="3967243267"/>
       </p:ext>
     </p:extLst>
   </p:cSld>
@@ -16344,18 +16280,13 @@
           <a:lstStyle/>
           <a:p>
             <a:r>
-              <a:rPr lang="en-CA" dirty="0" err="1"/>
-              <a:t>Entrevues</a:t>
-            </a:r>
-            <a:r>
-              <a:rPr lang="en-CA" dirty="0"/>
-              <a:t> </a:t>
-            </a:r>
-            <a:r>
-              <a:rPr lang="en-CA" dirty="0" err="1"/>
-              <a:t>potentielles</a:t>
-            </a:r>
-            <a:endParaRPr lang="en-CA" dirty="0"/>
+              <a:rPr lang="fr-CA" dirty="0"/>
+              <a:t>Veille – Points à considérer</a:t>
+            </a:r>
+            <a:br>
+              <a:rPr lang="fr-CA" dirty="0"/>
+            </a:br>
+            <a:endParaRPr lang="fr-CA" dirty="0"/>
           </a:p>
         </p:txBody>
       </p:sp>
@@ -16364,7 +16295,7 @@
           <p:cNvPr id="4" name="Content Placeholder 3">
             <a:extLst>
               <a:ext uri="{FF2B5EF4-FFF2-40B4-BE49-F238E27FC236}">
-                <a16:creationId xmlns:a16="http://schemas.microsoft.com/office/drawing/2014/main" id="{561C8BA9-4D5B-4077-A438-4CBFA09C3FD0}"/>
+                <a16:creationId xmlns:a16="http://schemas.microsoft.com/office/drawing/2014/main" id="{1BEF1B98-B4FA-4650-897D-714D995AABAC}"/>
               </a:ext>
             </a:extLst>
           </p:cNvPr>
@@ -16377,63 +16308,73 @@
         </p:nvSpPr>
         <p:spPr/>
         <p:txBody>
-          <a:bodyPr>
-            <a:normAutofit/>
-          </a:bodyPr>
+          <a:bodyPr/>
           <a:lstStyle/>
           <a:p>
             <a:r>
               <a:rPr lang="fr-CA" dirty="0"/>
-              <a:t>Profil-type #1 : Apiculteur</a:t>
+              <a:t>Conditions de survie/besoins des abeilles</a:t>
             </a:r>
           </a:p>
           <a:p>
             <a:pPr lvl="1"/>
             <a:r>
               <a:rPr lang="fr-CA" dirty="0"/>
-              <a:t>Caractéristiques</a:t>
-            </a:r>
-          </a:p>
-          <a:p>
-            <a:pPr lvl="2"/>
+              <a:t>Température</a:t>
+            </a:r>
+          </a:p>
+          <a:p>
+            <a:pPr lvl="1"/>
             <a:r>
               <a:rPr lang="fr-CA" dirty="0"/>
-              <a:t>Vivant principalement de l’apiculture</a:t>
+              <a:t>Accès à l’eau</a:t>
             </a:r>
           </a:p>
           <a:p>
             <a:pPr lvl="1"/>
             <a:r>
               <a:rPr lang="fr-CA" dirty="0"/>
-              <a:t>Questions</a:t>
-            </a:r>
-          </a:p>
-          <a:p>
-            <a:pPr lvl="2"/>
+              <a:t>Vents tenus au minimum</a:t>
+            </a:r>
+          </a:p>
+          <a:p>
             <a:r>
               <a:rPr lang="fr-CA" dirty="0"/>
-              <a:t>Type/nombre de ruches</a:t>
-            </a:r>
-          </a:p>
-          <a:p>
-            <a:pPr lvl="2"/>
+              <a:t>Conditions de travail/requis de l’apiculteur</a:t>
+            </a:r>
+          </a:p>
+          <a:p>
+            <a:pPr lvl="1"/>
             <a:r>
               <a:rPr lang="fr-CA" dirty="0"/>
-              <a:t>Type d’exploitation</a:t>
-            </a:r>
-          </a:p>
-          <a:p>
-            <a:pPr lvl="2"/>
+              <a:t>Détection d’essaimage</a:t>
+            </a:r>
+          </a:p>
+          <a:p>
+            <a:pPr lvl="1"/>
             <a:r>
               <a:rPr lang="fr-CA" dirty="0"/>
-              <a:t>Routine de récolte du miel</a:t>
-            </a:r>
-          </a:p>
-          <a:p>
-            <a:pPr lvl="2"/>
+              <a:t>Poids de la ruche </a:t>
+            </a:r>
+            <a:r>
+              <a:rPr lang="fr-CA" dirty="0">
+                <a:cs typeface="Calibri" panose="020F0502020204030204" pitchFamily="34" charset="0"/>
+              </a:rPr>
+              <a:t>→ Volume de miel</a:t>
+            </a:r>
+            <a:endParaRPr lang="fr-CA" dirty="0"/>
+          </a:p>
+          <a:p>
             <a:r>
               <a:rPr lang="fr-CA" dirty="0"/>
-              <a:t>Ouverture face à la technologie</a:t>
+              <a:t>Produits existants</a:t>
+            </a:r>
+          </a:p>
+          <a:p>
+            <a:pPr lvl="1"/>
+            <a:r>
+              <a:rPr lang="fr-CA" dirty="0"/>
+              <a:t>Prix élevé</a:t>
             </a:r>
           </a:p>
         </p:txBody>
@@ -16441,7 +16382,7 @@
     </p:spTree>
     <p:extLst>
       <p:ext uri="{BB962C8B-B14F-4D97-AF65-F5344CB8AC3E}">
-        <p14:creationId xmlns:p14="http://schemas.microsoft.com/office/powerpoint/2010/main" val="1402609215"/>
+        <p14:creationId xmlns:p14="http://schemas.microsoft.com/office/powerpoint/2010/main" val="2646153592"/>
       </p:ext>
     </p:extLst>
   </p:cSld>
@@ -16530,6 +16471,152 @@
           <a:p>
             <a:r>
               <a:rPr lang="fr-CA" dirty="0"/>
+              <a:t>Profil-type #1 : Apiculteur</a:t>
+            </a:r>
+          </a:p>
+          <a:p>
+            <a:pPr lvl="1"/>
+            <a:r>
+              <a:rPr lang="fr-CA" dirty="0"/>
+              <a:t>Caractéristiques</a:t>
+            </a:r>
+          </a:p>
+          <a:p>
+            <a:pPr lvl="2"/>
+            <a:r>
+              <a:rPr lang="fr-CA" dirty="0"/>
+              <a:t>Vivant principalement de l’apiculture</a:t>
+            </a:r>
+          </a:p>
+          <a:p>
+            <a:pPr lvl="1"/>
+            <a:r>
+              <a:rPr lang="fr-CA" dirty="0"/>
+              <a:t>Questions</a:t>
+            </a:r>
+          </a:p>
+          <a:p>
+            <a:pPr lvl="2"/>
+            <a:r>
+              <a:rPr lang="fr-CA" dirty="0"/>
+              <a:t>Type/nombre de ruches</a:t>
+            </a:r>
+          </a:p>
+          <a:p>
+            <a:pPr lvl="2"/>
+            <a:r>
+              <a:rPr lang="fr-CA" dirty="0"/>
+              <a:t>Type d’exploitation</a:t>
+            </a:r>
+          </a:p>
+          <a:p>
+            <a:pPr lvl="2"/>
+            <a:r>
+              <a:rPr lang="fr-CA" dirty="0"/>
+              <a:t>Routine de récolte du miel</a:t>
+            </a:r>
+          </a:p>
+          <a:p>
+            <a:pPr lvl="2"/>
+            <a:r>
+              <a:rPr lang="fr-CA" dirty="0"/>
+              <a:t>Ouverture face à la technologie</a:t>
+            </a:r>
+          </a:p>
+        </p:txBody>
+      </p:sp>
+    </p:spTree>
+    <p:extLst>
+      <p:ext uri="{BB962C8B-B14F-4D97-AF65-F5344CB8AC3E}">
+        <p14:creationId xmlns:p14="http://schemas.microsoft.com/office/powerpoint/2010/main" val="1402609215"/>
+      </p:ext>
+    </p:extLst>
+  </p:cSld>
+  <p:clrMapOvr>
+    <a:masterClrMapping/>
+  </p:clrMapOvr>
+</p:sld>
+</file>
+
+<file path=ppt/slides/slide13.xml><?xml version="1.0" encoding="utf-8"?>
+<p:sld xmlns:a="http://schemas.openxmlformats.org/drawingml/2006/main" xmlns:r="http://schemas.openxmlformats.org/officeDocument/2006/relationships" xmlns:p="http://schemas.openxmlformats.org/presentationml/2006/main">
+  <p:cSld>
+    <p:spTree>
+      <p:nvGrpSpPr>
+        <p:cNvPr id="1" name=""/>
+        <p:cNvGrpSpPr/>
+        <p:nvPr/>
+      </p:nvGrpSpPr>
+      <p:grpSpPr>
+        <a:xfrm>
+          <a:off x="0" y="0"/>
+          <a:ext cx="0" cy="0"/>
+          <a:chOff x="0" y="0"/>
+          <a:chExt cx="0" cy="0"/>
+        </a:xfrm>
+      </p:grpSpPr>
+      <p:sp>
+        <p:nvSpPr>
+          <p:cNvPr id="2" name="Title 1">
+            <a:extLst>
+              <a:ext uri="{FF2B5EF4-FFF2-40B4-BE49-F238E27FC236}">
+                <a16:creationId xmlns:a16="http://schemas.microsoft.com/office/drawing/2014/main" id="{532BB36A-66E0-4644-AB8F-8DCB79605DD1}"/>
+              </a:ext>
+            </a:extLst>
+          </p:cNvPr>
+          <p:cNvSpPr>
+            <a:spLocks noGrp="1"/>
+          </p:cNvSpPr>
+          <p:nvPr>
+            <p:ph type="title"/>
+          </p:nvPr>
+        </p:nvSpPr>
+        <p:spPr/>
+        <p:txBody>
+          <a:bodyPr/>
+          <a:lstStyle/>
+          <a:p>
+            <a:r>
+              <a:rPr lang="en-CA" dirty="0" err="1"/>
+              <a:t>Entrevues</a:t>
+            </a:r>
+            <a:r>
+              <a:rPr lang="en-CA" dirty="0"/>
+              <a:t> </a:t>
+            </a:r>
+            <a:r>
+              <a:rPr lang="en-CA" dirty="0" err="1"/>
+              <a:t>potentielles</a:t>
+            </a:r>
+            <a:endParaRPr lang="en-CA" dirty="0"/>
+          </a:p>
+        </p:txBody>
+      </p:sp>
+      <p:sp>
+        <p:nvSpPr>
+          <p:cNvPr id="4" name="Content Placeholder 3">
+            <a:extLst>
+              <a:ext uri="{FF2B5EF4-FFF2-40B4-BE49-F238E27FC236}">
+                <a16:creationId xmlns:a16="http://schemas.microsoft.com/office/drawing/2014/main" id="{561C8BA9-4D5B-4077-A438-4CBFA09C3FD0}"/>
+              </a:ext>
+            </a:extLst>
+          </p:cNvPr>
+          <p:cNvSpPr>
+            <a:spLocks noGrp="1"/>
+          </p:cNvSpPr>
+          <p:nvPr>
+            <p:ph idx="1"/>
+          </p:nvPr>
+        </p:nvSpPr>
+        <p:spPr/>
+        <p:txBody>
+          <a:bodyPr>
+            <a:normAutofit/>
+          </a:bodyPr>
+          <a:lstStyle/>
+          <a:p>
+            <a:r>
+              <a:rPr lang="fr-CA" dirty="0"/>
               <a:t>Profil-type #2 : Agriculteur</a:t>
             </a:r>
           </a:p>
@@ -16593,7 +16680,7 @@
 </p:sld>
 </file>
 
-<file path=ppt/slides/slide13.xml><?xml version="1.0" encoding="utf-8"?>
+<file path=ppt/slides/slide14.xml><?xml version="1.0" encoding="utf-8"?>
 <p:sld xmlns:a="http://schemas.openxmlformats.org/drawingml/2006/main" xmlns:r="http://schemas.openxmlformats.org/officeDocument/2006/relationships" xmlns:p="http://schemas.openxmlformats.org/presentationml/2006/main">
   <p:cSld>
     <p:spTree>
@@ -16745,7 +16832,7 @@
 </p:sld>
 </file>
 
-<file path=ppt/slides/slide14.xml><?xml version="1.0" encoding="utf-8"?>
+<file path=ppt/slides/slide15.xml><?xml version="1.0" encoding="utf-8"?>
 <p:sld xmlns:a="http://schemas.openxmlformats.org/drawingml/2006/main" xmlns:r="http://schemas.openxmlformats.org/officeDocument/2006/relationships" xmlns:p="http://schemas.openxmlformats.org/presentationml/2006/main">
   <p:cSld>
     <p:spTree>
@@ -16863,7 +16950,7 @@
 </p:sld>
 </file>
 
-<file path=ppt/slides/slide15.xml><?xml version="1.0" encoding="utf-8"?>
+<file path=ppt/slides/slide16.xml><?xml version="1.0" encoding="utf-8"?>
 <p:sld xmlns:a="http://schemas.openxmlformats.org/drawingml/2006/main" xmlns:r="http://schemas.openxmlformats.org/officeDocument/2006/relationships" xmlns:p="http://schemas.openxmlformats.org/presentationml/2006/main">
   <p:cSld>
     <p:spTree>
@@ -17109,7 +17196,7 @@
 </p:sld>
 </file>
 
-<file path=ppt/slides/slide16.xml><?xml version="1.0" encoding="utf-8"?>
+<file path=ppt/slides/slide17.xml><?xml version="1.0" encoding="utf-8"?>
 <p:sld xmlns:a="http://schemas.openxmlformats.org/drawingml/2006/main" xmlns:r="http://schemas.openxmlformats.org/officeDocument/2006/relationships" xmlns:p="http://schemas.openxmlformats.org/presentationml/2006/main">
   <p:cSld>
     <p:spTree>
@@ -18859,7 +18946,7 @@
           <p:cNvPr id="2" name="Title 1">
             <a:extLst>
               <a:ext uri="{FF2B5EF4-FFF2-40B4-BE49-F238E27FC236}">
-                <a16:creationId xmlns:a16="http://schemas.microsoft.com/office/drawing/2014/main" id="{91E8F6C8-4F64-439A-A928-7D43565B1CD7}"/>
+                <a16:creationId xmlns:a16="http://schemas.microsoft.com/office/drawing/2014/main" id="{0466800D-C7A5-4261-9ED9-BD693F1C5BC1}"/>
               </a:ext>
             </a:extLst>
           </p:cNvPr>
@@ -18870,62 +18957,67 @@
             <p:ph type="title"/>
           </p:nvPr>
         </p:nvSpPr>
-        <p:spPr/>
+        <p:spPr>
+          <a:xfrm>
+            <a:off x="1981200" y="575984"/>
+            <a:ext cx="8229600" cy="1280890"/>
+          </a:xfrm>
+        </p:spPr>
         <p:txBody>
           <a:bodyPr/>
           <a:lstStyle/>
           <a:p>
             <a:r>
-              <a:rPr lang="fr-CA" dirty="0"/>
-              <a:t>Priorisation des défis</a:t>
-            </a:r>
+              <a:rPr lang="en-CA" dirty="0"/>
+              <a:t>Identification des impacts et des </a:t>
+            </a:r>
+            <a:r>
+              <a:rPr lang="en-CA" dirty="0" err="1"/>
+              <a:t>enjeux</a:t>
+            </a:r>
+            <a:endParaRPr lang="en-CA" dirty="0"/>
           </a:p>
         </p:txBody>
       </p:sp>
-      <p:sp>
-        <p:nvSpPr>
-          <p:cNvPr id="3" name="Content Placeholder 2">
+      <p:pic>
+        <p:nvPicPr>
+          <p:cNvPr id="5" name="Content Placeholder 4">
             <a:extLst>
               <a:ext uri="{FF2B5EF4-FFF2-40B4-BE49-F238E27FC236}">
-                <a16:creationId xmlns:a16="http://schemas.microsoft.com/office/drawing/2014/main" id="{A902CCF2-D8E0-4BD9-B641-DB4198DCC163}"/>
+                <a16:creationId xmlns:a16="http://schemas.microsoft.com/office/drawing/2014/main" id="{BD8BB06B-BB0A-4B40-B3BB-A4050608EF36}"/>
               </a:ext>
             </a:extLst>
           </p:cNvPr>
-          <p:cNvSpPr>
-            <a:spLocks noGrp="1"/>
-          </p:cNvSpPr>
+          <p:cNvPicPr>
+            <a:picLocks noGrp="1" noChangeAspect="1"/>
+          </p:cNvPicPr>
           <p:nvPr>
             <p:ph idx="1"/>
           </p:nvPr>
-        </p:nvSpPr>
-        <p:spPr/>
-        <p:txBody>
-          <a:bodyPr/>
-          <a:lstStyle/>
-          <a:p>
-            <a:r>
-              <a:rPr lang="fr-CA" dirty="0"/>
-              <a:t>Analyse et veille</a:t>
-            </a:r>
-          </a:p>
-          <a:p>
-            <a:r>
-              <a:rPr lang="fr-CA" dirty="0"/>
-              <a:t>Vecteur d’entrée</a:t>
-            </a:r>
-          </a:p>
-          <a:p>
-            <a:r>
-              <a:rPr lang="fr-CA" dirty="0"/>
-              <a:t>Valeurs et motivations des membres de l’équipe</a:t>
-            </a:r>
-          </a:p>
-        </p:txBody>
-      </p:sp>
+        </p:nvPicPr>
+        <p:blipFill>
+          <a:blip r:embed="rId2">
+            <a:extLst>
+              <a:ext uri="{28A0092B-C50C-407E-A947-70E740481C1C}">
+                <a14:useLocalDpi xmlns:a14="http://schemas.microsoft.com/office/drawing/2010/main" val="0"/>
+              </a:ext>
+            </a:extLst>
+          </a:blip>
+          <a:stretch>
+            <a:fillRect/>
+          </a:stretch>
+        </p:blipFill>
+        <p:spPr>
+          <a:xfrm>
+            <a:off x="2810354" y="1856874"/>
+            <a:ext cx="6571292" cy="4622662"/>
+          </a:xfrm>
+        </p:spPr>
+      </p:pic>
     </p:spTree>
     <p:extLst>
       <p:ext uri="{BB962C8B-B14F-4D97-AF65-F5344CB8AC3E}">
-        <p14:creationId xmlns:p14="http://schemas.microsoft.com/office/powerpoint/2010/main" val="2420593111"/>
+        <p14:creationId xmlns:p14="http://schemas.microsoft.com/office/powerpoint/2010/main" val="1136547631"/>
       </p:ext>
     </p:extLst>
   </p:cSld>
@@ -18957,7 +19049,7 @@
           <p:cNvPr id="2" name="Title 1">
             <a:extLst>
               <a:ext uri="{FF2B5EF4-FFF2-40B4-BE49-F238E27FC236}">
-                <a16:creationId xmlns:a16="http://schemas.microsoft.com/office/drawing/2014/main" id="{8EA0546E-ECF2-4914-9E36-FE0E3B5746E7}"/>
+                <a16:creationId xmlns:a16="http://schemas.microsoft.com/office/drawing/2014/main" id="{91E8F6C8-4F64-439A-A928-7D43565B1CD7}"/>
               </a:ext>
             </a:extLst>
           </p:cNvPr>
@@ -18980,38 +19072,50 @@
           </a:p>
         </p:txBody>
       </p:sp>
-      <p:graphicFrame>
-        <p:nvGraphicFramePr>
-          <p:cNvPr id="4" name="Diagram 3">
+      <p:sp>
+        <p:nvSpPr>
+          <p:cNvPr id="3" name="Content Placeholder 2">
             <a:extLst>
               <a:ext uri="{FF2B5EF4-FFF2-40B4-BE49-F238E27FC236}">
-                <a16:creationId xmlns:a16="http://schemas.microsoft.com/office/drawing/2014/main" id="{411E8622-A333-401D-82C1-957ACAA21FF3}"/>
+                <a16:creationId xmlns:a16="http://schemas.microsoft.com/office/drawing/2014/main" id="{A902CCF2-D8E0-4BD9-B641-DB4198DCC163}"/>
               </a:ext>
             </a:extLst>
           </p:cNvPr>
-          <p:cNvGraphicFramePr/>
+          <p:cNvSpPr>
+            <a:spLocks noGrp="1"/>
+          </p:cNvSpPr>
           <p:nvPr>
-            <p:extLst>
-              <p:ext uri="{D42A27DB-BD31-4B8C-83A1-F6EECF244321}">
-                <p14:modId xmlns:p14="http://schemas.microsoft.com/office/powerpoint/2010/main" val="3775440030"/>
-              </p:ext>
-            </p:extLst>
+            <p:ph idx="1"/>
           </p:nvPr>
-        </p:nvGraphicFramePr>
-        <p:xfrm>
-          <a:off x="2032000" y="1670537"/>
-          <a:ext cx="8128000" cy="4467795"/>
-        </p:xfrm>
-        <a:graphic>
-          <a:graphicData uri="http://schemas.openxmlformats.org/drawingml/2006/diagram">
-            <dgm:relIds xmlns:dgm="http://schemas.openxmlformats.org/drawingml/2006/diagram" xmlns:r="http://schemas.openxmlformats.org/officeDocument/2006/relationships" r:dm="rId2" r:lo="rId3" r:qs="rId4" r:cs="rId5"/>
-          </a:graphicData>
-        </a:graphic>
-      </p:graphicFrame>
+        </p:nvSpPr>
+        <p:spPr/>
+        <p:txBody>
+          <a:bodyPr/>
+          <a:lstStyle/>
+          <a:p>
+            <a:r>
+              <a:rPr lang="fr-CA" dirty="0"/>
+              <a:t>Analyse et veille</a:t>
+            </a:r>
+          </a:p>
+          <a:p>
+            <a:r>
+              <a:rPr lang="fr-CA" dirty="0"/>
+              <a:t>Vecteur d’entrée</a:t>
+            </a:r>
+          </a:p>
+          <a:p>
+            <a:r>
+              <a:rPr lang="fr-CA" dirty="0"/>
+              <a:t>Valeurs et motivations des membres de l’équipe</a:t>
+            </a:r>
+          </a:p>
+        </p:txBody>
+      </p:sp>
     </p:spTree>
     <p:extLst>
       <p:ext uri="{BB962C8B-B14F-4D97-AF65-F5344CB8AC3E}">
-        <p14:creationId xmlns:p14="http://schemas.microsoft.com/office/powerpoint/2010/main" val="3967243267"/>
+        <p14:creationId xmlns:p14="http://schemas.microsoft.com/office/powerpoint/2010/main" val="2420593111"/>
       </p:ext>
     </p:extLst>
   </p:cSld>

</xml_diff>

<commit_message>
Modification partie définition du projet
</commit_message>
<xml_diff>
--- a/Présentation Éthique.pptx
+++ b/Présentation Éthique.pptx
@@ -10,11 +10,11 @@
   <p:sldIdLst>
     <p:sldId id="273" r:id="rId2"/>
     <p:sldId id="302" r:id="rId3"/>
-    <p:sldId id="303" r:id="rId4"/>
-    <p:sldId id="256" r:id="rId5"/>
-    <p:sldId id="257" r:id="rId6"/>
-    <p:sldId id="268" r:id="rId7"/>
-    <p:sldId id="292" r:id="rId8"/>
+    <p:sldId id="306" r:id="rId4"/>
+    <p:sldId id="292" r:id="rId5"/>
+    <p:sldId id="268" r:id="rId6"/>
+    <p:sldId id="256" r:id="rId7"/>
+    <p:sldId id="257" r:id="rId8"/>
     <p:sldId id="305" r:id="rId9"/>
     <p:sldId id="297" r:id="rId10"/>
     <p:sldId id="298" r:id="rId11"/>
@@ -7809,7 +7809,7 @@
           <a:p>
             <a:fld id="{E79C2942-7612-4449-8EDF-C72AF5145B50}" type="datetimeFigureOut">
               <a:rPr lang="fr-CA" smtClean="0"/>
-              <a:t>2018-12-16</a:t>
+              <a:t>2018-12-17</a:t>
             </a:fld>
             <a:endParaRPr lang="fr-CA"/>
           </a:p>
@@ -7968,7 +7968,7 @@
           <a:p>
             <a:fld id="{1E0AA58F-6E0A-4091-9E6B-3FF929A5CB43}" type="slidenum">
               <a:rPr lang="fr-CA" smtClean="0"/>
-              <a:t>‹#›</a:t>
+              <a:t>‹N°›</a:t>
             </a:fld>
             <a:endParaRPr lang="fr-CA"/>
           </a:p>
@@ -8265,7 +8265,7 @@
           <a:p>
             <a:fld id="{4324957A-28ED-4564-B596-BA8A4FF6B8FE}" type="datetime1">
               <a:rPr lang="en-CA" smtClean="0"/>
-              <a:t>2018-12-16</a:t>
+              <a:t>2018-12-17</a:t>
             </a:fld>
             <a:endParaRPr lang="en-CA"/>
           </a:p>
@@ -8397,7 +8397,7 @@
           <a:p>
             <a:fld id="{2849D840-EB1A-4BD0-9BBF-65787F9A4F51}" type="slidenum">
               <a:rPr lang="en-CA" smtClean="0"/>
-              <a:t>‹#›</a:t>
+              <a:t>‹N°›</a:t>
             </a:fld>
             <a:endParaRPr lang="en-CA"/>
           </a:p>
@@ -8618,7 +8618,7 @@
           <a:p>
             <a:fld id="{4DDA0149-C9AC-4CA4-985F-4DBE67ED4DBF}" type="datetime1">
               <a:rPr lang="en-CA" smtClean="0"/>
-              <a:t>2018-12-16</a:t>
+              <a:t>2018-12-17</a:t>
             </a:fld>
             <a:endParaRPr lang="en-CA"/>
           </a:p>
@@ -8750,7 +8750,7 @@
           <a:p>
             <a:fld id="{2849D840-EB1A-4BD0-9BBF-65787F9A4F51}" type="slidenum">
               <a:rPr lang="en-CA" smtClean="0"/>
-              <a:t>‹#›</a:t>
+              <a:t>‹N°›</a:t>
             </a:fld>
             <a:endParaRPr lang="en-CA"/>
           </a:p>
@@ -8959,7 +8959,7 @@
           <a:p>
             <a:fld id="{0401FC47-7360-4BA8-8822-14EF1ED17328}" type="datetime1">
               <a:rPr lang="en-CA" smtClean="0"/>
-              <a:t>2018-12-16</a:t>
+              <a:t>2018-12-17</a:t>
             </a:fld>
             <a:endParaRPr lang="en-CA"/>
           </a:p>
@@ -9091,7 +9091,7 @@
           <a:p>
             <a:fld id="{2849D840-EB1A-4BD0-9BBF-65787F9A4F51}" type="slidenum">
               <a:rPr lang="en-CA" smtClean="0"/>
-              <a:t>‹#›</a:t>
+              <a:t>‹N°›</a:t>
             </a:fld>
             <a:endParaRPr lang="en-CA"/>
           </a:p>
@@ -9363,7 +9363,7 @@
           <a:p>
             <a:fld id="{9D1EF933-CDFB-4272-9A3C-ABA1865F4583}" type="datetime1">
               <a:rPr lang="en-CA" smtClean="0"/>
-              <a:t>2018-12-16</a:t>
+              <a:t>2018-12-17</a:t>
             </a:fld>
             <a:endParaRPr lang="en-CA"/>
           </a:p>
@@ -9495,7 +9495,7 @@
           <a:p>
             <a:fld id="{2849D840-EB1A-4BD0-9BBF-65787F9A4F51}" type="slidenum">
               <a:rPr lang="en-CA" smtClean="0"/>
-              <a:t>‹#›</a:t>
+              <a:t>‹N°›</a:t>
             </a:fld>
             <a:endParaRPr lang="en-CA"/>
           </a:p>
@@ -9702,7 +9702,7 @@
           <a:p>
             <a:fld id="{A1D1E3BD-09E5-44BD-9E2A-F6D74FEA526F}" type="datetime1">
               <a:rPr lang="en-CA" smtClean="0"/>
-              <a:t>2018-12-16</a:t>
+              <a:t>2018-12-17</a:t>
             </a:fld>
             <a:endParaRPr lang="en-CA"/>
           </a:p>
@@ -9834,7 +9834,7 @@
           <a:p>
             <a:fld id="{2849D840-EB1A-4BD0-9BBF-65787F9A4F51}" type="slidenum">
               <a:rPr lang="en-CA" smtClean="0"/>
-              <a:t>‹#›</a:t>
+              <a:t>‹N°›</a:t>
             </a:fld>
             <a:endParaRPr lang="en-CA"/>
           </a:p>
@@ -10025,7 +10025,7 @@
           <a:p>
             <a:fld id="{ED24EA8A-7EF0-4288-9CB8-92B6515CC3DF}" type="datetime1">
               <a:rPr lang="en-CA" smtClean="0"/>
-              <a:t>2018-12-16</a:t>
+              <a:t>2018-12-17</a:t>
             </a:fld>
             <a:endParaRPr lang="en-CA"/>
           </a:p>
@@ -10157,7 +10157,7 @@
           <a:p>
             <a:fld id="{2849D840-EB1A-4BD0-9BBF-65787F9A4F51}" type="slidenum">
               <a:rPr lang="en-CA" smtClean="0"/>
-              <a:t>‹#›</a:t>
+              <a:t>‹N°›</a:t>
             </a:fld>
             <a:endParaRPr lang="en-CA"/>
           </a:p>
@@ -10424,7 +10424,7 @@
           <a:p>
             <a:fld id="{8AD25BF8-1BE2-48C1-82FF-BE6F11008824}" type="datetime1">
               <a:rPr lang="en-CA" smtClean="0"/>
-              <a:t>2018-12-16</a:t>
+              <a:t>2018-12-17</a:t>
             </a:fld>
             <a:endParaRPr lang="en-CA"/>
           </a:p>
@@ -10556,7 +10556,7 @@
           <a:p>
             <a:fld id="{2849D840-EB1A-4BD0-9BBF-65787F9A4F51}" type="slidenum">
               <a:rPr lang="en-CA" smtClean="0"/>
-              <a:t>‹#›</a:t>
+              <a:t>‹N°›</a:t>
             </a:fld>
             <a:endParaRPr lang="en-CA"/>
           </a:p>
@@ -10684,7 +10684,7 @@
           <a:p>
             <a:fld id="{6738CD10-FBE3-41CC-A47A-2D28D65C7B52}" type="datetime1">
               <a:rPr lang="en-CA" smtClean="0"/>
-              <a:t>2018-12-16</a:t>
+              <a:t>2018-12-17</a:t>
             </a:fld>
             <a:endParaRPr lang="en-CA"/>
           </a:p>
@@ -10811,7 +10811,7 @@
           <a:p>
             <a:fld id="{2849D840-EB1A-4BD0-9BBF-65787F9A4F51}" type="slidenum">
               <a:rPr lang="en-CA" smtClean="0"/>
-              <a:t>‹#›</a:t>
+              <a:t>‹N°›</a:t>
             </a:fld>
             <a:endParaRPr lang="en-CA"/>
           </a:p>
@@ -10949,7 +10949,7 @@
           <a:p>
             <a:fld id="{36151A7A-D331-4745-BBBE-7338ED061D44}" type="datetime1">
               <a:rPr lang="en-CA" smtClean="0"/>
-              <a:t>2018-12-16</a:t>
+              <a:t>2018-12-17</a:t>
             </a:fld>
             <a:endParaRPr lang="en-CA"/>
           </a:p>
@@ -11076,7 +11076,7 @@
           <a:p>
             <a:fld id="{2849D840-EB1A-4BD0-9BBF-65787F9A4F51}" type="slidenum">
               <a:rPr lang="en-CA" smtClean="0"/>
-              <a:t>‹#›</a:t>
+              <a:t>‹N°›</a:t>
             </a:fld>
             <a:endParaRPr lang="en-CA"/>
           </a:p>
@@ -11214,7 +11214,7 @@
           <a:p>
             <a:fld id="{1B9E97EC-8CCA-4B54-B971-F4E568F8A585}" type="datetime1">
               <a:rPr lang="en-CA" smtClean="0"/>
-              <a:t>2018-12-16</a:t>
+              <a:t>2018-12-17</a:t>
             </a:fld>
             <a:endParaRPr lang="en-CA"/>
           </a:p>
@@ -11341,7 +11341,7 @@
           <a:p>
             <a:fld id="{2849D840-EB1A-4BD0-9BBF-65787F9A4F51}" type="slidenum">
               <a:rPr lang="en-CA" smtClean="0"/>
-              <a:t>‹#›</a:t>
+              <a:t>‹N°›</a:t>
             </a:fld>
             <a:endParaRPr lang="en-CA"/>
           </a:p>
@@ -11515,7 +11515,7 @@
           <a:p>
             <a:fld id="{1B9E97EC-8CCA-4B54-B971-F4E568F8A585}" type="datetime1">
               <a:rPr lang="en-CA" smtClean="0"/>
-              <a:t>2018-12-16</a:t>
+              <a:t>2018-12-17</a:t>
             </a:fld>
             <a:endParaRPr lang="en-CA"/>
           </a:p>
@@ -11642,7 +11642,7 @@
           <a:p>
             <a:fld id="{2849D840-EB1A-4BD0-9BBF-65787F9A4F51}" type="slidenum">
               <a:rPr lang="en-CA" smtClean="0"/>
-              <a:t>‹#›</a:t>
+              <a:t>‹N°›</a:t>
             </a:fld>
             <a:endParaRPr lang="en-CA"/>
           </a:p>
@@ -11847,7 +11847,7 @@
           <a:p>
             <a:fld id="{15FDE6EE-5B80-4906-9FC0-5C68C122FCDC}" type="datetime1">
               <a:rPr lang="en-CA" smtClean="0"/>
-              <a:t>2018-12-16</a:t>
+              <a:t>2018-12-17</a:t>
             </a:fld>
             <a:endParaRPr lang="en-CA"/>
           </a:p>
@@ -11979,7 +11979,7 @@
           <a:p>
             <a:fld id="{2849D840-EB1A-4BD0-9BBF-65787F9A4F51}" type="slidenum">
               <a:rPr lang="en-CA" smtClean="0"/>
-              <a:t>‹#›</a:t>
+              <a:t>‹N°›</a:t>
             </a:fld>
             <a:endParaRPr lang="en-CA"/>
           </a:p>
@@ -12173,7 +12173,7 @@
           <a:p>
             <a:fld id="{CF5F4A69-FE9D-41FE-B8E0-D8BF733307A6}" type="datetime1">
               <a:rPr lang="en-CA" smtClean="0"/>
-              <a:t>2018-12-16</a:t>
+              <a:t>2018-12-17</a:t>
             </a:fld>
             <a:endParaRPr lang="en-CA"/>
           </a:p>
@@ -12305,7 +12305,7 @@
           <a:p>
             <a:fld id="{2849D840-EB1A-4BD0-9BBF-65787F9A4F51}" type="slidenum">
               <a:rPr lang="en-CA" smtClean="0"/>
-              <a:t>‹#›</a:t>
+              <a:t>‹N°›</a:t>
             </a:fld>
             <a:endParaRPr lang="en-CA"/>
           </a:p>
@@ -12638,7 +12638,7 @@
           <a:p>
             <a:fld id="{DBF39172-660D-4001-90ED-5531C0910D5E}" type="datetime1">
               <a:rPr lang="en-CA" smtClean="0"/>
-              <a:t>2018-12-16</a:t>
+              <a:t>2018-12-17</a:t>
             </a:fld>
             <a:endParaRPr lang="en-CA"/>
           </a:p>
@@ -12770,7 +12770,7 @@
           <a:p>
             <a:fld id="{2849D840-EB1A-4BD0-9BBF-65787F9A4F51}" type="slidenum">
               <a:rPr lang="en-CA" smtClean="0"/>
-              <a:t>‹#›</a:t>
+              <a:t>‹N°›</a:t>
             </a:fld>
             <a:endParaRPr lang="en-CA"/>
           </a:p>
@@ -12851,7 +12851,7 @@
           <a:p>
             <a:fld id="{156135FA-2BA0-40BA-B84D-C4BDA4C23F2C}" type="datetime1">
               <a:rPr lang="en-CA" smtClean="0"/>
-              <a:t>2018-12-16</a:t>
+              <a:t>2018-12-17</a:t>
             </a:fld>
             <a:endParaRPr lang="en-CA"/>
           </a:p>
@@ -12978,7 +12978,7 @@
           <a:p>
             <a:fld id="{2849D840-EB1A-4BD0-9BBF-65787F9A4F51}" type="slidenum">
               <a:rPr lang="en-CA" smtClean="0"/>
-              <a:t>‹#›</a:t>
+              <a:t>‹N°›</a:t>
             </a:fld>
             <a:endParaRPr lang="en-CA"/>
           </a:p>
@@ -13031,7 +13031,7 @@
           <a:p>
             <a:fld id="{B34C7E02-37A9-4739-9C22-F74DCE04F2D4}" type="datetime1">
               <a:rPr lang="en-CA" smtClean="0"/>
-              <a:t>2018-12-16</a:t>
+              <a:t>2018-12-17</a:t>
             </a:fld>
             <a:endParaRPr lang="en-CA"/>
           </a:p>
@@ -13158,7 +13158,7 @@
           <a:p>
             <a:fld id="{2849D840-EB1A-4BD0-9BBF-65787F9A4F51}" type="slidenum">
               <a:rPr lang="en-CA" smtClean="0"/>
-              <a:t>‹#›</a:t>
+              <a:t>‹N°›</a:t>
             </a:fld>
             <a:endParaRPr lang="en-CA"/>
           </a:p>
@@ -13367,7 +13367,7 @@
           <a:p>
             <a:fld id="{4206C45A-34D5-4342-9305-15B61504A0C9}" type="datetime1">
               <a:rPr lang="en-CA" smtClean="0"/>
-              <a:t>2018-12-16</a:t>
+              <a:t>2018-12-17</a:t>
             </a:fld>
             <a:endParaRPr lang="en-CA"/>
           </a:p>
@@ -13494,7 +13494,7 @@
           <a:p>
             <a:fld id="{2849D840-EB1A-4BD0-9BBF-65787F9A4F51}" type="slidenum">
               <a:rPr lang="en-CA" smtClean="0"/>
-              <a:t>‹#›</a:t>
+              <a:t>‹N°›</a:t>
             </a:fld>
             <a:endParaRPr lang="en-CA"/>
           </a:p>
@@ -15487,7 +15487,7 @@
           <a:p>
             <a:fld id="{2D0A754B-72FF-4374-9E40-529DDB56E22C}" type="datetime1">
               <a:rPr lang="en-CA" smtClean="0"/>
-              <a:t>2018-12-16</a:t>
+              <a:t>2018-12-17</a:t>
             </a:fld>
             <a:endParaRPr lang="en-CA"/>
           </a:p>
@@ -15566,7 +15566,7 @@
           <a:p>
             <a:fld id="{2849D840-EB1A-4BD0-9BBF-65787F9A4F51}" type="slidenum">
               <a:rPr lang="en-CA" smtClean="0"/>
-              <a:t>‹#›</a:t>
+              <a:t>‹N°›</a:t>
             </a:fld>
             <a:endParaRPr lang="en-CA"/>
           </a:p>
@@ -17418,752 +17418,18 @@
           <a:lstStyle/>
           <a:p>
             <a:r>
-              <a:rPr lang="fr-CA" b="1" dirty="0"/>
-              <a:t>Définition et finalité du projet </a:t>
+              <a:rPr lang="fr-CA" dirty="0"/>
+              <a:t>Définition du projet</a:t>
             </a:r>
-            <a:endParaRPr lang="fr-CA" dirty="0"/>
-          </a:p>
-        </p:txBody>
-      </p:sp>
-      <p:sp>
-        <p:nvSpPr>
-          <p:cNvPr id="3" name="Espace réservé du contenu 2">
-            <a:extLst>
-              <a:ext uri="{FF2B5EF4-FFF2-40B4-BE49-F238E27FC236}">
-                <a16:creationId xmlns:a16="http://schemas.microsoft.com/office/drawing/2014/main" id="{B4C59757-69B2-4FF1-8935-05E170FEF823}"/>
-              </a:ext>
-            </a:extLst>
-          </p:cNvPr>
-          <p:cNvSpPr>
-            <a:spLocks noGrp="1"/>
-          </p:cNvSpPr>
-          <p:nvPr>
-            <p:ph idx="1"/>
-          </p:nvPr>
-        </p:nvSpPr>
-        <p:spPr>
-          <a:xfrm>
-            <a:off x="2592925" y="2116428"/>
-            <a:ext cx="8915400" cy="3777622"/>
-          </a:xfrm>
-        </p:spPr>
-        <p:txBody>
-          <a:bodyPr/>
-          <a:lstStyle/>
-          <a:p>
-            <a:r>
-              <a:rPr lang="fr-CA" dirty="0"/>
-              <a:t>Module qui s’intègre à tout type de ruche et qui permet de monitorer </a:t>
-            </a:r>
-          </a:p>
-          <a:p>
-            <a:pPr lvl="1"/>
-            <a:r>
-              <a:rPr lang="fr-CA" dirty="0"/>
-              <a:t>Position</a:t>
-            </a:r>
-          </a:p>
-          <a:p>
-            <a:pPr lvl="1"/>
-            <a:r>
-              <a:rPr lang="fr-CA" dirty="0"/>
-              <a:t>Température</a:t>
-            </a:r>
-          </a:p>
-          <a:p>
-            <a:pPr lvl="1"/>
-            <a:r>
-              <a:rPr lang="fr-CA" dirty="0"/>
-              <a:t>Poids</a:t>
-            </a:r>
-          </a:p>
-          <a:p>
-            <a:pPr lvl="1"/>
-            <a:r>
-              <a:rPr lang="fr-CA" dirty="0"/>
-              <a:t>Qualité de l’air</a:t>
-            </a:r>
-          </a:p>
-          <a:p>
-            <a:pPr lvl="1"/>
-            <a:r>
-              <a:rPr lang="fr-CA" dirty="0"/>
-              <a:t>Dangers imminents</a:t>
-            </a:r>
-          </a:p>
-          <a:p>
-            <a:r>
-              <a:rPr lang="fr-CA" dirty="0"/>
-              <a:t>Apiculteurs et leurs abeilles</a:t>
-            </a:r>
-          </a:p>
-          <a:p>
-            <a:r>
-              <a:rPr lang="fr-CA" dirty="0"/>
-              <a:t>Ouvert à tout type de clientèle</a:t>
-            </a:r>
-          </a:p>
-        </p:txBody>
-      </p:sp>
-    </p:spTree>
-    <p:extLst>
-      <p:ext uri="{BB962C8B-B14F-4D97-AF65-F5344CB8AC3E}">
-        <p14:creationId xmlns:p14="http://schemas.microsoft.com/office/powerpoint/2010/main" val="1503906427"/>
-      </p:ext>
-    </p:extLst>
-  </p:cSld>
-  <p:clrMapOvr>
-    <a:masterClrMapping/>
-  </p:clrMapOvr>
-</p:sld>
-</file>
-
-<file path=ppt/slides/slide4.xml><?xml version="1.0" encoding="utf-8"?>
-<p:sld xmlns:a="http://schemas.openxmlformats.org/drawingml/2006/main" xmlns:r="http://schemas.openxmlformats.org/officeDocument/2006/relationships" xmlns:p="http://schemas.openxmlformats.org/presentationml/2006/main">
-  <p:cSld>
-    <p:spTree>
-      <p:nvGrpSpPr>
-        <p:cNvPr id="1" name=""/>
-        <p:cNvGrpSpPr/>
-        <p:nvPr/>
-      </p:nvGrpSpPr>
-      <p:grpSpPr>
-        <a:xfrm>
-          <a:off x="0" y="0"/>
-          <a:ext cx="0" cy="0"/>
-          <a:chOff x="0" y="0"/>
-          <a:chExt cx="0" cy="0"/>
-        </a:xfrm>
-      </p:grpSpPr>
-      <p:sp>
-        <p:nvSpPr>
-          <p:cNvPr id="4" name="TextBox 3">
-            <a:extLst>
-              <a:ext uri="{FF2B5EF4-FFF2-40B4-BE49-F238E27FC236}">
-                <a16:creationId xmlns:a16="http://schemas.microsoft.com/office/drawing/2014/main" id="{1326EBD1-4857-4831-A34D-591433424DBB}"/>
-              </a:ext>
-            </a:extLst>
-          </p:cNvPr>
-          <p:cNvSpPr txBox="1"/>
-          <p:nvPr/>
-        </p:nvSpPr>
-        <p:spPr>
-          <a:xfrm>
-            <a:off x="5246077" y="3033345"/>
-            <a:ext cx="1699846" cy="769441"/>
-          </a:xfrm>
-          <a:prstGeom prst="rect">
-            <a:avLst/>
-          </a:prstGeom>
-          <a:noFill/>
-          <a:ln>
-            <a:solidFill>
-              <a:schemeClr val="tx1"/>
-            </a:solidFill>
-          </a:ln>
-        </p:spPr>
-        <p:txBody>
-          <a:bodyPr wrap="square" rtlCol="0">
-            <a:spAutoFit/>
-          </a:bodyPr>
-          <a:lstStyle/>
-          <a:p>
-            <a:r>
-              <a:rPr lang="en-CA" sz="4400" dirty="0" err="1"/>
-              <a:t>Défis</a:t>
-            </a:r>
-            <a:endParaRPr lang="en-CA" sz="5400" dirty="0"/>
-          </a:p>
-        </p:txBody>
-      </p:sp>
-      <p:sp>
-        <p:nvSpPr>
-          <p:cNvPr id="5" name="TextBox 4">
-            <a:extLst>
-              <a:ext uri="{FF2B5EF4-FFF2-40B4-BE49-F238E27FC236}">
-                <a16:creationId xmlns:a16="http://schemas.microsoft.com/office/drawing/2014/main" id="{A5D0788B-D9DA-4AE1-B011-CB8305D08EF6}"/>
-              </a:ext>
-            </a:extLst>
-          </p:cNvPr>
-          <p:cNvSpPr txBox="1"/>
-          <p:nvPr/>
-        </p:nvSpPr>
-        <p:spPr>
-          <a:xfrm>
-            <a:off x="4443044" y="1081383"/>
-            <a:ext cx="3305909" cy="646331"/>
-          </a:xfrm>
-          <a:prstGeom prst="rect">
-            <a:avLst/>
-          </a:prstGeom>
-          <a:noFill/>
-          <a:ln>
-            <a:solidFill>
-              <a:schemeClr val="tx1"/>
-            </a:solidFill>
-          </a:ln>
-        </p:spPr>
-        <p:txBody>
-          <a:bodyPr wrap="square" rtlCol="0">
-            <a:spAutoFit/>
-          </a:bodyPr>
-          <a:lstStyle/>
-          <a:p>
-            <a:pPr algn="ctr"/>
-            <a:r>
-              <a:rPr lang="en-CA" sz="3600" dirty="0" err="1"/>
-              <a:t>Économique</a:t>
-            </a:r>
-            <a:endParaRPr lang="en-CA" sz="4400" dirty="0"/>
-          </a:p>
-        </p:txBody>
-      </p:sp>
-      <p:sp>
-        <p:nvSpPr>
-          <p:cNvPr id="6" name="TextBox 5">
-            <a:extLst>
-              <a:ext uri="{FF2B5EF4-FFF2-40B4-BE49-F238E27FC236}">
-                <a16:creationId xmlns:a16="http://schemas.microsoft.com/office/drawing/2014/main" id="{64719C85-A8BF-4DF6-8DDD-0491184F54C1}"/>
-              </a:ext>
-            </a:extLst>
-          </p:cNvPr>
-          <p:cNvSpPr txBox="1"/>
-          <p:nvPr/>
-        </p:nvSpPr>
-        <p:spPr>
-          <a:xfrm>
-            <a:off x="1822940" y="3110288"/>
-            <a:ext cx="1526931" cy="646331"/>
-          </a:xfrm>
-          <a:prstGeom prst="rect">
-            <a:avLst/>
-          </a:prstGeom>
-          <a:noFill/>
-          <a:ln>
-            <a:solidFill>
-              <a:schemeClr val="tx1"/>
-            </a:solidFill>
-          </a:ln>
-        </p:spPr>
-        <p:txBody>
-          <a:bodyPr wrap="square" rtlCol="0">
-            <a:spAutoFit/>
-          </a:bodyPr>
-          <a:lstStyle/>
-          <a:p>
-            <a:r>
-              <a:rPr lang="en-CA" sz="3600" dirty="0"/>
-              <a:t>Social</a:t>
-            </a:r>
-            <a:endParaRPr lang="en-CA" sz="4400" dirty="0"/>
-          </a:p>
-        </p:txBody>
-      </p:sp>
-      <p:sp>
-        <p:nvSpPr>
-          <p:cNvPr id="7" name="TextBox 6">
-            <a:extLst>
-              <a:ext uri="{FF2B5EF4-FFF2-40B4-BE49-F238E27FC236}">
-                <a16:creationId xmlns:a16="http://schemas.microsoft.com/office/drawing/2014/main" id="{D3CAA142-D08C-46B1-9AC8-27C45F1500C0}"/>
-              </a:ext>
-            </a:extLst>
-          </p:cNvPr>
-          <p:cNvSpPr txBox="1"/>
-          <p:nvPr/>
-        </p:nvSpPr>
-        <p:spPr>
-          <a:xfrm>
-            <a:off x="4056183" y="5139195"/>
-            <a:ext cx="4079633" cy="646331"/>
-          </a:xfrm>
-          <a:prstGeom prst="rect">
-            <a:avLst/>
-          </a:prstGeom>
-          <a:noFill/>
-          <a:ln>
-            <a:solidFill>
-              <a:schemeClr val="tx1"/>
-            </a:solidFill>
-          </a:ln>
-        </p:spPr>
-        <p:txBody>
-          <a:bodyPr wrap="square" rtlCol="0">
-            <a:spAutoFit/>
-          </a:bodyPr>
-          <a:lstStyle/>
-          <a:p>
-            <a:r>
-              <a:rPr lang="en-CA" sz="3600" dirty="0" err="1"/>
-              <a:t>Environnemental</a:t>
-            </a:r>
-            <a:endParaRPr lang="en-CA" sz="4400" dirty="0"/>
-          </a:p>
-        </p:txBody>
-      </p:sp>
-      <p:sp>
-        <p:nvSpPr>
-          <p:cNvPr id="8" name="TextBox 7">
-            <a:extLst>
-              <a:ext uri="{FF2B5EF4-FFF2-40B4-BE49-F238E27FC236}">
-                <a16:creationId xmlns:a16="http://schemas.microsoft.com/office/drawing/2014/main" id="{2E319D2A-B7F1-4E3F-89D4-617D468E87BA}"/>
-              </a:ext>
-            </a:extLst>
-          </p:cNvPr>
-          <p:cNvSpPr txBox="1"/>
-          <p:nvPr/>
-        </p:nvSpPr>
-        <p:spPr>
-          <a:xfrm>
-            <a:off x="8974013" y="3110289"/>
-            <a:ext cx="1395047" cy="646331"/>
-          </a:xfrm>
-          <a:prstGeom prst="rect">
-            <a:avLst/>
-          </a:prstGeom>
-          <a:noFill/>
-          <a:ln>
-            <a:solidFill>
-              <a:schemeClr val="tx1"/>
-            </a:solidFill>
-          </a:ln>
-        </p:spPr>
-        <p:txBody>
-          <a:bodyPr wrap="square" rtlCol="0">
-            <a:spAutoFit/>
-          </a:bodyPr>
-          <a:lstStyle/>
-          <a:p>
-            <a:r>
-              <a:rPr lang="en-CA" sz="3600" dirty="0" err="1"/>
-              <a:t>Légal</a:t>
-            </a:r>
-            <a:endParaRPr lang="en-CA" sz="4400" dirty="0"/>
-          </a:p>
-        </p:txBody>
-      </p:sp>
-      <p:cxnSp>
-        <p:nvCxnSpPr>
-          <p:cNvPr id="10" name="Straight Arrow Connector 9">
-            <a:extLst>
-              <a:ext uri="{FF2B5EF4-FFF2-40B4-BE49-F238E27FC236}">
-                <a16:creationId xmlns:a16="http://schemas.microsoft.com/office/drawing/2014/main" id="{F4073090-02B2-428A-9BE3-7C5EE672EC62}"/>
-              </a:ext>
-            </a:extLst>
-          </p:cNvPr>
-          <p:cNvCxnSpPr>
-            <a:cxnSpLocks/>
-            <a:stCxn id="5" idx="2"/>
-            <a:endCxn id="4" idx="0"/>
-          </p:cNvCxnSpPr>
-          <p:nvPr/>
-        </p:nvCxnSpPr>
-        <p:spPr>
-          <a:xfrm>
-            <a:off x="6095999" y="1727714"/>
-            <a:ext cx="1" cy="1305631"/>
-          </a:xfrm>
-          <a:prstGeom prst="straightConnector1">
-            <a:avLst/>
-          </a:prstGeom>
-          <a:ln>
-            <a:tailEnd type="triangle"/>
-          </a:ln>
-        </p:spPr>
-        <p:style>
-          <a:lnRef idx="1">
-            <a:schemeClr val="accent1"/>
-          </a:lnRef>
-          <a:fillRef idx="0">
-            <a:schemeClr val="accent1"/>
-          </a:fillRef>
-          <a:effectRef idx="0">
-            <a:schemeClr val="accent1"/>
-          </a:effectRef>
-          <a:fontRef idx="minor">
-            <a:schemeClr val="tx1"/>
-          </a:fontRef>
-        </p:style>
-      </p:cxnSp>
-      <p:cxnSp>
-        <p:nvCxnSpPr>
-          <p:cNvPr id="16" name="Straight Arrow Connector 15">
-            <a:extLst>
-              <a:ext uri="{FF2B5EF4-FFF2-40B4-BE49-F238E27FC236}">
-                <a16:creationId xmlns:a16="http://schemas.microsoft.com/office/drawing/2014/main" id="{521DF92E-F87B-4431-8A71-46207BAB0549}"/>
-              </a:ext>
-            </a:extLst>
-          </p:cNvPr>
-          <p:cNvCxnSpPr>
-            <a:stCxn id="6" idx="3"/>
-            <a:endCxn id="4" idx="1"/>
-          </p:cNvCxnSpPr>
-          <p:nvPr/>
-        </p:nvCxnSpPr>
-        <p:spPr>
-          <a:xfrm flipV="1">
-            <a:off x="3349871" y="3418066"/>
-            <a:ext cx="1896206" cy="15388"/>
-          </a:xfrm>
-          <a:prstGeom prst="straightConnector1">
-            <a:avLst/>
-          </a:prstGeom>
-          <a:ln>
-            <a:tailEnd type="triangle"/>
-          </a:ln>
-        </p:spPr>
-        <p:style>
-          <a:lnRef idx="1">
-            <a:schemeClr val="accent1"/>
-          </a:lnRef>
-          <a:fillRef idx="0">
-            <a:schemeClr val="accent1"/>
-          </a:fillRef>
-          <a:effectRef idx="0">
-            <a:schemeClr val="accent1"/>
-          </a:effectRef>
-          <a:fontRef idx="minor">
-            <a:schemeClr val="tx1"/>
-          </a:fontRef>
-        </p:style>
-      </p:cxnSp>
-      <p:cxnSp>
-        <p:nvCxnSpPr>
-          <p:cNvPr id="18" name="Straight Arrow Connector 17">
-            <a:extLst>
-              <a:ext uri="{FF2B5EF4-FFF2-40B4-BE49-F238E27FC236}">
-                <a16:creationId xmlns:a16="http://schemas.microsoft.com/office/drawing/2014/main" id="{A2E2B531-927A-44FC-8451-9F38118E6F9C}"/>
-              </a:ext>
-            </a:extLst>
-          </p:cNvPr>
-          <p:cNvCxnSpPr>
-            <a:stCxn id="8" idx="1"/>
-            <a:endCxn id="4" idx="3"/>
-          </p:cNvCxnSpPr>
-          <p:nvPr/>
-        </p:nvCxnSpPr>
-        <p:spPr>
-          <a:xfrm flipH="1" flipV="1">
-            <a:off x="6945923" y="3418066"/>
-            <a:ext cx="2028090" cy="15389"/>
-          </a:xfrm>
-          <a:prstGeom prst="straightConnector1">
-            <a:avLst/>
-          </a:prstGeom>
-          <a:ln>
-            <a:tailEnd type="triangle"/>
-          </a:ln>
-        </p:spPr>
-        <p:style>
-          <a:lnRef idx="1">
-            <a:schemeClr val="accent1"/>
-          </a:lnRef>
-          <a:fillRef idx="0">
-            <a:schemeClr val="accent1"/>
-          </a:fillRef>
-          <a:effectRef idx="0">
-            <a:schemeClr val="accent1"/>
-          </a:effectRef>
-          <a:fontRef idx="minor">
-            <a:schemeClr val="tx1"/>
-          </a:fontRef>
-        </p:style>
-      </p:cxnSp>
-      <p:cxnSp>
-        <p:nvCxnSpPr>
-          <p:cNvPr id="20" name="Straight Arrow Connector 19">
-            <a:extLst>
-              <a:ext uri="{FF2B5EF4-FFF2-40B4-BE49-F238E27FC236}">
-                <a16:creationId xmlns:a16="http://schemas.microsoft.com/office/drawing/2014/main" id="{53CFFADB-5B42-4AA0-972A-6F2DE8E75E76}"/>
-              </a:ext>
-            </a:extLst>
-          </p:cNvPr>
-          <p:cNvCxnSpPr>
-            <a:stCxn id="7" idx="0"/>
-            <a:endCxn id="4" idx="2"/>
-          </p:cNvCxnSpPr>
-          <p:nvPr/>
-        </p:nvCxnSpPr>
-        <p:spPr>
-          <a:xfrm flipV="1">
-            <a:off x="6096000" y="3802786"/>
-            <a:ext cx="0" cy="1336409"/>
-          </a:xfrm>
-          <a:prstGeom prst="straightConnector1">
-            <a:avLst/>
-          </a:prstGeom>
-          <a:ln>
-            <a:tailEnd type="triangle"/>
-          </a:ln>
-        </p:spPr>
-        <p:style>
-          <a:lnRef idx="1">
-            <a:schemeClr val="accent1"/>
-          </a:lnRef>
-          <a:fillRef idx="0">
-            <a:schemeClr val="accent1"/>
-          </a:fillRef>
-          <a:effectRef idx="0">
-            <a:schemeClr val="accent1"/>
-          </a:effectRef>
-          <a:fontRef idx="minor">
-            <a:schemeClr val="tx1"/>
-          </a:fontRef>
-        </p:style>
-      </p:cxnSp>
-    </p:spTree>
-    <p:extLst>
-      <p:ext uri="{BB962C8B-B14F-4D97-AF65-F5344CB8AC3E}">
-        <p14:creationId xmlns:p14="http://schemas.microsoft.com/office/powerpoint/2010/main" val="752424227"/>
-      </p:ext>
-    </p:extLst>
-  </p:cSld>
-  <p:clrMapOvr>
-    <a:masterClrMapping/>
-  </p:clrMapOvr>
-</p:sld>
-</file>
-
-<file path=ppt/slides/slide5.xml><?xml version="1.0" encoding="utf-8"?>
-<p:sld xmlns:a="http://schemas.openxmlformats.org/drawingml/2006/main" xmlns:r="http://schemas.openxmlformats.org/officeDocument/2006/relationships" xmlns:p="http://schemas.openxmlformats.org/presentationml/2006/main">
-  <p:cSld>
-    <p:spTree>
-      <p:nvGrpSpPr>
-        <p:cNvPr id="1" name=""/>
-        <p:cNvGrpSpPr/>
-        <p:nvPr/>
-      </p:nvGrpSpPr>
-      <p:grpSpPr>
-        <a:xfrm>
-          <a:off x="0" y="0"/>
-          <a:ext cx="0" cy="0"/>
-          <a:chOff x="0" y="0"/>
-          <a:chExt cx="0" cy="0"/>
-        </a:xfrm>
-      </p:grpSpPr>
-      <p:sp>
-        <p:nvSpPr>
-          <p:cNvPr id="4" name="TextBox 3">
-            <a:extLst>
-              <a:ext uri="{FF2B5EF4-FFF2-40B4-BE49-F238E27FC236}">
-                <a16:creationId xmlns:a16="http://schemas.microsoft.com/office/drawing/2014/main" id="{8496E773-06F6-4193-B827-83CC23D2D9B0}"/>
-              </a:ext>
-            </a:extLst>
-          </p:cNvPr>
-          <p:cNvSpPr txBox="1"/>
-          <p:nvPr/>
-        </p:nvSpPr>
-        <p:spPr>
-          <a:xfrm>
-            <a:off x="3121267" y="1093175"/>
-            <a:ext cx="6734910" cy="646331"/>
-          </a:xfrm>
-          <a:prstGeom prst="rect">
-            <a:avLst/>
-          </a:prstGeom>
-          <a:noFill/>
-          <a:ln>
-            <a:solidFill>
-              <a:schemeClr val="tx1"/>
-            </a:solidFill>
-          </a:ln>
-        </p:spPr>
-        <p:txBody>
-          <a:bodyPr wrap="square" rtlCol="0">
-            <a:spAutoFit/>
-          </a:bodyPr>
-          <a:lstStyle/>
-          <a:p>
-            <a:r>
-              <a:rPr lang="en-CA" sz="3600" dirty="0"/>
-              <a:t>1 - Conservation des </a:t>
-            </a:r>
-            <a:r>
-              <a:rPr lang="en-CA" sz="3600" dirty="0" err="1"/>
-              <a:t>abeilles</a:t>
-            </a:r>
-            <a:endParaRPr lang="en-CA" sz="3600" dirty="0"/>
-          </a:p>
-        </p:txBody>
-      </p:sp>
-      <p:sp>
-        <p:nvSpPr>
-          <p:cNvPr id="5" name="TextBox 4">
-            <a:extLst>
-              <a:ext uri="{FF2B5EF4-FFF2-40B4-BE49-F238E27FC236}">
-                <a16:creationId xmlns:a16="http://schemas.microsoft.com/office/drawing/2014/main" id="{4867A4D4-F475-419D-A945-D19F08351F33}"/>
-              </a:ext>
-            </a:extLst>
-          </p:cNvPr>
-          <p:cNvSpPr txBox="1"/>
-          <p:nvPr/>
-        </p:nvSpPr>
-        <p:spPr>
-          <a:xfrm>
-            <a:off x="3121267" y="2819398"/>
-            <a:ext cx="8229602" cy="769441"/>
-          </a:xfrm>
-          <a:prstGeom prst="rect">
-            <a:avLst/>
-          </a:prstGeom>
-          <a:noFill/>
-          <a:ln>
-            <a:solidFill>
-              <a:schemeClr val="tx1"/>
-            </a:solidFill>
-          </a:ln>
-        </p:spPr>
-        <p:txBody>
-          <a:bodyPr wrap="square" rtlCol="0">
-            <a:spAutoFit/>
-          </a:bodyPr>
-          <a:lstStyle/>
-          <a:p>
-            <a:r>
-              <a:rPr lang="en-CA" sz="4400" dirty="0"/>
-              <a:t>2 - </a:t>
-            </a:r>
-            <a:r>
-              <a:rPr lang="en-CA" sz="3600" dirty="0" err="1"/>
-              <a:t>Atteindre</a:t>
-            </a:r>
-            <a:r>
-              <a:rPr lang="en-CA" sz="3600" dirty="0"/>
-              <a:t> les </a:t>
-            </a:r>
-            <a:r>
-              <a:rPr lang="en-CA" sz="3600" dirty="0" err="1"/>
-              <a:t>objectifs</a:t>
-            </a:r>
-            <a:r>
-              <a:rPr lang="en-CA" sz="3600" dirty="0"/>
-              <a:t> de ventes</a:t>
-            </a:r>
-            <a:endParaRPr lang="en-CA" sz="4400" dirty="0"/>
-          </a:p>
-        </p:txBody>
-      </p:sp>
-      <p:sp>
-        <p:nvSpPr>
-          <p:cNvPr id="6" name="TextBox 5">
-            <a:extLst>
-              <a:ext uri="{FF2B5EF4-FFF2-40B4-BE49-F238E27FC236}">
-                <a16:creationId xmlns:a16="http://schemas.microsoft.com/office/drawing/2014/main" id="{6FDE0949-A647-41E2-9FDB-C906D0A1C64E}"/>
-              </a:ext>
-            </a:extLst>
-          </p:cNvPr>
-          <p:cNvSpPr txBox="1"/>
-          <p:nvPr/>
-        </p:nvSpPr>
-        <p:spPr>
-          <a:xfrm>
-            <a:off x="3121267" y="4536827"/>
-            <a:ext cx="7587764" cy="769441"/>
-          </a:xfrm>
-          <a:prstGeom prst="rect">
-            <a:avLst/>
-          </a:prstGeom>
-          <a:noFill/>
-          <a:ln>
-            <a:solidFill>
-              <a:schemeClr val="tx1"/>
-            </a:solidFill>
-          </a:ln>
-        </p:spPr>
-        <p:txBody>
-          <a:bodyPr wrap="square" rtlCol="0">
-            <a:spAutoFit/>
-          </a:bodyPr>
-          <a:lstStyle/>
-          <a:p>
-            <a:r>
-              <a:rPr lang="en-CA" sz="4400" dirty="0"/>
-              <a:t>3 - </a:t>
-            </a:r>
-            <a:r>
-              <a:rPr lang="en-CA" sz="3600" dirty="0" err="1"/>
-              <a:t>Faciliter</a:t>
-            </a:r>
-            <a:r>
-              <a:rPr lang="en-CA" sz="3600" dirty="0"/>
-              <a:t> la vie aux </a:t>
-            </a:r>
-            <a:r>
-              <a:rPr lang="en-CA" sz="3600" dirty="0" err="1"/>
-              <a:t>apiculteurs</a:t>
-            </a:r>
-            <a:endParaRPr lang="en-CA" sz="4400" dirty="0"/>
-          </a:p>
-        </p:txBody>
-      </p:sp>
-    </p:spTree>
-    <p:extLst>
-      <p:ext uri="{BB962C8B-B14F-4D97-AF65-F5344CB8AC3E}">
-        <p14:creationId xmlns:p14="http://schemas.microsoft.com/office/powerpoint/2010/main" val="4108082058"/>
-      </p:ext>
-    </p:extLst>
-  </p:cSld>
-  <p:clrMapOvr>
-    <a:masterClrMapping/>
-  </p:clrMapOvr>
-</p:sld>
-</file>
-
-<file path=ppt/slides/slide6.xml><?xml version="1.0" encoding="utf-8"?>
-<p:sld xmlns:a="http://schemas.openxmlformats.org/drawingml/2006/main" xmlns:r="http://schemas.openxmlformats.org/officeDocument/2006/relationships" xmlns:p="http://schemas.openxmlformats.org/presentationml/2006/main">
-  <p:cSld>
-    <p:spTree>
-      <p:nvGrpSpPr>
-        <p:cNvPr id="1" name=""/>
-        <p:cNvGrpSpPr/>
-        <p:nvPr/>
-      </p:nvGrpSpPr>
-      <p:grpSpPr>
-        <a:xfrm>
-          <a:off x="0" y="0"/>
-          <a:ext cx="0" cy="0"/>
-          <a:chOff x="0" y="0"/>
-          <a:chExt cx="0" cy="0"/>
-        </a:xfrm>
-      </p:grpSpPr>
-      <p:sp>
-        <p:nvSpPr>
-          <p:cNvPr id="2" name="Title 1">
-            <a:extLst>
-              <a:ext uri="{FF2B5EF4-FFF2-40B4-BE49-F238E27FC236}">
-                <a16:creationId xmlns:a16="http://schemas.microsoft.com/office/drawing/2014/main" id="{532BB36A-66E0-4644-AB8F-8DCB79605DD1}"/>
-              </a:ext>
-            </a:extLst>
-          </p:cNvPr>
-          <p:cNvSpPr>
-            <a:spLocks noGrp="1"/>
-          </p:cNvSpPr>
-          <p:nvPr>
-            <p:ph type="title"/>
-          </p:nvPr>
-        </p:nvSpPr>
-        <p:spPr/>
-        <p:txBody>
-          <a:bodyPr/>
-          <a:lstStyle/>
-          <a:p>
-            <a:r>
-              <a:rPr lang="en-CA" dirty="0"/>
-              <a:t>Architecture </a:t>
-            </a:r>
-            <a:r>
-              <a:rPr lang="en-CA" dirty="0" err="1"/>
-              <a:t>Globale</a:t>
-            </a:r>
-            <a:endParaRPr lang="en-CA" dirty="0"/>
           </a:p>
         </p:txBody>
       </p:sp>
       <p:pic>
         <p:nvPicPr>
-          <p:cNvPr id="5" name="Content Placeholder 4">
+          <p:cNvPr id="5" name="Espace réservé du contenu 4">
             <a:extLst>
               <a:ext uri="{FF2B5EF4-FFF2-40B4-BE49-F238E27FC236}">
-                <a16:creationId xmlns:a16="http://schemas.microsoft.com/office/drawing/2014/main" id="{660134EC-F451-4D02-B3E6-A1B9A23CE0AA}"/>
+                <a16:creationId xmlns:a16="http://schemas.microsoft.com/office/drawing/2014/main" id="{4AF0EF25-7753-46ED-9613-2F18C8B79944}"/>
               </a:ext>
             </a:extLst>
           </p:cNvPr>
@@ -18188,15 +17454,110 @@
         </p:blipFill>
         <p:spPr>
           <a:xfrm>
-            <a:off x="647297" y="2679455"/>
-            <a:ext cx="11138670" cy="2180895"/>
+            <a:off x="1741724" y="1357548"/>
+            <a:ext cx="5852517" cy="5300972"/>
           </a:xfrm>
         </p:spPr>
       </p:pic>
+      <p:sp>
+        <p:nvSpPr>
+          <p:cNvPr id="6" name="ZoneTexte 5">
+            <a:extLst>
+              <a:ext uri="{FF2B5EF4-FFF2-40B4-BE49-F238E27FC236}">
+                <a16:creationId xmlns:a16="http://schemas.microsoft.com/office/drawing/2014/main" id="{48F0035F-D3A6-4121-AB60-39995408F8F8}"/>
+              </a:ext>
+            </a:extLst>
+          </p:cNvPr>
+          <p:cNvSpPr txBox="1"/>
+          <p:nvPr/>
+        </p:nvSpPr>
+        <p:spPr>
+          <a:xfrm>
+            <a:off x="8122277" y="2644462"/>
+            <a:ext cx="3955884" cy="954107"/>
+          </a:xfrm>
+          <a:prstGeom prst="rect">
+            <a:avLst/>
+          </a:prstGeom>
+          <a:noFill/>
+        </p:spPr>
+        <p:txBody>
+          <a:bodyPr wrap="square" rtlCol="0">
+            <a:spAutoFit/>
+          </a:bodyPr>
+          <a:lstStyle/>
+          <a:p>
+            <a:r>
+              <a:rPr lang="fr-CA" sz="2800" b="1" dirty="0">
+                <a:ln w="12700">
+                  <a:solidFill>
+                    <a:schemeClr val="accent3">
+                      <a:lumMod val="50000"/>
+                    </a:schemeClr>
+                  </a:solidFill>
+                  <a:prstDash val="solid"/>
+                </a:ln>
+                <a:pattFill prst="narHorz">
+                  <a:fgClr>
+                    <a:schemeClr val="accent3"/>
+                  </a:fgClr>
+                  <a:bgClr>
+                    <a:schemeClr val="accent3">
+                      <a:lumMod val="40000"/>
+                      <a:lumOff val="60000"/>
+                    </a:schemeClr>
+                  </a:bgClr>
+                </a:pattFill>
+                <a:effectLst>
+                  <a:innerShdw blurRad="177800">
+                    <a:schemeClr val="accent3">
+                      <a:lumMod val="50000"/>
+                    </a:schemeClr>
+                  </a:innerShdw>
+                </a:effectLst>
+              </a:rPr>
+              <a:t>Diminuer la mortalité </a:t>
+            </a:r>
+          </a:p>
+          <a:p>
+            <a:r>
+              <a:rPr lang="fr-CA" sz="2800" b="1" dirty="0">
+                <a:ln w="12700">
+                  <a:solidFill>
+                    <a:schemeClr val="accent3">
+                      <a:lumMod val="50000"/>
+                    </a:schemeClr>
+                  </a:solidFill>
+                  <a:prstDash val="solid"/>
+                </a:ln>
+                <a:pattFill prst="narHorz">
+                  <a:fgClr>
+                    <a:schemeClr val="accent3"/>
+                  </a:fgClr>
+                  <a:bgClr>
+                    <a:schemeClr val="accent3">
+                      <a:lumMod val="40000"/>
+                      <a:lumOff val="60000"/>
+                    </a:schemeClr>
+                  </a:bgClr>
+                </a:pattFill>
+                <a:effectLst>
+                  <a:innerShdw blurRad="177800">
+                    <a:schemeClr val="accent3">
+                      <a:lumMod val="50000"/>
+                    </a:schemeClr>
+                  </a:innerShdw>
+                </a:effectLst>
+              </a:rPr>
+              <a:t>chez les abeilles</a:t>
+            </a:r>
+          </a:p>
+        </p:txBody>
+      </p:sp>
     </p:spTree>
     <p:extLst>
       <p:ext uri="{BB962C8B-B14F-4D97-AF65-F5344CB8AC3E}">
-        <p14:creationId xmlns:p14="http://schemas.microsoft.com/office/powerpoint/2010/main" val="1477707369"/>
+        <p14:creationId xmlns:p14="http://schemas.microsoft.com/office/powerpoint/2010/main" val="3298244842"/>
       </p:ext>
     </p:extLst>
   </p:cSld>
@@ -18206,7 +17567,7 @@
 </p:sld>
 </file>
 
-<file path=ppt/slides/slide7.xml><?xml version="1.0" encoding="utf-8"?>
+<file path=ppt/slides/slide4.xml><?xml version="1.0" encoding="utf-8"?>
 <p:sld xmlns:a="http://schemas.openxmlformats.org/drawingml/2006/main" xmlns:r="http://schemas.openxmlformats.org/officeDocument/2006/relationships" xmlns:p="http://schemas.openxmlformats.org/presentationml/2006/main">
   <p:cSld>
     <p:spTree>
@@ -18915,6 +18276,694 @@
     <p:extLst>
       <p:ext uri="{BB962C8B-B14F-4D97-AF65-F5344CB8AC3E}">
         <p14:creationId xmlns:p14="http://schemas.microsoft.com/office/powerpoint/2010/main" val="1208010039"/>
+      </p:ext>
+    </p:extLst>
+  </p:cSld>
+  <p:clrMapOvr>
+    <a:masterClrMapping/>
+  </p:clrMapOvr>
+</p:sld>
+</file>
+
+<file path=ppt/slides/slide5.xml><?xml version="1.0" encoding="utf-8"?>
+<p:sld xmlns:a="http://schemas.openxmlformats.org/drawingml/2006/main" xmlns:r="http://schemas.openxmlformats.org/officeDocument/2006/relationships" xmlns:p="http://schemas.openxmlformats.org/presentationml/2006/main">
+  <p:cSld>
+    <p:spTree>
+      <p:nvGrpSpPr>
+        <p:cNvPr id="1" name=""/>
+        <p:cNvGrpSpPr/>
+        <p:nvPr/>
+      </p:nvGrpSpPr>
+      <p:grpSpPr>
+        <a:xfrm>
+          <a:off x="0" y="0"/>
+          <a:ext cx="0" cy="0"/>
+          <a:chOff x="0" y="0"/>
+          <a:chExt cx="0" cy="0"/>
+        </a:xfrm>
+      </p:grpSpPr>
+      <p:sp>
+        <p:nvSpPr>
+          <p:cNvPr id="2" name="Title 1">
+            <a:extLst>
+              <a:ext uri="{FF2B5EF4-FFF2-40B4-BE49-F238E27FC236}">
+                <a16:creationId xmlns:a16="http://schemas.microsoft.com/office/drawing/2014/main" id="{532BB36A-66E0-4644-AB8F-8DCB79605DD1}"/>
+              </a:ext>
+            </a:extLst>
+          </p:cNvPr>
+          <p:cNvSpPr>
+            <a:spLocks noGrp="1"/>
+          </p:cNvSpPr>
+          <p:nvPr>
+            <p:ph type="title"/>
+          </p:nvPr>
+        </p:nvSpPr>
+        <p:spPr/>
+        <p:txBody>
+          <a:bodyPr/>
+          <a:lstStyle/>
+          <a:p>
+            <a:r>
+              <a:rPr lang="en-CA" dirty="0"/>
+              <a:t>Architecture </a:t>
+            </a:r>
+            <a:r>
+              <a:rPr lang="en-CA" dirty="0" err="1"/>
+              <a:t>Globale</a:t>
+            </a:r>
+            <a:endParaRPr lang="en-CA" dirty="0"/>
+          </a:p>
+        </p:txBody>
+      </p:sp>
+      <p:pic>
+        <p:nvPicPr>
+          <p:cNvPr id="5" name="Content Placeholder 4">
+            <a:extLst>
+              <a:ext uri="{FF2B5EF4-FFF2-40B4-BE49-F238E27FC236}">
+                <a16:creationId xmlns:a16="http://schemas.microsoft.com/office/drawing/2014/main" id="{660134EC-F451-4D02-B3E6-A1B9A23CE0AA}"/>
+              </a:ext>
+            </a:extLst>
+          </p:cNvPr>
+          <p:cNvPicPr>
+            <a:picLocks noGrp="1" noChangeAspect="1"/>
+          </p:cNvPicPr>
+          <p:nvPr>
+            <p:ph idx="1"/>
+          </p:nvPr>
+        </p:nvPicPr>
+        <p:blipFill>
+          <a:blip r:embed="rId2">
+            <a:extLst>
+              <a:ext uri="{28A0092B-C50C-407E-A947-70E740481C1C}">
+                <a14:useLocalDpi xmlns:a14="http://schemas.microsoft.com/office/drawing/2010/main" val="0"/>
+              </a:ext>
+            </a:extLst>
+          </a:blip>
+          <a:stretch>
+            <a:fillRect/>
+          </a:stretch>
+        </p:blipFill>
+        <p:spPr>
+          <a:xfrm>
+            <a:off x="647297" y="2679455"/>
+            <a:ext cx="11138670" cy="2180895"/>
+          </a:xfrm>
+        </p:spPr>
+      </p:pic>
+    </p:spTree>
+    <p:extLst>
+      <p:ext uri="{BB962C8B-B14F-4D97-AF65-F5344CB8AC3E}">
+        <p14:creationId xmlns:p14="http://schemas.microsoft.com/office/powerpoint/2010/main" val="1477707369"/>
+      </p:ext>
+    </p:extLst>
+  </p:cSld>
+  <p:clrMapOvr>
+    <a:masterClrMapping/>
+  </p:clrMapOvr>
+</p:sld>
+</file>
+
+<file path=ppt/slides/slide6.xml><?xml version="1.0" encoding="utf-8"?>
+<p:sld xmlns:a="http://schemas.openxmlformats.org/drawingml/2006/main" xmlns:r="http://schemas.openxmlformats.org/officeDocument/2006/relationships" xmlns:p="http://schemas.openxmlformats.org/presentationml/2006/main">
+  <p:cSld>
+    <p:spTree>
+      <p:nvGrpSpPr>
+        <p:cNvPr id="1" name=""/>
+        <p:cNvGrpSpPr/>
+        <p:nvPr/>
+      </p:nvGrpSpPr>
+      <p:grpSpPr>
+        <a:xfrm>
+          <a:off x="0" y="0"/>
+          <a:ext cx="0" cy="0"/>
+          <a:chOff x="0" y="0"/>
+          <a:chExt cx="0" cy="0"/>
+        </a:xfrm>
+      </p:grpSpPr>
+      <p:sp>
+        <p:nvSpPr>
+          <p:cNvPr id="4" name="TextBox 3">
+            <a:extLst>
+              <a:ext uri="{FF2B5EF4-FFF2-40B4-BE49-F238E27FC236}">
+                <a16:creationId xmlns:a16="http://schemas.microsoft.com/office/drawing/2014/main" id="{1326EBD1-4857-4831-A34D-591433424DBB}"/>
+              </a:ext>
+            </a:extLst>
+          </p:cNvPr>
+          <p:cNvSpPr txBox="1"/>
+          <p:nvPr/>
+        </p:nvSpPr>
+        <p:spPr>
+          <a:xfrm>
+            <a:off x="5246077" y="3033345"/>
+            <a:ext cx="1699846" cy="769441"/>
+          </a:xfrm>
+          <a:prstGeom prst="rect">
+            <a:avLst/>
+          </a:prstGeom>
+          <a:noFill/>
+          <a:ln>
+            <a:solidFill>
+              <a:schemeClr val="tx1"/>
+            </a:solidFill>
+          </a:ln>
+        </p:spPr>
+        <p:txBody>
+          <a:bodyPr wrap="square" rtlCol="0">
+            <a:spAutoFit/>
+          </a:bodyPr>
+          <a:lstStyle/>
+          <a:p>
+            <a:r>
+              <a:rPr lang="en-CA" sz="4400" dirty="0" err="1"/>
+              <a:t>Défis</a:t>
+            </a:r>
+            <a:endParaRPr lang="en-CA" sz="5400" dirty="0"/>
+          </a:p>
+        </p:txBody>
+      </p:sp>
+      <p:sp>
+        <p:nvSpPr>
+          <p:cNvPr id="5" name="TextBox 4">
+            <a:extLst>
+              <a:ext uri="{FF2B5EF4-FFF2-40B4-BE49-F238E27FC236}">
+                <a16:creationId xmlns:a16="http://schemas.microsoft.com/office/drawing/2014/main" id="{A5D0788B-D9DA-4AE1-B011-CB8305D08EF6}"/>
+              </a:ext>
+            </a:extLst>
+          </p:cNvPr>
+          <p:cNvSpPr txBox="1"/>
+          <p:nvPr/>
+        </p:nvSpPr>
+        <p:spPr>
+          <a:xfrm>
+            <a:off x="4443044" y="1081383"/>
+            <a:ext cx="3305909" cy="646331"/>
+          </a:xfrm>
+          <a:prstGeom prst="rect">
+            <a:avLst/>
+          </a:prstGeom>
+          <a:noFill/>
+          <a:ln>
+            <a:solidFill>
+              <a:schemeClr val="tx1"/>
+            </a:solidFill>
+          </a:ln>
+        </p:spPr>
+        <p:txBody>
+          <a:bodyPr wrap="square" rtlCol="0">
+            <a:spAutoFit/>
+          </a:bodyPr>
+          <a:lstStyle/>
+          <a:p>
+            <a:pPr algn="ctr"/>
+            <a:r>
+              <a:rPr lang="en-CA" sz="3600" dirty="0" err="1"/>
+              <a:t>Économique</a:t>
+            </a:r>
+            <a:endParaRPr lang="en-CA" sz="4400" dirty="0"/>
+          </a:p>
+        </p:txBody>
+      </p:sp>
+      <p:sp>
+        <p:nvSpPr>
+          <p:cNvPr id="6" name="TextBox 5">
+            <a:extLst>
+              <a:ext uri="{FF2B5EF4-FFF2-40B4-BE49-F238E27FC236}">
+                <a16:creationId xmlns:a16="http://schemas.microsoft.com/office/drawing/2014/main" id="{64719C85-A8BF-4DF6-8DDD-0491184F54C1}"/>
+              </a:ext>
+            </a:extLst>
+          </p:cNvPr>
+          <p:cNvSpPr txBox="1"/>
+          <p:nvPr/>
+        </p:nvSpPr>
+        <p:spPr>
+          <a:xfrm>
+            <a:off x="1822940" y="3110288"/>
+            <a:ext cx="1526931" cy="646331"/>
+          </a:xfrm>
+          <a:prstGeom prst="rect">
+            <a:avLst/>
+          </a:prstGeom>
+          <a:noFill/>
+          <a:ln>
+            <a:solidFill>
+              <a:schemeClr val="tx1"/>
+            </a:solidFill>
+          </a:ln>
+        </p:spPr>
+        <p:txBody>
+          <a:bodyPr wrap="square" rtlCol="0">
+            <a:spAutoFit/>
+          </a:bodyPr>
+          <a:lstStyle/>
+          <a:p>
+            <a:r>
+              <a:rPr lang="en-CA" sz="3600" dirty="0"/>
+              <a:t>Social</a:t>
+            </a:r>
+            <a:endParaRPr lang="en-CA" sz="4400" dirty="0"/>
+          </a:p>
+        </p:txBody>
+      </p:sp>
+      <p:sp>
+        <p:nvSpPr>
+          <p:cNvPr id="7" name="TextBox 6">
+            <a:extLst>
+              <a:ext uri="{FF2B5EF4-FFF2-40B4-BE49-F238E27FC236}">
+                <a16:creationId xmlns:a16="http://schemas.microsoft.com/office/drawing/2014/main" id="{D3CAA142-D08C-46B1-9AC8-27C45F1500C0}"/>
+              </a:ext>
+            </a:extLst>
+          </p:cNvPr>
+          <p:cNvSpPr txBox="1"/>
+          <p:nvPr/>
+        </p:nvSpPr>
+        <p:spPr>
+          <a:xfrm>
+            <a:off x="4056183" y="5139195"/>
+            <a:ext cx="4079633" cy="646331"/>
+          </a:xfrm>
+          <a:prstGeom prst="rect">
+            <a:avLst/>
+          </a:prstGeom>
+          <a:noFill/>
+          <a:ln>
+            <a:solidFill>
+              <a:schemeClr val="tx1"/>
+            </a:solidFill>
+          </a:ln>
+        </p:spPr>
+        <p:txBody>
+          <a:bodyPr wrap="square" rtlCol="0">
+            <a:spAutoFit/>
+          </a:bodyPr>
+          <a:lstStyle/>
+          <a:p>
+            <a:r>
+              <a:rPr lang="en-CA" sz="3600" dirty="0" err="1"/>
+              <a:t>Environnemental</a:t>
+            </a:r>
+            <a:endParaRPr lang="en-CA" sz="4400" dirty="0"/>
+          </a:p>
+        </p:txBody>
+      </p:sp>
+      <p:sp>
+        <p:nvSpPr>
+          <p:cNvPr id="8" name="TextBox 7">
+            <a:extLst>
+              <a:ext uri="{FF2B5EF4-FFF2-40B4-BE49-F238E27FC236}">
+                <a16:creationId xmlns:a16="http://schemas.microsoft.com/office/drawing/2014/main" id="{2E319D2A-B7F1-4E3F-89D4-617D468E87BA}"/>
+              </a:ext>
+            </a:extLst>
+          </p:cNvPr>
+          <p:cNvSpPr txBox="1"/>
+          <p:nvPr/>
+        </p:nvSpPr>
+        <p:spPr>
+          <a:xfrm>
+            <a:off x="8974013" y="3110289"/>
+            <a:ext cx="1395047" cy="646331"/>
+          </a:xfrm>
+          <a:prstGeom prst="rect">
+            <a:avLst/>
+          </a:prstGeom>
+          <a:noFill/>
+          <a:ln>
+            <a:solidFill>
+              <a:schemeClr val="tx1"/>
+            </a:solidFill>
+          </a:ln>
+        </p:spPr>
+        <p:txBody>
+          <a:bodyPr wrap="square" rtlCol="0">
+            <a:spAutoFit/>
+          </a:bodyPr>
+          <a:lstStyle/>
+          <a:p>
+            <a:r>
+              <a:rPr lang="en-CA" sz="3600" dirty="0" err="1"/>
+              <a:t>Légal</a:t>
+            </a:r>
+            <a:endParaRPr lang="en-CA" sz="4400" dirty="0"/>
+          </a:p>
+        </p:txBody>
+      </p:sp>
+      <p:cxnSp>
+        <p:nvCxnSpPr>
+          <p:cNvPr id="10" name="Straight Arrow Connector 9">
+            <a:extLst>
+              <a:ext uri="{FF2B5EF4-FFF2-40B4-BE49-F238E27FC236}">
+                <a16:creationId xmlns:a16="http://schemas.microsoft.com/office/drawing/2014/main" id="{F4073090-02B2-428A-9BE3-7C5EE672EC62}"/>
+              </a:ext>
+            </a:extLst>
+          </p:cNvPr>
+          <p:cNvCxnSpPr>
+            <a:cxnSpLocks/>
+            <a:stCxn id="5" idx="2"/>
+            <a:endCxn id="4" idx="0"/>
+          </p:cNvCxnSpPr>
+          <p:nvPr/>
+        </p:nvCxnSpPr>
+        <p:spPr>
+          <a:xfrm>
+            <a:off x="6095999" y="1727714"/>
+            <a:ext cx="1" cy="1305631"/>
+          </a:xfrm>
+          <a:prstGeom prst="straightConnector1">
+            <a:avLst/>
+          </a:prstGeom>
+          <a:ln>
+            <a:tailEnd type="triangle"/>
+          </a:ln>
+        </p:spPr>
+        <p:style>
+          <a:lnRef idx="1">
+            <a:schemeClr val="accent1"/>
+          </a:lnRef>
+          <a:fillRef idx="0">
+            <a:schemeClr val="accent1"/>
+          </a:fillRef>
+          <a:effectRef idx="0">
+            <a:schemeClr val="accent1"/>
+          </a:effectRef>
+          <a:fontRef idx="minor">
+            <a:schemeClr val="tx1"/>
+          </a:fontRef>
+        </p:style>
+      </p:cxnSp>
+      <p:cxnSp>
+        <p:nvCxnSpPr>
+          <p:cNvPr id="16" name="Straight Arrow Connector 15">
+            <a:extLst>
+              <a:ext uri="{FF2B5EF4-FFF2-40B4-BE49-F238E27FC236}">
+                <a16:creationId xmlns:a16="http://schemas.microsoft.com/office/drawing/2014/main" id="{521DF92E-F87B-4431-8A71-46207BAB0549}"/>
+              </a:ext>
+            </a:extLst>
+          </p:cNvPr>
+          <p:cNvCxnSpPr>
+            <a:stCxn id="6" idx="3"/>
+            <a:endCxn id="4" idx="1"/>
+          </p:cNvCxnSpPr>
+          <p:nvPr/>
+        </p:nvCxnSpPr>
+        <p:spPr>
+          <a:xfrm flipV="1">
+            <a:off x="3349871" y="3418066"/>
+            <a:ext cx="1896206" cy="15388"/>
+          </a:xfrm>
+          <a:prstGeom prst="straightConnector1">
+            <a:avLst/>
+          </a:prstGeom>
+          <a:ln>
+            <a:tailEnd type="triangle"/>
+          </a:ln>
+        </p:spPr>
+        <p:style>
+          <a:lnRef idx="1">
+            <a:schemeClr val="accent1"/>
+          </a:lnRef>
+          <a:fillRef idx="0">
+            <a:schemeClr val="accent1"/>
+          </a:fillRef>
+          <a:effectRef idx="0">
+            <a:schemeClr val="accent1"/>
+          </a:effectRef>
+          <a:fontRef idx="minor">
+            <a:schemeClr val="tx1"/>
+          </a:fontRef>
+        </p:style>
+      </p:cxnSp>
+      <p:cxnSp>
+        <p:nvCxnSpPr>
+          <p:cNvPr id="18" name="Straight Arrow Connector 17">
+            <a:extLst>
+              <a:ext uri="{FF2B5EF4-FFF2-40B4-BE49-F238E27FC236}">
+                <a16:creationId xmlns:a16="http://schemas.microsoft.com/office/drawing/2014/main" id="{A2E2B531-927A-44FC-8451-9F38118E6F9C}"/>
+              </a:ext>
+            </a:extLst>
+          </p:cNvPr>
+          <p:cNvCxnSpPr>
+            <a:stCxn id="8" idx="1"/>
+            <a:endCxn id="4" idx="3"/>
+          </p:cNvCxnSpPr>
+          <p:nvPr/>
+        </p:nvCxnSpPr>
+        <p:spPr>
+          <a:xfrm flipH="1" flipV="1">
+            <a:off x="6945923" y="3418066"/>
+            <a:ext cx="2028090" cy="15389"/>
+          </a:xfrm>
+          <a:prstGeom prst="straightConnector1">
+            <a:avLst/>
+          </a:prstGeom>
+          <a:ln>
+            <a:tailEnd type="triangle"/>
+          </a:ln>
+        </p:spPr>
+        <p:style>
+          <a:lnRef idx="1">
+            <a:schemeClr val="accent1"/>
+          </a:lnRef>
+          <a:fillRef idx="0">
+            <a:schemeClr val="accent1"/>
+          </a:fillRef>
+          <a:effectRef idx="0">
+            <a:schemeClr val="accent1"/>
+          </a:effectRef>
+          <a:fontRef idx="minor">
+            <a:schemeClr val="tx1"/>
+          </a:fontRef>
+        </p:style>
+      </p:cxnSp>
+      <p:cxnSp>
+        <p:nvCxnSpPr>
+          <p:cNvPr id="20" name="Straight Arrow Connector 19">
+            <a:extLst>
+              <a:ext uri="{FF2B5EF4-FFF2-40B4-BE49-F238E27FC236}">
+                <a16:creationId xmlns:a16="http://schemas.microsoft.com/office/drawing/2014/main" id="{53CFFADB-5B42-4AA0-972A-6F2DE8E75E76}"/>
+              </a:ext>
+            </a:extLst>
+          </p:cNvPr>
+          <p:cNvCxnSpPr>
+            <a:stCxn id="7" idx="0"/>
+            <a:endCxn id="4" idx="2"/>
+          </p:cNvCxnSpPr>
+          <p:nvPr/>
+        </p:nvCxnSpPr>
+        <p:spPr>
+          <a:xfrm flipV="1">
+            <a:off x="6096000" y="3802786"/>
+            <a:ext cx="0" cy="1336409"/>
+          </a:xfrm>
+          <a:prstGeom prst="straightConnector1">
+            <a:avLst/>
+          </a:prstGeom>
+          <a:ln>
+            <a:tailEnd type="triangle"/>
+          </a:ln>
+        </p:spPr>
+        <p:style>
+          <a:lnRef idx="1">
+            <a:schemeClr val="accent1"/>
+          </a:lnRef>
+          <a:fillRef idx="0">
+            <a:schemeClr val="accent1"/>
+          </a:fillRef>
+          <a:effectRef idx="0">
+            <a:schemeClr val="accent1"/>
+          </a:effectRef>
+          <a:fontRef idx="minor">
+            <a:schemeClr val="tx1"/>
+          </a:fontRef>
+        </p:style>
+      </p:cxnSp>
+    </p:spTree>
+    <p:extLst>
+      <p:ext uri="{BB962C8B-B14F-4D97-AF65-F5344CB8AC3E}">
+        <p14:creationId xmlns:p14="http://schemas.microsoft.com/office/powerpoint/2010/main" val="752424227"/>
+      </p:ext>
+    </p:extLst>
+  </p:cSld>
+  <p:clrMapOvr>
+    <a:masterClrMapping/>
+  </p:clrMapOvr>
+</p:sld>
+</file>
+
+<file path=ppt/slides/slide7.xml><?xml version="1.0" encoding="utf-8"?>
+<p:sld xmlns:a="http://schemas.openxmlformats.org/drawingml/2006/main" xmlns:r="http://schemas.openxmlformats.org/officeDocument/2006/relationships" xmlns:p="http://schemas.openxmlformats.org/presentationml/2006/main">
+  <p:cSld>
+    <p:spTree>
+      <p:nvGrpSpPr>
+        <p:cNvPr id="1" name=""/>
+        <p:cNvGrpSpPr/>
+        <p:nvPr/>
+      </p:nvGrpSpPr>
+      <p:grpSpPr>
+        <a:xfrm>
+          <a:off x="0" y="0"/>
+          <a:ext cx="0" cy="0"/>
+          <a:chOff x="0" y="0"/>
+          <a:chExt cx="0" cy="0"/>
+        </a:xfrm>
+      </p:grpSpPr>
+      <p:sp>
+        <p:nvSpPr>
+          <p:cNvPr id="4" name="TextBox 3">
+            <a:extLst>
+              <a:ext uri="{FF2B5EF4-FFF2-40B4-BE49-F238E27FC236}">
+                <a16:creationId xmlns:a16="http://schemas.microsoft.com/office/drawing/2014/main" id="{8496E773-06F6-4193-B827-83CC23D2D9B0}"/>
+              </a:ext>
+            </a:extLst>
+          </p:cNvPr>
+          <p:cNvSpPr txBox="1"/>
+          <p:nvPr/>
+        </p:nvSpPr>
+        <p:spPr>
+          <a:xfrm>
+            <a:off x="3121267" y="1093175"/>
+            <a:ext cx="6734910" cy="646331"/>
+          </a:xfrm>
+          <a:prstGeom prst="rect">
+            <a:avLst/>
+          </a:prstGeom>
+          <a:noFill/>
+          <a:ln>
+            <a:solidFill>
+              <a:schemeClr val="tx1"/>
+            </a:solidFill>
+          </a:ln>
+        </p:spPr>
+        <p:txBody>
+          <a:bodyPr wrap="square" rtlCol="0">
+            <a:spAutoFit/>
+          </a:bodyPr>
+          <a:lstStyle/>
+          <a:p>
+            <a:r>
+              <a:rPr lang="en-CA" sz="3600" dirty="0"/>
+              <a:t>1 - Conservation des </a:t>
+            </a:r>
+            <a:r>
+              <a:rPr lang="en-CA" sz="3600" dirty="0" err="1"/>
+              <a:t>abeilles</a:t>
+            </a:r>
+            <a:endParaRPr lang="en-CA" sz="3600" dirty="0"/>
+          </a:p>
+        </p:txBody>
+      </p:sp>
+      <p:sp>
+        <p:nvSpPr>
+          <p:cNvPr id="5" name="TextBox 4">
+            <a:extLst>
+              <a:ext uri="{FF2B5EF4-FFF2-40B4-BE49-F238E27FC236}">
+                <a16:creationId xmlns:a16="http://schemas.microsoft.com/office/drawing/2014/main" id="{4867A4D4-F475-419D-A945-D19F08351F33}"/>
+              </a:ext>
+            </a:extLst>
+          </p:cNvPr>
+          <p:cNvSpPr txBox="1"/>
+          <p:nvPr/>
+        </p:nvSpPr>
+        <p:spPr>
+          <a:xfrm>
+            <a:off x="3121267" y="2819398"/>
+            <a:ext cx="8229602" cy="769441"/>
+          </a:xfrm>
+          <a:prstGeom prst="rect">
+            <a:avLst/>
+          </a:prstGeom>
+          <a:noFill/>
+          <a:ln>
+            <a:solidFill>
+              <a:schemeClr val="tx1"/>
+            </a:solidFill>
+          </a:ln>
+        </p:spPr>
+        <p:txBody>
+          <a:bodyPr wrap="square" rtlCol="0">
+            <a:spAutoFit/>
+          </a:bodyPr>
+          <a:lstStyle/>
+          <a:p>
+            <a:r>
+              <a:rPr lang="en-CA" sz="4400" dirty="0"/>
+              <a:t>2 - </a:t>
+            </a:r>
+            <a:r>
+              <a:rPr lang="en-CA" sz="3600" dirty="0" err="1"/>
+              <a:t>Atteindre</a:t>
+            </a:r>
+            <a:r>
+              <a:rPr lang="en-CA" sz="3600" dirty="0"/>
+              <a:t> les </a:t>
+            </a:r>
+            <a:r>
+              <a:rPr lang="en-CA" sz="3600" dirty="0" err="1"/>
+              <a:t>objectifs</a:t>
+            </a:r>
+            <a:r>
+              <a:rPr lang="en-CA" sz="3600" dirty="0"/>
+              <a:t> de ventes</a:t>
+            </a:r>
+            <a:endParaRPr lang="en-CA" sz="4400" dirty="0"/>
+          </a:p>
+        </p:txBody>
+      </p:sp>
+      <p:sp>
+        <p:nvSpPr>
+          <p:cNvPr id="6" name="TextBox 5">
+            <a:extLst>
+              <a:ext uri="{FF2B5EF4-FFF2-40B4-BE49-F238E27FC236}">
+                <a16:creationId xmlns:a16="http://schemas.microsoft.com/office/drawing/2014/main" id="{6FDE0949-A647-41E2-9FDB-C906D0A1C64E}"/>
+              </a:ext>
+            </a:extLst>
+          </p:cNvPr>
+          <p:cNvSpPr txBox="1"/>
+          <p:nvPr/>
+        </p:nvSpPr>
+        <p:spPr>
+          <a:xfrm>
+            <a:off x="3121267" y="4536827"/>
+            <a:ext cx="7587764" cy="769441"/>
+          </a:xfrm>
+          <a:prstGeom prst="rect">
+            <a:avLst/>
+          </a:prstGeom>
+          <a:noFill/>
+          <a:ln>
+            <a:solidFill>
+              <a:schemeClr val="tx1"/>
+            </a:solidFill>
+          </a:ln>
+        </p:spPr>
+        <p:txBody>
+          <a:bodyPr wrap="square" rtlCol="0">
+            <a:spAutoFit/>
+          </a:bodyPr>
+          <a:lstStyle/>
+          <a:p>
+            <a:r>
+              <a:rPr lang="en-CA" sz="4400" dirty="0"/>
+              <a:t>3 - </a:t>
+            </a:r>
+            <a:r>
+              <a:rPr lang="en-CA" sz="3600" dirty="0" err="1"/>
+              <a:t>Faciliter</a:t>
+            </a:r>
+            <a:r>
+              <a:rPr lang="en-CA" sz="3600" dirty="0"/>
+              <a:t> la vie aux </a:t>
+            </a:r>
+            <a:r>
+              <a:rPr lang="en-CA" sz="3600" dirty="0" err="1"/>
+              <a:t>apiculteurs</a:t>
+            </a:r>
+            <a:endParaRPr lang="en-CA" sz="4400" dirty="0"/>
+          </a:p>
+        </p:txBody>
+      </p:sp>
+    </p:spTree>
+    <p:extLst>
+      <p:ext uri="{BB962C8B-B14F-4D97-AF65-F5344CB8AC3E}">
+        <p14:creationId xmlns:p14="http://schemas.microsoft.com/office/powerpoint/2010/main" val="4108082058"/>
       </p:ext>
     </p:extLst>
   </p:cSld>

</xml_diff>

<commit_message>
Modification apporté sur plusieurs parties
</commit_message>
<xml_diff>
--- a/Présentation Éthique.pptx
+++ b/Présentation Éthique.pptx
@@ -5,7 +5,7 @@
     <p:sldMasterId id="2147483884" r:id="rId1"/>
   </p:sldMasterIdLst>
   <p:notesMasterIdLst>
-    <p:notesMasterId r:id="rId19"/>
+    <p:notesMasterId r:id="rId21"/>
   </p:notesMasterIdLst>
   <p:sldIdLst>
     <p:sldId id="273" r:id="rId2"/>
@@ -13,18 +13,20 @@
     <p:sldId id="306" r:id="rId4"/>
     <p:sldId id="292" r:id="rId5"/>
     <p:sldId id="268" r:id="rId6"/>
-    <p:sldId id="256" r:id="rId7"/>
-    <p:sldId id="257" r:id="rId8"/>
-    <p:sldId id="305" r:id="rId9"/>
-    <p:sldId id="297" r:id="rId10"/>
-    <p:sldId id="298" r:id="rId11"/>
-    <p:sldId id="304" r:id="rId12"/>
-    <p:sldId id="269" r:id="rId13"/>
-    <p:sldId id="274" r:id="rId14"/>
-    <p:sldId id="299" r:id="rId15"/>
-    <p:sldId id="300" r:id="rId16"/>
-    <p:sldId id="301" r:id="rId17"/>
-    <p:sldId id="296" r:id="rId18"/>
+    <p:sldId id="310" r:id="rId7"/>
+    <p:sldId id="305" r:id="rId8"/>
+    <p:sldId id="308" r:id="rId9"/>
+    <p:sldId id="309" r:id="rId10"/>
+    <p:sldId id="297" r:id="rId11"/>
+    <p:sldId id="298" r:id="rId12"/>
+    <p:sldId id="304" r:id="rId13"/>
+    <p:sldId id="269" r:id="rId14"/>
+    <p:sldId id="274" r:id="rId15"/>
+    <p:sldId id="299" r:id="rId16"/>
+    <p:sldId id="300" r:id="rId17"/>
+    <p:sldId id="301" r:id="rId18"/>
+    <p:sldId id="307" r:id="rId19"/>
+    <p:sldId id="296" r:id="rId20"/>
   </p:sldIdLst>
   <p:sldSz cx="12192000" cy="6858000"/>
   <p:notesSz cx="6858000" cy="9144000"/>
@@ -16177,6 +16179,104 @@
           <p:cNvPr id="2" name="Title 1">
             <a:extLst>
               <a:ext uri="{FF2B5EF4-FFF2-40B4-BE49-F238E27FC236}">
+                <a16:creationId xmlns:a16="http://schemas.microsoft.com/office/drawing/2014/main" id="{91E8F6C8-4F64-439A-A928-7D43565B1CD7}"/>
+              </a:ext>
+            </a:extLst>
+          </p:cNvPr>
+          <p:cNvSpPr>
+            <a:spLocks noGrp="1"/>
+          </p:cNvSpPr>
+          <p:nvPr>
+            <p:ph type="title"/>
+          </p:nvPr>
+        </p:nvSpPr>
+        <p:spPr/>
+        <p:txBody>
+          <a:bodyPr/>
+          <a:lstStyle/>
+          <a:p>
+            <a:r>
+              <a:rPr lang="fr-CA" dirty="0"/>
+              <a:t>Priorisation des défis</a:t>
+            </a:r>
+          </a:p>
+        </p:txBody>
+      </p:sp>
+      <p:sp>
+        <p:nvSpPr>
+          <p:cNvPr id="3" name="Content Placeholder 2">
+            <a:extLst>
+              <a:ext uri="{FF2B5EF4-FFF2-40B4-BE49-F238E27FC236}">
+                <a16:creationId xmlns:a16="http://schemas.microsoft.com/office/drawing/2014/main" id="{A902CCF2-D8E0-4BD9-B641-DB4198DCC163}"/>
+              </a:ext>
+            </a:extLst>
+          </p:cNvPr>
+          <p:cNvSpPr>
+            <a:spLocks noGrp="1"/>
+          </p:cNvSpPr>
+          <p:nvPr>
+            <p:ph idx="1"/>
+          </p:nvPr>
+        </p:nvSpPr>
+        <p:spPr/>
+        <p:txBody>
+          <a:bodyPr/>
+          <a:lstStyle/>
+          <a:p>
+            <a:r>
+              <a:rPr lang="fr-CA" dirty="0"/>
+              <a:t>Analyse et veille</a:t>
+            </a:r>
+          </a:p>
+          <a:p>
+            <a:r>
+              <a:rPr lang="fr-CA" dirty="0"/>
+              <a:t>Vecteur d’entrée</a:t>
+            </a:r>
+          </a:p>
+          <a:p>
+            <a:r>
+              <a:rPr lang="fr-CA" dirty="0"/>
+              <a:t>Valeurs et motivations des membres de l’équipe</a:t>
+            </a:r>
+          </a:p>
+        </p:txBody>
+      </p:sp>
+    </p:spTree>
+    <p:extLst>
+      <p:ext uri="{BB962C8B-B14F-4D97-AF65-F5344CB8AC3E}">
+        <p14:creationId xmlns:p14="http://schemas.microsoft.com/office/powerpoint/2010/main" val="2420593111"/>
+      </p:ext>
+    </p:extLst>
+  </p:cSld>
+  <p:clrMapOvr>
+    <a:masterClrMapping/>
+  </p:clrMapOvr>
+</p:sld>
+</file>
+
+<file path=ppt/slides/slide11.xml><?xml version="1.0" encoding="utf-8"?>
+<p:sld xmlns:a="http://schemas.openxmlformats.org/drawingml/2006/main" xmlns:r="http://schemas.openxmlformats.org/officeDocument/2006/relationships" xmlns:p="http://schemas.openxmlformats.org/presentationml/2006/main">
+  <p:cSld>
+    <p:spTree>
+      <p:nvGrpSpPr>
+        <p:cNvPr id="1" name=""/>
+        <p:cNvGrpSpPr/>
+        <p:nvPr/>
+      </p:nvGrpSpPr>
+      <p:grpSpPr>
+        <a:xfrm>
+          <a:off x="0" y="0"/>
+          <a:ext cx="0" cy="0"/>
+          <a:chOff x="0" y="0"/>
+          <a:chExt cx="0" cy="0"/>
+        </a:xfrm>
+      </p:grpSpPr>
+      <p:sp>
+        <p:nvSpPr>
+          <p:cNvPr id="2" name="Title 1">
+            <a:extLst>
+              <a:ext uri="{FF2B5EF4-FFF2-40B4-BE49-F238E27FC236}">
                 <a16:creationId xmlns:a16="http://schemas.microsoft.com/office/drawing/2014/main" id="{8EA0546E-ECF2-4914-9E36-FE0E3B5746E7}"/>
               </a:ext>
             </a:extLst>
@@ -16232,157 +16332,6 @@
     <p:extLst>
       <p:ext uri="{BB962C8B-B14F-4D97-AF65-F5344CB8AC3E}">
         <p14:creationId xmlns:p14="http://schemas.microsoft.com/office/powerpoint/2010/main" val="3967243267"/>
-      </p:ext>
-    </p:extLst>
-  </p:cSld>
-  <p:clrMapOvr>
-    <a:masterClrMapping/>
-  </p:clrMapOvr>
-</p:sld>
-</file>
-
-<file path=ppt/slides/slide11.xml><?xml version="1.0" encoding="utf-8"?>
-<p:sld xmlns:a="http://schemas.openxmlformats.org/drawingml/2006/main" xmlns:r="http://schemas.openxmlformats.org/officeDocument/2006/relationships" xmlns:p="http://schemas.openxmlformats.org/presentationml/2006/main">
-  <p:cSld>
-    <p:spTree>
-      <p:nvGrpSpPr>
-        <p:cNvPr id="1" name=""/>
-        <p:cNvGrpSpPr/>
-        <p:nvPr/>
-      </p:nvGrpSpPr>
-      <p:grpSpPr>
-        <a:xfrm>
-          <a:off x="0" y="0"/>
-          <a:ext cx="0" cy="0"/>
-          <a:chOff x="0" y="0"/>
-          <a:chExt cx="0" cy="0"/>
-        </a:xfrm>
-      </p:grpSpPr>
-      <p:sp>
-        <p:nvSpPr>
-          <p:cNvPr id="2" name="Title 1">
-            <a:extLst>
-              <a:ext uri="{FF2B5EF4-FFF2-40B4-BE49-F238E27FC236}">
-                <a16:creationId xmlns:a16="http://schemas.microsoft.com/office/drawing/2014/main" id="{532BB36A-66E0-4644-AB8F-8DCB79605DD1}"/>
-              </a:ext>
-            </a:extLst>
-          </p:cNvPr>
-          <p:cNvSpPr>
-            <a:spLocks noGrp="1"/>
-          </p:cNvSpPr>
-          <p:nvPr>
-            <p:ph type="title"/>
-          </p:nvPr>
-        </p:nvSpPr>
-        <p:spPr/>
-        <p:txBody>
-          <a:bodyPr/>
-          <a:lstStyle/>
-          <a:p>
-            <a:r>
-              <a:rPr lang="fr-CA" dirty="0"/>
-              <a:t>Veille – Points à considérer</a:t>
-            </a:r>
-            <a:br>
-              <a:rPr lang="fr-CA" dirty="0"/>
-            </a:br>
-            <a:endParaRPr lang="fr-CA" dirty="0"/>
-          </a:p>
-        </p:txBody>
-      </p:sp>
-      <p:sp>
-        <p:nvSpPr>
-          <p:cNvPr id="4" name="Content Placeholder 3">
-            <a:extLst>
-              <a:ext uri="{FF2B5EF4-FFF2-40B4-BE49-F238E27FC236}">
-                <a16:creationId xmlns:a16="http://schemas.microsoft.com/office/drawing/2014/main" id="{1BEF1B98-B4FA-4650-897D-714D995AABAC}"/>
-              </a:ext>
-            </a:extLst>
-          </p:cNvPr>
-          <p:cNvSpPr>
-            <a:spLocks noGrp="1"/>
-          </p:cNvSpPr>
-          <p:nvPr>
-            <p:ph idx="1"/>
-          </p:nvPr>
-        </p:nvSpPr>
-        <p:spPr/>
-        <p:txBody>
-          <a:bodyPr/>
-          <a:lstStyle/>
-          <a:p>
-            <a:r>
-              <a:rPr lang="fr-CA" dirty="0"/>
-              <a:t>Conditions de survie/besoins des abeilles</a:t>
-            </a:r>
-          </a:p>
-          <a:p>
-            <a:pPr lvl="1"/>
-            <a:r>
-              <a:rPr lang="fr-CA" dirty="0"/>
-              <a:t>Température</a:t>
-            </a:r>
-          </a:p>
-          <a:p>
-            <a:pPr lvl="1"/>
-            <a:r>
-              <a:rPr lang="fr-CA" dirty="0"/>
-              <a:t>Accès à l’eau</a:t>
-            </a:r>
-          </a:p>
-          <a:p>
-            <a:pPr lvl="1"/>
-            <a:r>
-              <a:rPr lang="fr-CA" dirty="0"/>
-              <a:t>Vents tenus au minimum</a:t>
-            </a:r>
-          </a:p>
-          <a:p>
-            <a:r>
-              <a:rPr lang="fr-CA" dirty="0"/>
-              <a:t>Conditions de travail/requis de l’apiculteur</a:t>
-            </a:r>
-          </a:p>
-          <a:p>
-            <a:pPr lvl="1"/>
-            <a:r>
-              <a:rPr lang="fr-CA" dirty="0"/>
-              <a:t>Détection d’essaimage</a:t>
-            </a:r>
-          </a:p>
-          <a:p>
-            <a:pPr lvl="1"/>
-            <a:r>
-              <a:rPr lang="fr-CA" dirty="0"/>
-              <a:t>Poids de la ruche </a:t>
-            </a:r>
-            <a:r>
-              <a:rPr lang="fr-CA" dirty="0">
-                <a:cs typeface="Calibri" panose="020F0502020204030204" pitchFamily="34" charset="0"/>
-              </a:rPr>
-              <a:t>→ Volume de miel</a:t>
-            </a:r>
-            <a:endParaRPr lang="fr-CA" dirty="0"/>
-          </a:p>
-          <a:p>
-            <a:r>
-              <a:rPr lang="fr-CA" dirty="0"/>
-              <a:t>Produits existants</a:t>
-            </a:r>
-          </a:p>
-          <a:p>
-            <a:pPr lvl="1"/>
-            <a:r>
-              <a:rPr lang="fr-CA" dirty="0"/>
-              <a:t>Prix élevé</a:t>
-            </a:r>
-          </a:p>
-        </p:txBody>
-      </p:sp>
-    </p:spTree>
-    <p:extLst>
-      <p:ext uri="{BB962C8B-B14F-4D97-AF65-F5344CB8AC3E}">
-        <p14:creationId xmlns:p14="http://schemas.microsoft.com/office/powerpoint/2010/main" val="2646153592"/>
       </p:ext>
     </p:extLst>
   </p:cSld>
@@ -16431,18 +16380,13 @@
           <a:lstStyle/>
           <a:p>
             <a:r>
-              <a:rPr lang="en-CA" dirty="0" err="1"/>
-              <a:t>Entrevues</a:t>
-            </a:r>
-            <a:r>
-              <a:rPr lang="en-CA" dirty="0"/>
-              <a:t> </a:t>
-            </a:r>
-            <a:r>
-              <a:rPr lang="en-CA" dirty="0" err="1"/>
-              <a:t>potentielles</a:t>
-            </a:r>
-            <a:endParaRPr lang="en-CA" dirty="0"/>
+              <a:rPr lang="fr-CA" dirty="0"/>
+              <a:t>Veille – Points à considérer</a:t>
+            </a:r>
+            <a:br>
+              <a:rPr lang="fr-CA" dirty="0"/>
+            </a:br>
+            <a:endParaRPr lang="fr-CA" dirty="0"/>
           </a:p>
         </p:txBody>
       </p:sp>
@@ -16451,7 +16395,7 @@
           <p:cNvPr id="4" name="Content Placeholder 3">
             <a:extLst>
               <a:ext uri="{FF2B5EF4-FFF2-40B4-BE49-F238E27FC236}">
-                <a16:creationId xmlns:a16="http://schemas.microsoft.com/office/drawing/2014/main" id="{561C8BA9-4D5B-4077-A438-4CBFA09C3FD0}"/>
+                <a16:creationId xmlns:a16="http://schemas.microsoft.com/office/drawing/2014/main" id="{1BEF1B98-B4FA-4650-897D-714D995AABAC}"/>
               </a:ext>
             </a:extLst>
           </p:cNvPr>
@@ -16464,63 +16408,73 @@
         </p:nvSpPr>
         <p:spPr/>
         <p:txBody>
-          <a:bodyPr>
-            <a:normAutofit/>
-          </a:bodyPr>
+          <a:bodyPr/>
           <a:lstStyle/>
           <a:p>
             <a:r>
               <a:rPr lang="fr-CA" dirty="0"/>
-              <a:t>Profil-type #1 : Apiculteur</a:t>
+              <a:t>Conditions de survie/besoins des abeilles</a:t>
             </a:r>
           </a:p>
           <a:p>
             <a:pPr lvl="1"/>
             <a:r>
               <a:rPr lang="fr-CA" dirty="0"/>
-              <a:t>Caractéristiques</a:t>
-            </a:r>
-          </a:p>
-          <a:p>
-            <a:pPr lvl="2"/>
+              <a:t>Température</a:t>
+            </a:r>
+          </a:p>
+          <a:p>
+            <a:pPr lvl="1"/>
             <a:r>
               <a:rPr lang="fr-CA" dirty="0"/>
-              <a:t>Vivant principalement de l’apiculture</a:t>
+              <a:t>Accès à l’eau</a:t>
             </a:r>
           </a:p>
           <a:p>
             <a:pPr lvl="1"/>
             <a:r>
               <a:rPr lang="fr-CA" dirty="0"/>
-              <a:t>Questions</a:t>
-            </a:r>
-          </a:p>
-          <a:p>
-            <a:pPr lvl="2"/>
+              <a:t>Vents tenus au minimum</a:t>
+            </a:r>
+          </a:p>
+          <a:p>
             <a:r>
               <a:rPr lang="fr-CA" dirty="0"/>
-              <a:t>Type/nombre de ruches</a:t>
-            </a:r>
-          </a:p>
-          <a:p>
-            <a:pPr lvl="2"/>
+              <a:t>Conditions de travail/requis de l’apiculteur</a:t>
+            </a:r>
+          </a:p>
+          <a:p>
+            <a:pPr lvl="1"/>
             <a:r>
               <a:rPr lang="fr-CA" dirty="0"/>
-              <a:t>Type d’exploitation</a:t>
-            </a:r>
-          </a:p>
-          <a:p>
-            <a:pPr lvl="2"/>
+              <a:t>Détection d’essaimage</a:t>
+            </a:r>
+          </a:p>
+          <a:p>
+            <a:pPr lvl="1"/>
             <a:r>
               <a:rPr lang="fr-CA" dirty="0"/>
-              <a:t>Routine de récolte du miel</a:t>
-            </a:r>
-          </a:p>
-          <a:p>
-            <a:pPr lvl="2"/>
+              <a:t>Poids de la ruche </a:t>
+            </a:r>
+            <a:r>
+              <a:rPr lang="fr-CA" dirty="0">
+                <a:cs typeface="Calibri" panose="020F0502020204030204" pitchFamily="34" charset="0"/>
+              </a:rPr>
+              <a:t>→ Volume de miel</a:t>
+            </a:r>
+            <a:endParaRPr lang="fr-CA" dirty="0"/>
+          </a:p>
+          <a:p>
             <a:r>
               <a:rPr lang="fr-CA" dirty="0"/>
-              <a:t>Ouverture face à la technologie</a:t>
+              <a:t>Produits existants</a:t>
+            </a:r>
+          </a:p>
+          <a:p>
+            <a:pPr lvl="1"/>
+            <a:r>
+              <a:rPr lang="fr-CA" dirty="0"/>
+              <a:t>Prix élevé</a:t>
             </a:r>
           </a:p>
         </p:txBody>
@@ -16528,7 +16482,7 @@
     </p:spTree>
     <p:extLst>
       <p:ext uri="{BB962C8B-B14F-4D97-AF65-F5344CB8AC3E}">
-        <p14:creationId xmlns:p14="http://schemas.microsoft.com/office/powerpoint/2010/main" val="1402609215"/>
+        <p14:creationId xmlns:p14="http://schemas.microsoft.com/office/powerpoint/2010/main" val="2646153592"/>
       </p:ext>
     </p:extLst>
   </p:cSld>
@@ -16617,6 +16571,152 @@
           <a:p>
             <a:r>
               <a:rPr lang="fr-CA" dirty="0"/>
+              <a:t>Profil-type #1 : Apiculteur</a:t>
+            </a:r>
+          </a:p>
+          <a:p>
+            <a:pPr lvl="1"/>
+            <a:r>
+              <a:rPr lang="fr-CA" dirty="0"/>
+              <a:t>Caractéristiques</a:t>
+            </a:r>
+          </a:p>
+          <a:p>
+            <a:pPr lvl="2"/>
+            <a:r>
+              <a:rPr lang="fr-CA" dirty="0"/>
+              <a:t>Vivant principalement de l’apiculture</a:t>
+            </a:r>
+          </a:p>
+          <a:p>
+            <a:pPr lvl="1"/>
+            <a:r>
+              <a:rPr lang="fr-CA" dirty="0"/>
+              <a:t>Questions</a:t>
+            </a:r>
+          </a:p>
+          <a:p>
+            <a:pPr lvl="2"/>
+            <a:r>
+              <a:rPr lang="fr-CA" dirty="0"/>
+              <a:t>Type/nombre de ruches</a:t>
+            </a:r>
+          </a:p>
+          <a:p>
+            <a:pPr lvl="2"/>
+            <a:r>
+              <a:rPr lang="fr-CA" dirty="0"/>
+              <a:t>Type d’exploitation</a:t>
+            </a:r>
+          </a:p>
+          <a:p>
+            <a:pPr lvl="2"/>
+            <a:r>
+              <a:rPr lang="fr-CA" dirty="0"/>
+              <a:t>Routine de récolte du miel</a:t>
+            </a:r>
+          </a:p>
+          <a:p>
+            <a:pPr lvl="2"/>
+            <a:r>
+              <a:rPr lang="fr-CA" dirty="0"/>
+              <a:t>Ouverture face à la technologie</a:t>
+            </a:r>
+          </a:p>
+        </p:txBody>
+      </p:sp>
+    </p:spTree>
+    <p:extLst>
+      <p:ext uri="{BB962C8B-B14F-4D97-AF65-F5344CB8AC3E}">
+        <p14:creationId xmlns:p14="http://schemas.microsoft.com/office/powerpoint/2010/main" val="1402609215"/>
+      </p:ext>
+    </p:extLst>
+  </p:cSld>
+  <p:clrMapOvr>
+    <a:masterClrMapping/>
+  </p:clrMapOvr>
+</p:sld>
+</file>
+
+<file path=ppt/slides/slide14.xml><?xml version="1.0" encoding="utf-8"?>
+<p:sld xmlns:a="http://schemas.openxmlformats.org/drawingml/2006/main" xmlns:r="http://schemas.openxmlformats.org/officeDocument/2006/relationships" xmlns:p="http://schemas.openxmlformats.org/presentationml/2006/main">
+  <p:cSld>
+    <p:spTree>
+      <p:nvGrpSpPr>
+        <p:cNvPr id="1" name=""/>
+        <p:cNvGrpSpPr/>
+        <p:nvPr/>
+      </p:nvGrpSpPr>
+      <p:grpSpPr>
+        <a:xfrm>
+          <a:off x="0" y="0"/>
+          <a:ext cx="0" cy="0"/>
+          <a:chOff x="0" y="0"/>
+          <a:chExt cx="0" cy="0"/>
+        </a:xfrm>
+      </p:grpSpPr>
+      <p:sp>
+        <p:nvSpPr>
+          <p:cNvPr id="2" name="Title 1">
+            <a:extLst>
+              <a:ext uri="{FF2B5EF4-FFF2-40B4-BE49-F238E27FC236}">
+                <a16:creationId xmlns:a16="http://schemas.microsoft.com/office/drawing/2014/main" id="{532BB36A-66E0-4644-AB8F-8DCB79605DD1}"/>
+              </a:ext>
+            </a:extLst>
+          </p:cNvPr>
+          <p:cNvSpPr>
+            <a:spLocks noGrp="1"/>
+          </p:cNvSpPr>
+          <p:nvPr>
+            <p:ph type="title"/>
+          </p:nvPr>
+        </p:nvSpPr>
+        <p:spPr/>
+        <p:txBody>
+          <a:bodyPr/>
+          <a:lstStyle/>
+          <a:p>
+            <a:r>
+              <a:rPr lang="en-CA" dirty="0" err="1"/>
+              <a:t>Entrevues</a:t>
+            </a:r>
+            <a:r>
+              <a:rPr lang="en-CA" dirty="0"/>
+              <a:t> </a:t>
+            </a:r>
+            <a:r>
+              <a:rPr lang="en-CA" dirty="0" err="1"/>
+              <a:t>potentielles</a:t>
+            </a:r>
+            <a:endParaRPr lang="en-CA" dirty="0"/>
+          </a:p>
+        </p:txBody>
+      </p:sp>
+      <p:sp>
+        <p:nvSpPr>
+          <p:cNvPr id="4" name="Content Placeholder 3">
+            <a:extLst>
+              <a:ext uri="{FF2B5EF4-FFF2-40B4-BE49-F238E27FC236}">
+                <a16:creationId xmlns:a16="http://schemas.microsoft.com/office/drawing/2014/main" id="{561C8BA9-4D5B-4077-A438-4CBFA09C3FD0}"/>
+              </a:ext>
+            </a:extLst>
+          </p:cNvPr>
+          <p:cNvSpPr>
+            <a:spLocks noGrp="1"/>
+          </p:cNvSpPr>
+          <p:nvPr>
+            <p:ph idx="1"/>
+          </p:nvPr>
+        </p:nvSpPr>
+        <p:spPr/>
+        <p:txBody>
+          <a:bodyPr>
+            <a:normAutofit/>
+          </a:bodyPr>
+          <a:lstStyle/>
+          <a:p>
+            <a:r>
+              <a:rPr lang="fr-CA" dirty="0"/>
               <a:t>Profil-type #2 : Agriculteur</a:t>
             </a:r>
           </a:p>
@@ -16680,7 +16780,7 @@
 </p:sld>
 </file>
 
-<file path=ppt/slides/slide14.xml><?xml version="1.0" encoding="utf-8"?>
+<file path=ppt/slides/slide15.xml><?xml version="1.0" encoding="utf-8"?>
 <p:sld xmlns:a="http://schemas.openxmlformats.org/drawingml/2006/main" xmlns:r="http://schemas.openxmlformats.org/officeDocument/2006/relationships" xmlns:p="http://schemas.openxmlformats.org/presentationml/2006/main">
   <p:cSld>
     <p:spTree>
@@ -16832,7 +16932,7 @@
 </p:sld>
 </file>
 
-<file path=ppt/slides/slide15.xml><?xml version="1.0" encoding="utf-8"?>
+<file path=ppt/slides/slide16.xml><?xml version="1.0" encoding="utf-8"?>
 <p:sld xmlns:a="http://schemas.openxmlformats.org/drawingml/2006/main" xmlns:r="http://schemas.openxmlformats.org/officeDocument/2006/relationships" xmlns:p="http://schemas.openxmlformats.org/presentationml/2006/main">
   <p:cSld>
     <p:spTree>
@@ -16950,7 +17050,7 @@
 </p:sld>
 </file>
 
-<file path=ppt/slides/slide16.xml><?xml version="1.0" encoding="utf-8"?>
+<file path=ppt/slides/slide17.xml><?xml version="1.0" encoding="utf-8"?>
 <p:sld xmlns:a="http://schemas.openxmlformats.org/drawingml/2006/main" xmlns:r="http://schemas.openxmlformats.org/officeDocument/2006/relationships" xmlns:p="http://schemas.openxmlformats.org/presentationml/2006/main">
   <p:cSld>
     <p:spTree>
@@ -17196,7 +17296,90 @@
 </p:sld>
 </file>
 
-<file path=ppt/slides/slide17.xml><?xml version="1.0" encoding="utf-8"?>
+<file path=ppt/slides/slide18.xml><?xml version="1.0" encoding="utf-8"?>
+<p:sld xmlns:a="http://schemas.openxmlformats.org/drawingml/2006/main" xmlns:r="http://schemas.openxmlformats.org/officeDocument/2006/relationships" xmlns:p="http://schemas.openxmlformats.org/presentationml/2006/main">
+  <p:cSld>
+    <p:spTree>
+      <p:nvGrpSpPr>
+        <p:cNvPr id="1" name=""/>
+        <p:cNvGrpSpPr/>
+        <p:nvPr/>
+      </p:nvGrpSpPr>
+      <p:grpSpPr>
+        <a:xfrm>
+          <a:off x="0" y="0"/>
+          <a:ext cx="0" cy="0"/>
+          <a:chOff x="0" y="0"/>
+          <a:chExt cx="0" cy="0"/>
+        </a:xfrm>
+      </p:grpSpPr>
+      <p:sp>
+        <p:nvSpPr>
+          <p:cNvPr id="2" name="Titre 1">
+            <a:extLst>
+              <a:ext uri="{FF2B5EF4-FFF2-40B4-BE49-F238E27FC236}">
+                <a16:creationId xmlns:a16="http://schemas.microsoft.com/office/drawing/2014/main" id="{0251287C-DBAC-45F1-BAB8-E361752A01AD}"/>
+              </a:ext>
+            </a:extLst>
+          </p:cNvPr>
+          <p:cNvSpPr>
+            <a:spLocks noGrp="1"/>
+          </p:cNvSpPr>
+          <p:nvPr>
+            <p:ph type="title"/>
+          </p:nvPr>
+        </p:nvSpPr>
+        <p:spPr/>
+        <p:txBody>
+          <a:bodyPr/>
+          <a:lstStyle/>
+          <a:p>
+            <a:r>
+              <a:rPr lang="fr-CA" dirty="0"/>
+              <a:t>Rétrospective face à la démarche</a:t>
+            </a:r>
+          </a:p>
+        </p:txBody>
+      </p:sp>
+      <p:sp>
+        <p:nvSpPr>
+          <p:cNvPr id="3" name="Espace réservé du contenu 2">
+            <a:extLst>
+              <a:ext uri="{FF2B5EF4-FFF2-40B4-BE49-F238E27FC236}">
+                <a16:creationId xmlns:a16="http://schemas.microsoft.com/office/drawing/2014/main" id="{35E2FE80-6072-4D2E-A290-B4D18A87F05E}"/>
+              </a:ext>
+            </a:extLst>
+          </p:cNvPr>
+          <p:cNvSpPr>
+            <a:spLocks noGrp="1"/>
+          </p:cNvSpPr>
+          <p:nvPr>
+            <p:ph idx="1"/>
+          </p:nvPr>
+        </p:nvSpPr>
+        <p:spPr/>
+        <p:txBody>
+          <a:bodyPr/>
+          <a:lstStyle/>
+          <a:p>
+            <a:endParaRPr lang="fr-CA" dirty="0"/>
+          </a:p>
+        </p:txBody>
+      </p:sp>
+    </p:spTree>
+    <p:extLst>
+      <p:ext uri="{BB962C8B-B14F-4D97-AF65-F5344CB8AC3E}">
+        <p14:creationId xmlns:p14="http://schemas.microsoft.com/office/powerpoint/2010/main" val="2023926779"/>
+      </p:ext>
+    </p:extLst>
+  </p:cSld>
+  <p:clrMapOvr>
+    <a:masterClrMapping/>
+  </p:clrMapOvr>
+</p:sld>
+</file>
+
+<file path=ppt/slides/slide19.xml><?xml version="1.0" encoding="utf-8"?>
 <p:sld xmlns:a="http://schemas.openxmlformats.org/drawingml/2006/main" xmlns:r="http://schemas.openxmlformats.org/officeDocument/2006/relationships" xmlns:p="http://schemas.openxmlformats.org/presentationml/2006/main">
   <p:cSld>
     <p:spTree>
@@ -17236,7 +17419,7 @@
           <a:p>
             <a:r>
               <a:rPr lang="fr-CA" dirty="0"/>
-              <a:t>Démonstration et période de questions</a:t>
+              <a:t>Période de questions</a:t>
             </a:r>
           </a:p>
         </p:txBody>
@@ -18402,383 +18585,205 @@
       </p:grpSpPr>
       <p:sp>
         <p:nvSpPr>
-          <p:cNvPr id="4" name="TextBox 3">
+          <p:cNvPr id="2" name="Titre 1">
             <a:extLst>
               <a:ext uri="{FF2B5EF4-FFF2-40B4-BE49-F238E27FC236}">
-                <a16:creationId xmlns:a16="http://schemas.microsoft.com/office/drawing/2014/main" id="{1326EBD1-4857-4831-A34D-591433424DBB}"/>
+                <a16:creationId xmlns:a16="http://schemas.microsoft.com/office/drawing/2014/main" id="{F32633AC-EEC6-476F-88A7-9E58C1374862}"/>
               </a:ext>
             </a:extLst>
           </p:cNvPr>
-          <p:cNvSpPr txBox="1"/>
-          <p:nvPr/>
+          <p:cNvSpPr>
+            <a:spLocks noGrp="1"/>
+          </p:cNvSpPr>
+          <p:nvPr>
+            <p:ph type="title"/>
+          </p:nvPr>
+        </p:nvSpPr>
+        <p:spPr/>
+        <p:txBody>
+          <a:bodyPr/>
+          <a:lstStyle/>
+          <a:p>
+            <a:r>
+              <a:rPr lang="fr-CA" dirty="0"/>
+              <a:t>Axes innovants</a:t>
+            </a:r>
+          </a:p>
+        </p:txBody>
+      </p:sp>
+      <p:sp>
+        <p:nvSpPr>
+          <p:cNvPr id="3" name="Espace réservé du contenu 2">
+            <a:extLst>
+              <a:ext uri="{FF2B5EF4-FFF2-40B4-BE49-F238E27FC236}">
+                <a16:creationId xmlns:a16="http://schemas.microsoft.com/office/drawing/2014/main" id="{6872A010-3AA9-43D6-B65D-A8C825A77582}"/>
+              </a:ext>
+            </a:extLst>
+          </p:cNvPr>
+          <p:cNvSpPr>
+            <a:spLocks noGrp="1"/>
+          </p:cNvSpPr>
+          <p:nvPr>
+            <p:ph idx="1"/>
+          </p:nvPr>
         </p:nvSpPr>
         <p:spPr>
           <a:xfrm>
-            <a:off x="5246077" y="3033345"/>
-            <a:ext cx="1699846" cy="769441"/>
+            <a:off x="2592925" y="2025293"/>
+            <a:ext cx="8915400" cy="3777622"/>
+          </a:xfrm>
+        </p:spPr>
+        <p:txBody>
+          <a:bodyPr/>
+          <a:lstStyle/>
+          <a:p>
+            <a:pPr lvl="0"/>
+            <a:r>
+              <a:rPr lang="fr-CA" dirty="0"/>
+              <a:t>Peu de produit disponibles au Canada</a:t>
+            </a:r>
+          </a:p>
+          <a:p>
+            <a:pPr lvl="0"/>
+            <a:r>
+              <a:rPr lang="fr-CA" dirty="0"/>
+              <a:t>Produits sur mesure ou prêt à l’emploie</a:t>
+            </a:r>
+          </a:p>
+          <a:p>
+            <a:pPr lvl="0"/>
+            <a:r>
+              <a:rPr lang="fr-CA" dirty="0"/>
+              <a:t>Système de communication en maille</a:t>
+            </a:r>
+          </a:p>
+          <a:p>
+            <a:endParaRPr lang="fr-CA" dirty="0"/>
+          </a:p>
+        </p:txBody>
+      </p:sp>
+      <p:pic>
+        <p:nvPicPr>
+          <p:cNvPr id="1026" name="Picture 2" descr="stats_2016">
+            <a:extLst>
+              <a:ext uri="{FF2B5EF4-FFF2-40B4-BE49-F238E27FC236}">
+                <a16:creationId xmlns:a16="http://schemas.microsoft.com/office/drawing/2014/main" id="{6FFCF418-2937-4133-B06C-1DA988E64E10}"/>
+              </a:ext>
+            </a:extLst>
+          </p:cNvPr>
+          <p:cNvPicPr>
+            <a:picLocks noChangeAspect="1" noChangeArrowheads="1"/>
+          </p:cNvPicPr>
+          <p:nvPr/>
+        </p:nvPicPr>
+        <p:blipFill rotWithShape="1">
+          <a:blip r:embed="rId2">
+            <a:extLst>
+              <a:ext uri="{28A0092B-C50C-407E-A947-70E740481C1C}">
+                <a14:useLocalDpi xmlns:a14="http://schemas.microsoft.com/office/drawing/2010/main" val="0"/>
+              </a:ext>
+            </a:extLst>
+          </a:blip>
+          <a:srcRect t="2101" r="951"/>
+          <a:stretch/>
+        </p:blipFill>
+        <p:spPr bwMode="auto">
+          <a:xfrm>
+            <a:off x="2524760" y="3254062"/>
+            <a:ext cx="6029008" cy="3603938"/>
           </a:xfrm>
           <a:prstGeom prst="rect">
             <a:avLst/>
           </a:prstGeom>
           <a:noFill/>
           <a:ln>
-            <a:solidFill>
-              <a:schemeClr val="tx1"/>
-            </a:solidFill>
+            <a:noFill/>
           </a:ln>
+          <a:extLst>
+            <a:ext uri="{909E8E84-426E-40DD-AFC4-6F175D3DCCD1}">
+              <a14:hiddenFill xmlns:a14="http://schemas.microsoft.com/office/drawing/2010/main">
+                <a:solidFill>
+                  <a:srgbClr val="FFFFFF"/>
+                </a:solidFill>
+              </a14:hiddenFill>
+            </a:ext>
+            <a:ext uri="{91240B29-F687-4F45-9708-019B960494DF}">
+              <a14:hiddenLine xmlns:a14="http://schemas.microsoft.com/office/drawing/2010/main" w="9525">
+                <a:solidFill>
+                  <a:srgbClr val="000000"/>
+                </a:solidFill>
+                <a:miter lim="800000"/>
+                <a:headEnd/>
+                <a:tailEnd/>
+              </a14:hiddenLine>
+            </a:ext>
+          </a:extLst>
         </p:spPr>
-        <p:txBody>
-          <a:bodyPr wrap="square" rtlCol="0">
-            <a:spAutoFit/>
-          </a:bodyPr>
-          <a:lstStyle/>
-          <a:p>
-            <a:r>
-              <a:rPr lang="en-CA" sz="4400" dirty="0" err="1"/>
-              <a:t>Défis</a:t>
-            </a:r>
-            <a:endParaRPr lang="en-CA" sz="5400" dirty="0"/>
-          </a:p>
-        </p:txBody>
-      </p:sp>
-      <p:sp>
-        <p:nvSpPr>
-          <p:cNvPr id="5" name="TextBox 4">
+      </p:pic>
+      <p:pic>
+        <p:nvPicPr>
+          <p:cNvPr id="1027" name="Picture 3" descr="apiculteur">
             <a:extLst>
               <a:ext uri="{FF2B5EF4-FFF2-40B4-BE49-F238E27FC236}">
-                <a16:creationId xmlns:a16="http://schemas.microsoft.com/office/drawing/2014/main" id="{A5D0788B-D9DA-4AE1-B011-CB8305D08EF6}"/>
+                <a16:creationId xmlns:a16="http://schemas.microsoft.com/office/drawing/2014/main" id="{94ACAED0-6C14-4890-A233-B3A618010FF9}"/>
               </a:ext>
             </a:extLst>
           </p:cNvPr>
-          <p:cNvSpPr txBox="1"/>
+          <p:cNvPicPr>
+            <a:picLocks noChangeAspect="1" noChangeArrowheads="1"/>
+          </p:cNvPicPr>
           <p:nvPr/>
-        </p:nvSpPr>
-        <p:spPr>
+        </p:nvPicPr>
+        <p:blipFill>
+          <a:blip r:embed="rId3">
+            <a:extLst>
+              <a:ext uri="{28A0092B-C50C-407E-A947-70E740481C1C}">
+                <a14:useLocalDpi xmlns:a14="http://schemas.microsoft.com/office/drawing/2010/main" val="0"/>
+              </a:ext>
+            </a:extLst>
+          </a:blip>
+          <a:srcRect/>
+          <a:stretch>
+            <a:fillRect/>
+          </a:stretch>
+        </p:blipFill>
+        <p:spPr bwMode="auto">
           <a:xfrm>
-            <a:off x="4443044" y="1081383"/>
-            <a:ext cx="3305909" cy="646331"/>
+            <a:off x="8600440" y="2133600"/>
+            <a:ext cx="2857500" cy="1600200"/>
           </a:xfrm>
           <a:prstGeom prst="rect">
             <a:avLst/>
           </a:prstGeom>
           <a:noFill/>
           <a:ln>
-            <a:solidFill>
-              <a:schemeClr val="tx1"/>
-            </a:solidFill>
+            <a:noFill/>
           </a:ln>
+          <a:extLst>
+            <a:ext uri="{909E8E84-426E-40DD-AFC4-6F175D3DCCD1}">
+              <a14:hiddenFill xmlns:a14="http://schemas.microsoft.com/office/drawing/2010/main">
+                <a:solidFill>
+                  <a:srgbClr val="FFFFFF"/>
+                </a:solidFill>
+              </a14:hiddenFill>
+            </a:ext>
+            <a:ext uri="{91240B29-F687-4F45-9708-019B960494DF}">
+              <a14:hiddenLine xmlns:a14="http://schemas.microsoft.com/office/drawing/2010/main" w="9525">
+                <a:solidFill>
+                  <a:srgbClr val="000000"/>
+                </a:solidFill>
+                <a:miter lim="800000"/>
+                <a:headEnd/>
+                <a:tailEnd/>
+              </a14:hiddenLine>
+            </a:ext>
+          </a:extLst>
         </p:spPr>
-        <p:txBody>
-          <a:bodyPr wrap="square" rtlCol="0">
-            <a:spAutoFit/>
-          </a:bodyPr>
-          <a:lstStyle/>
-          <a:p>
-            <a:pPr algn="ctr"/>
-            <a:r>
-              <a:rPr lang="en-CA" sz="3600" dirty="0" err="1"/>
-              <a:t>Économique</a:t>
-            </a:r>
-            <a:endParaRPr lang="en-CA" sz="4400" dirty="0"/>
-          </a:p>
-        </p:txBody>
-      </p:sp>
-      <p:sp>
-        <p:nvSpPr>
-          <p:cNvPr id="6" name="TextBox 5">
-            <a:extLst>
-              <a:ext uri="{FF2B5EF4-FFF2-40B4-BE49-F238E27FC236}">
-                <a16:creationId xmlns:a16="http://schemas.microsoft.com/office/drawing/2014/main" id="{64719C85-A8BF-4DF6-8DDD-0491184F54C1}"/>
-              </a:ext>
-            </a:extLst>
-          </p:cNvPr>
-          <p:cNvSpPr txBox="1"/>
-          <p:nvPr/>
-        </p:nvSpPr>
-        <p:spPr>
-          <a:xfrm>
-            <a:off x="1822940" y="3110288"/>
-            <a:ext cx="1526931" cy="646331"/>
-          </a:xfrm>
-          <a:prstGeom prst="rect">
-            <a:avLst/>
-          </a:prstGeom>
-          <a:noFill/>
-          <a:ln>
-            <a:solidFill>
-              <a:schemeClr val="tx1"/>
-            </a:solidFill>
-          </a:ln>
-        </p:spPr>
-        <p:txBody>
-          <a:bodyPr wrap="square" rtlCol="0">
-            <a:spAutoFit/>
-          </a:bodyPr>
-          <a:lstStyle/>
-          <a:p>
-            <a:r>
-              <a:rPr lang="en-CA" sz="3600" dirty="0"/>
-              <a:t>Social</a:t>
-            </a:r>
-            <a:endParaRPr lang="en-CA" sz="4400" dirty="0"/>
-          </a:p>
-        </p:txBody>
-      </p:sp>
-      <p:sp>
-        <p:nvSpPr>
-          <p:cNvPr id="7" name="TextBox 6">
-            <a:extLst>
-              <a:ext uri="{FF2B5EF4-FFF2-40B4-BE49-F238E27FC236}">
-                <a16:creationId xmlns:a16="http://schemas.microsoft.com/office/drawing/2014/main" id="{D3CAA142-D08C-46B1-9AC8-27C45F1500C0}"/>
-              </a:ext>
-            </a:extLst>
-          </p:cNvPr>
-          <p:cNvSpPr txBox="1"/>
-          <p:nvPr/>
-        </p:nvSpPr>
-        <p:spPr>
-          <a:xfrm>
-            <a:off x="4056183" y="5139195"/>
-            <a:ext cx="4079633" cy="646331"/>
-          </a:xfrm>
-          <a:prstGeom prst="rect">
-            <a:avLst/>
-          </a:prstGeom>
-          <a:noFill/>
-          <a:ln>
-            <a:solidFill>
-              <a:schemeClr val="tx1"/>
-            </a:solidFill>
-          </a:ln>
-        </p:spPr>
-        <p:txBody>
-          <a:bodyPr wrap="square" rtlCol="0">
-            <a:spAutoFit/>
-          </a:bodyPr>
-          <a:lstStyle/>
-          <a:p>
-            <a:r>
-              <a:rPr lang="en-CA" sz="3600" dirty="0" err="1"/>
-              <a:t>Environnemental</a:t>
-            </a:r>
-            <a:endParaRPr lang="en-CA" sz="4400" dirty="0"/>
-          </a:p>
-        </p:txBody>
-      </p:sp>
-      <p:sp>
-        <p:nvSpPr>
-          <p:cNvPr id="8" name="TextBox 7">
-            <a:extLst>
-              <a:ext uri="{FF2B5EF4-FFF2-40B4-BE49-F238E27FC236}">
-                <a16:creationId xmlns:a16="http://schemas.microsoft.com/office/drawing/2014/main" id="{2E319D2A-B7F1-4E3F-89D4-617D468E87BA}"/>
-              </a:ext>
-            </a:extLst>
-          </p:cNvPr>
-          <p:cNvSpPr txBox="1"/>
-          <p:nvPr/>
-        </p:nvSpPr>
-        <p:spPr>
-          <a:xfrm>
-            <a:off x="8974013" y="3110289"/>
-            <a:ext cx="1395047" cy="646331"/>
-          </a:xfrm>
-          <a:prstGeom prst="rect">
-            <a:avLst/>
-          </a:prstGeom>
-          <a:noFill/>
-          <a:ln>
-            <a:solidFill>
-              <a:schemeClr val="tx1"/>
-            </a:solidFill>
-          </a:ln>
-        </p:spPr>
-        <p:txBody>
-          <a:bodyPr wrap="square" rtlCol="0">
-            <a:spAutoFit/>
-          </a:bodyPr>
-          <a:lstStyle/>
-          <a:p>
-            <a:r>
-              <a:rPr lang="en-CA" sz="3600" dirty="0" err="1"/>
-              <a:t>Légal</a:t>
-            </a:r>
-            <a:endParaRPr lang="en-CA" sz="4400" dirty="0"/>
-          </a:p>
-        </p:txBody>
-      </p:sp>
-      <p:cxnSp>
-        <p:nvCxnSpPr>
-          <p:cNvPr id="10" name="Straight Arrow Connector 9">
-            <a:extLst>
-              <a:ext uri="{FF2B5EF4-FFF2-40B4-BE49-F238E27FC236}">
-                <a16:creationId xmlns:a16="http://schemas.microsoft.com/office/drawing/2014/main" id="{F4073090-02B2-428A-9BE3-7C5EE672EC62}"/>
-              </a:ext>
-            </a:extLst>
-          </p:cNvPr>
-          <p:cNvCxnSpPr>
-            <a:cxnSpLocks/>
-            <a:stCxn id="5" idx="2"/>
-            <a:endCxn id="4" idx="0"/>
-          </p:cNvCxnSpPr>
-          <p:nvPr/>
-        </p:nvCxnSpPr>
-        <p:spPr>
-          <a:xfrm>
-            <a:off x="6095999" y="1727714"/>
-            <a:ext cx="1" cy="1305631"/>
-          </a:xfrm>
-          <a:prstGeom prst="straightConnector1">
-            <a:avLst/>
-          </a:prstGeom>
-          <a:ln>
-            <a:tailEnd type="triangle"/>
-          </a:ln>
-        </p:spPr>
-        <p:style>
-          <a:lnRef idx="1">
-            <a:schemeClr val="accent1"/>
-          </a:lnRef>
-          <a:fillRef idx="0">
-            <a:schemeClr val="accent1"/>
-          </a:fillRef>
-          <a:effectRef idx="0">
-            <a:schemeClr val="accent1"/>
-          </a:effectRef>
-          <a:fontRef idx="minor">
-            <a:schemeClr val="tx1"/>
-          </a:fontRef>
-        </p:style>
-      </p:cxnSp>
-      <p:cxnSp>
-        <p:nvCxnSpPr>
-          <p:cNvPr id="16" name="Straight Arrow Connector 15">
-            <a:extLst>
-              <a:ext uri="{FF2B5EF4-FFF2-40B4-BE49-F238E27FC236}">
-                <a16:creationId xmlns:a16="http://schemas.microsoft.com/office/drawing/2014/main" id="{521DF92E-F87B-4431-8A71-46207BAB0549}"/>
-              </a:ext>
-            </a:extLst>
-          </p:cNvPr>
-          <p:cNvCxnSpPr>
-            <a:stCxn id="6" idx="3"/>
-            <a:endCxn id="4" idx="1"/>
-          </p:cNvCxnSpPr>
-          <p:nvPr/>
-        </p:nvCxnSpPr>
-        <p:spPr>
-          <a:xfrm flipV="1">
-            <a:off x="3349871" y="3418066"/>
-            <a:ext cx="1896206" cy="15388"/>
-          </a:xfrm>
-          <a:prstGeom prst="straightConnector1">
-            <a:avLst/>
-          </a:prstGeom>
-          <a:ln>
-            <a:tailEnd type="triangle"/>
-          </a:ln>
-        </p:spPr>
-        <p:style>
-          <a:lnRef idx="1">
-            <a:schemeClr val="accent1"/>
-          </a:lnRef>
-          <a:fillRef idx="0">
-            <a:schemeClr val="accent1"/>
-          </a:fillRef>
-          <a:effectRef idx="0">
-            <a:schemeClr val="accent1"/>
-          </a:effectRef>
-          <a:fontRef idx="minor">
-            <a:schemeClr val="tx1"/>
-          </a:fontRef>
-        </p:style>
-      </p:cxnSp>
-      <p:cxnSp>
-        <p:nvCxnSpPr>
-          <p:cNvPr id="18" name="Straight Arrow Connector 17">
-            <a:extLst>
-              <a:ext uri="{FF2B5EF4-FFF2-40B4-BE49-F238E27FC236}">
-                <a16:creationId xmlns:a16="http://schemas.microsoft.com/office/drawing/2014/main" id="{A2E2B531-927A-44FC-8451-9F38118E6F9C}"/>
-              </a:ext>
-            </a:extLst>
-          </p:cNvPr>
-          <p:cNvCxnSpPr>
-            <a:stCxn id="8" idx="1"/>
-            <a:endCxn id="4" idx="3"/>
-          </p:cNvCxnSpPr>
-          <p:nvPr/>
-        </p:nvCxnSpPr>
-        <p:spPr>
-          <a:xfrm flipH="1" flipV="1">
-            <a:off x="6945923" y="3418066"/>
-            <a:ext cx="2028090" cy="15389"/>
-          </a:xfrm>
-          <a:prstGeom prst="straightConnector1">
-            <a:avLst/>
-          </a:prstGeom>
-          <a:ln>
-            <a:tailEnd type="triangle"/>
-          </a:ln>
-        </p:spPr>
-        <p:style>
-          <a:lnRef idx="1">
-            <a:schemeClr val="accent1"/>
-          </a:lnRef>
-          <a:fillRef idx="0">
-            <a:schemeClr val="accent1"/>
-          </a:fillRef>
-          <a:effectRef idx="0">
-            <a:schemeClr val="accent1"/>
-          </a:effectRef>
-          <a:fontRef idx="minor">
-            <a:schemeClr val="tx1"/>
-          </a:fontRef>
-        </p:style>
-      </p:cxnSp>
-      <p:cxnSp>
-        <p:nvCxnSpPr>
-          <p:cNvPr id="20" name="Straight Arrow Connector 19">
-            <a:extLst>
-              <a:ext uri="{FF2B5EF4-FFF2-40B4-BE49-F238E27FC236}">
-                <a16:creationId xmlns:a16="http://schemas.microsoft.com/office/drawing/2014/main" id="{53CFFADB-5B42-4AA0-972A-6F2DE8E75E76}"/>
-              </a:ext>
-            </a:extLst>
-          </p:cNvPr>
-          <p:cNvCxnSpPr>
-            <a:stCxn id="7" idx="0"/>
-            <a:endCxn id="4" idx="2"/>
-          </p:cNvCxnSpPr>
-          <p:nvPr/>
-        </p:nvCxnSpPr>
-        <p:spPr>
-          <a:xfrm flipV="1">
-            <a:off x="6096000" y="3802786"/>
-            <a:ext cx="0" cy="1336409"/>
-          </a:xfrm>
-          <a:prstGeom prst="straightConnector1">
-            <a:avLst/>
-          </a:prstGeom>
-          <a:ln>
-            <a:tailEnd type="triangle"/>
-          </a:ln>
-        </p:spPr>
-        <p:style>
-          <a:lnRef idx="1">
-            <a:schemeClr val="accent1"/>
-          </a:lnRef>
-          <a:fillRef idx="0">
-            <a:schemeClr val="accent1"/>
-          </a:fillRef>
-          <a:effectRef idx="0">
-            <a:schemeClr val="accent1"/>
-          </a:effectRef>
-          <a:fontRef idx="minor">
-            <a:schemeClr val="tx1"/>
-          </a:fontRef>
-        </p:style>
-      </p:cxnSp>
+      </p:pic>
     </p:spTree>
     <p:extLst>
       <p:ext uri="{BB962C8B-B14F-4D97-AF65-F5344CB8AC3E}">
-        <p14:creationId xmlns:p14="http://schemas.microsoft.com/office/powerpoint/2010/main" val="752424227"/>
+        <p14:creationId xmlns:p14="http://schemas.microsoft.com/office/powerpoint/2010/main" val="2309518292"/>
       </p:ext>
     </p:extLst>
   </p:cSld>
@@ -18789,191 +18794,6 @@
 </file>
 
 <file path=ppt/slides/slide7.xml><?xml version="1.0" encoding="utf-8"?>
-<p:sld xmlns:a="http://schemas.openxmlformats.org/drawingml/2006/main" xmlns:r="http://schemas.openxmlformats.org/officeDocument/2006/relationships" xmlns:p="http://schemas.openxmlformats.org/presentationml/2006/main">
-  <p:cSld>
-    <p:spTree>
-      <p:nvGrpSpPr>
-        <p:cNvPr id="1" name=""/>
-        <p:cNvGrpSpPr/>
-        <p:nvPr/>
-      </p:nvGrpSpPr>
-      <p:grpSpPr>
-        <a:xfrm>
-          <a:off x="0" y="0"/>
-          <a:ext cx="0" cy="0"/>
-          <a:chOff x="0" y="0"/>
-          <a:chExt cx="0" cy="0"/>
-        </a:xfrm>
-      </p:grpSpPr>
-      <p:sp>
-        <p:nvSpPr>
-          <p:cNvPr id="4" name="TextBox 3">
-            <a:extLst>
-              <a:ext uri="{FF2B5EF4-FFF2-40B4-BE49-F238E27FC236}">
-                <a16:creationId xmlns:a16="http://schemas.microsoft.com/office/drawing/2014/main" id="{8496E773-06F6-4193-B827-83CC23D2D9B0}"/>
-              </a:ext>
-            </a:extLst>
-          </p:cNvPr>
-          <p:cNvSpPr txBox="1"/>
-          <p:nvPr/>
-        </p:nvSpPr>
-        <p:spPr>
-          <a:xfrm>
-            <a:off x="3121267" y="1093175"/>
-            <a:ext cx="6734910" cy="646331"/>
-          </a:xfrm>
-          <a:prstGeom prst="rect">
-            <a:avLst/>
-          </a:prstGeom>
-          <a:noFill/>
-          <a:ln>
-            <a:solidFill>
-              <a:schemeClr val="tx1"/>
-            </a:solidFill>
-          </a:ln>
-        </p:spPr>
-        <p:txBody>
-          <a:bodyPr wrap="square" rtlCol="0">
-            <a:spAutoFit/>
-          </a:bodyPr>
-          <a:lstStyle/>
-          <a:p>
-            <a:r>
-              <a:rPr lang="en-CA" sz="3600" dirty="0"/>
-              <a:t>1 - Conservation des </a:t>
-            </a:r>
-            <a:r>
-              <a:rPr lang="en-CA" sz="3600" dirty="0" err="1"/>
-              <a:t>abeilles</a:t>
-            </a:r>
-            <a:endParaRPr lang="en-CA" sz="3600" dirty="0"/>
-          </a:p>
-        </p:txBody>
-      </p:sp>
-      <p:sp>
-        <p:nvSpPr>
-          <p:cNvPr id="5" name="TextBox 4">
-            <a:extLst>
-              <a:ext uri="{FF2B5EF4-FFF2-40B4-BE49-F238E27FC236}">
-                <a16:creationId xmlns:a16="http://schemas.microsoft.com/office/drawing/2014/main" id="{4867A4D4-F475-419D-A945-D19F08351F33}"/>
-              </a:ext>
-            </a:extLst>
-          </p:cNvPr>
-          <p:cNvSpPr txBox="1"/>
-          <p:nvPr/>
-        </p:nvSpPr>
-        <p:spPr>
-          <a:xfrm>
-            <a:off x="3121267" y="2819398"/>
-            <a:ext cx="8229602" cy="769441"/>
-          </a:xfrm>
-          <a:prstGeom prst="rect">
-            <a:avLst/>
-          </a:prstGeom>
-          <a:noFill/>
-          <a:ln>
-            <a:solidFill>
-              <a:schemeClr val="tx1"/>
-            </a:solidFill>
-          </a:ln>
-        </p:spPr>
-        <p:txBody>
-          <a:bodyPr wrap="square" rtlCol="0">
-            <a:spAutoFit/>
-          </a:bodyPr>
-          <a:lstStyle/>
-          <a:p>
-            <a:r>
-              <a:rPr lang="en-CA" sz="4400" dirty="0"/>
-              <a:t>2 - </a:t>
-            </a:r>
-            <a:r>
-              <a:rPr lang="en-CA" sz="3600" dirty="0" err="1"/>
-              <a:t>Atteindre</a:t>
-            </a:r>
-            <a:r>
-              <a:rPr lang="en-CA" sz="3600" dirty="0"/>
-              <a:t> les </a:t>
-            </a:r>
-            <a:r>
-              <a:rPr lang="en-CA" sz="3600" dirty="0" err="1"/>
-              <a:t>objectifs</a:t>
-            </a:r>
-            <a:r>
-              <a:rPr lang="en-CA" sz="3600" dirty="0"/>
-              <a:t> de ventes</a:t>
-            </a:r>
-            <a:endParaRPr lang="en-CA" sz="4400" dirty="0"/>
-          </a:p>
-        </p:txBody>
-      </p:sp>
-      <p:sp>
-        <p:nvSpPr>
-          <p:cNvPr id="6" name="TextBox 5">
-            <a:extLst>
-              <a:ext uri="{FF2B5EF4-FFF2-40B4-BE49-F238E27FC236}">
-                <a16:creationId xmlns:a16="http://schemas.microsoft.com/office/drawing/2014/main" id="{6FDE0949-A647-41E2-9FDB-C906D0A1C64E}"/>
-              </a:ext>
-            </a:extLst>
-          </p:cNvPr>
-          <p:cNvSpPr txBox="1"/>
-          <p:nvPr/>
-        </p:nvSpPr>
-        <p:spPr>
-          <a:xfrm>
-            <a:off x="3121267" y="4536827"/>
-            <a:ext cx="7587764" cy="769441"/>
-          </a:xfrm>
-          <a:prstGeom prst="rect">
-            <a:avLst/>
-          </a:prstGeom>
-          <a:noFill/>
-          <a:ln>
-            <a:solidFill>
-              <a:schemeClr val="tx1"/>
-            </a:solidFill>
-          </a:ln>
-        </p:spPr>
-        <p:txBody>
-          <a:bodyPr wrap="square" rtlCol="0">
-            <a:spAutoFit/>
-          </a:bodyPr>
-          <a:lstStyle/>
-          <a:p>
-            <a:r>
-              <a:rPr lang="en-CA" sz="4400" dirty="0"/>
-              <a:t>3 - </a:t>
-            </a:r>
-            <a:r>
-              <a:rPr lang="en-CA" sz="3600" dirty="0" err="1"/>
-              <a:t>Faciliter</a:t>
-            </a:r>
-            <a:r>
-              <a:rPr lang="en-CA" sz="3600" dirty="0"/>
-              <a:t> la vie aux </a:t>
-            </a:r>
-            <a:r>
-              <a:rPr lang="en-CA" sz="3600" dirty="0" err="1"/>
-              <a:t>apiculteurs</a:t>
-            </a:r>
-            <a:endParaRPr lang="en-CA" sz="4400" dirty="0"/>
-          </a:p>
-        </p:txBody>
-      </p:sp>
-    </p:spTree>
-    <p:extLst>
-      <p:ext uri="{BB962C8B-B14F-4D97-AF65-F5344CB8AC3E}">
-        <p14:creationId xmlns:p14="http://schemas.microsoft.com/office/powerpoint/2010/main" val="4108082058"/>
-      </p:ext>
-    </p:extLst>
-  </p:cSld>
-  <p:clrMapOvr>
-    <a:masterClrMapping/>
-  </p:clrMapOvr>
-</p:sld>
-</file>
-
-<file path=ppt/slides/slide8.xml><?xml version="1.0" encoding="utf-8"?>
 <p:sld xmlns:a="http://schemas.openxmlformats.org/drawingml/2006/main" xmlns:r="http://schemas.openxmlformats.org/officeDocument/2006/relationships" xmlns:p="http://schemas.openxmlformats.org/presentationml/2006/main">
   <p:cSld>
     <p:spTree>
@@ -19076,6 +18896,464 @@
 </p:sld>
 </file>
 
+<file path=ppt/slides/slide8.xml><?xml version="1.0" encoding="utf-8"?>
+<p:sld xmlns:a="http://schemas.openxmlformats.org/drawingml/2006/main" xmlns:r="http://schemas.openxmlformats.org/officeDocument/2006/relationships" xmlns:p="http://schemas.openxmlformats.org/presentationml/2006/main">
+  <p:cSld>
+    <p:spTree>
+      <p:nvGrpSpPr>
+        <p:cNvPr id="1" name=""/>
+        <p:cNvGrpSpPr/>
+        <p:nvPr/>
+      </p:nvGrpSpPr>
+      <p:grpSpPr>
+        <a:xfrm>
+          <a:off x="0" y="0"/>
+          <a:ext cx="0" cy="0"/>
+          <a:chOff x="0" y="0"/>
+          <a:chExt cx="0" cy="0"/>
+        </a:xfrm>
+      </p:grpSpPr>
+      <p:sp>
+        <p:nvSpPr>
+          <p:cNvPr id="2" name="Titre 1">
+            <a:extLst>
+              <a:ext uri="{FF2B5EF4-FFF2-40B4-BE49-F238E27FC236}">
+                <a16:creationId xmlns:a16="http://schemas.microsoft.com/office/drawing/2014/main" id="{26C89AA6-8385-4FC3-9F5E-6C76518D412A}"/>
+              </a:ext>
+            </a:extLst>
+          </p:cNvPr>
+          <p:cNvSpPr>
+            <a:spLocks noGrp="1"/>
+          </p:cNvSpPr>
+          <p:nvPr>
+            <p:ph type="title"/>
+          </p:nvPr>
+        </p:nvSpPr>
+        <p:spPr/>
+        <p:txBody>
+          <a:bodyPr/>
+          <a:lstStyle/>
+          <a:p>
+            <a:r>
+              <a:rPr lang="fr-CA" dirty="0"/>
+              <a:t>Identifications des défis</a:t>
+            </a:r>
+          </a:p>
+        </p:txBody>
+      </p:sp>
+      <p:sp>
+        <p:nvSpPr>
+          <p:cNvPr id="3" name="Espace réservé du contenu 2">
+            <a:extLst>
+              <a:ext uri="{FF2B5EF4-FFF2-40B4-BE49-F238E27FC236}">
+                <a16:creationId xmlns:a16="http://schemas.microsoft.com/office/drawing/2014/main" id="{41BF3F77-6E0C-4D90-A75D-BD2ED4C2109B}"/>
+              </a:ext>
+            </a:extLst>
+          </p:cNvPr>
+          <p:cNvSpPr>
+            <a:spLocks noGrp="1"/>
+          </p:cNvSpPr>
+          <p:nvPr>
+            <p:ph idx="1"/>
+          </p:nvPr>
+        </p:nvSpPr>
+        <p:spPr/>
+        <p:txBody>
+          <a:bodyPr/>
+          <a:lstStyle/>
+          <a:p>
+            <a:endParaRPr lang="fr-CA"/>
+          </a:p>
+        </p:txBody>
+      </p:sp>
+      <p:sp>
+        <p:nvSpPr>
+          <p:cNvPr id="4" name="TextBox 3">
+            <a:extLst>
+              <a:ext uri="{FF2B5EF4-FFF2-40B4-BE49-F238E27FC236}">
+                <a16:creationId xmlns:a16="http://schemas.microsoft.com/office/drawing/2014/main" id="{E783A7B6-9D4F-4A2C-8EE4-BBE08E927CD5}"/>
+              </a:ext>
+            </a:extLst>
+          </p:cNvPr>
+          <p:cNvSpPr txBox="1"/>
+          <p:nvPr/>
+        </p:nvSpPr>
+        <p:spPr>
+          <a:xfrm>
+            <a:off x="4808756" y="3741011"/>
+            <a:ext cx="1699846" cy="769441"/>
+          </a:xfrm>
+          <a:prstGeom prst="rect">
+            <a:avLst/>
+          </a:prstGeom>
+          <a:noFill/>
+          <a:ln>
+            <a:solidFill>
+              <a:schemeClr val="tx1"/>
+            </a:solidFill>
+          </a:ln>
+        </p:spPr>
+        <p:txBody>
+          <a:bodyPr wrap="square" rtlCol="0">
+            <a:spAutoFit/>
+          </a:bodyPr>
+          <a:lstStyle/>
+          <a:p>
+            <a:r>
+              <a:rPr lang="en-CA" sz="4400" dirty="0" err="1"/>
+              <a:t>Défis</a:t>
+            </a:r>
+            <a:endParaRPr lang="en-CA" sz="5400" dirty="0"/>
+          </a:p>
+        </p:txBody>
+      </p:sp>
+      <p:sp>
+        <p:nvSpPr>
+          <p:cNvPr id="5" name="TextBox 4">
+            <a:extLst>
+              <a:ext uri="{FF2B5EF4-FFF2-40B4-BE49-F238E27FC236}">
+                <a16:creationId xmlns:a16="http://schemas.microsoft.com/office/drawing/2014/main" id="{394FC993-D8E2-4812-BFF1-C72715232236}"/>
+              </a:ext>
+            </a:extLst>
+          </p:cNvPr>
+          <p:cNvSpPr txBox="1"/>
+          <p:nvPr/>
+        </p:nvSpPr>
+        <p:spPr>
+          <a:xfrm>
+            <a:off x="4005723" y="1789049"/>
+            <a:ext cx="3305909" cy="646331"/>
+          </a:xfrm>
+          <a:prstGeom prst="rect">
+            <a:avLst/>
+          </a:prstGeom>
+          <a:noFill/>
+          <a:ln>
+            <a:solidFill>
+              <a:schemeClr val="tx1"/>
+            </a:solidFill>
+          </a:ln>
+        </p:spPr>
+        <p:txBody>
+          <a:bodyPr wrap="square" rtlCol="0">
+            <a:spAutoFit/>
+          </a:bodyPr>
+          <a:lstStyle/>
+          <a:p>
+            <a:pPr algn="ctr"/>
+            <a:r>
+              <a:rPr lang="en-CA" sz="3600" dirty="0" err="1"/>
+              <a:t>Économique</a:t>
+            </a:r>
+            <a:endParaRPr lang="en-CA" sz="4400" dirty="0"/>
+          </a:p>
+        </p:txBody>
+      </p:sp>
+      <p:sp>
+        <p:nvSpPr>
+          <p:cNvPr id="6" name="TextBox 5">
+            <a:extLst>
+              <a:ext uri="{FF2B5EF4-FFF2-40B4-BE49-F238E27FC236}">
+                <a16:creationId xmlns:a16="http://schemas.microsoft.com/office/drawing/2014/main" id="{BC3CCD6C-274D-41A3-8A60-F0582F6BD44D}"/>
+              </a:ext>
+            </a:extLst>
+          </p:cNvPr>
+          <p:cNvSpPr txBox="1"/>
+          <p:nvPr/>
+        </p:nvSpPr>
+        <p:spPr>
+          <a:xfrm>
+            <a:off x="1385619" y="3817954"/>
+            <a:ext cx="1526931" cy="646331"/>
+          </a:xfrm>
+          <a:prstGeom prst="rect">
+            <a:avLst/>
+          </a:prstGeom>
+          <a:noFill/>
+          <a:ln>
+            <a:solidFill>
+              <a:schemeClr val="tx1"/>
+            </a:solidFill>
+          </a:ln>
+        </p:spPr>
+        <p:txBody>
+          <a:bodyPr wrap="square" rtlCol="0">
+            <a:spAutoFit/>
+          </a:bodyPr>
+          <a:lstStyle/>
+          <a:p>
+            <a:r>
+              <a:rPr lang="en-CA" sz="3600" dirty="0"/>
+              <a:t>Social</a:t>
+            </a:r>
+            <a:endParaRPr lang="en-CA" sz="4400" dirty="0"/>
+          </a:p>
+        </p:txBody>
+      </p:sp>
+      <p:sp>
+        <p:nvSpPr>
+          <p:cNvPr id="7" name="TextBox 6">
+            <a:extLst>
+              <a:ext uri="{FF2B5EF4-FFF2-40B4-BE49-F238E27FC236}">
+                <a16:creationId xmlns:a16="http://schemas.microsoft.com/office/drawing/2014/main" id="{239E01F5-C26F-479F-942C-4764CEC682BD}"/>
+              </a:ext>
+            </a:extLst>
+          </p:cNvPr>
+          <p:cNvSpPr txBox="1"/>
+          <p:nvPr/>
+        </p:nvSpPr>
+        <p:spPr>
+          <a:xfrm>
+            <a:off x="3618862" y="5846861"/>
+            <a:ext cx="4079633" cy="646331"/>
+          </a:xfrm>
+          <a:prstGeom prst="rect">
+            <a:avLst/>
+          </a:prstGeom>
+          <a:noFill/>
+          <a:ln>
+            <a:solidFill>
+              <a:schemeClr val="tx1"/>
+            </a:solidFill>
+          </a:ln>
+        </p:spPr>
+        <p:txBody>
+          <a:bodyPr wrap="square" rtlCol="0">
+            <a:spAutoFit/>
+          </a:bodyPr>
+          <a:lstStyle/>
+          <a:p>
+            <a:r>
+              <a:rPr lang="en-CA" sz="3600" dirty="0" err="1"/>
+              <a:t>Environnemental</a:t>
+            </a:r>
+            <a:endParaRPr lang="en-CA" sz="4400" dirty="0"/>
+          </a:p>
+        </p:txBody>
+      </p:sp>
+      <p:sp>
+        <p:nvSpPr>
+          <p:cNvPr id="8" name="TextBox 7">
+            <a:extLst>
+              <a:ext uri="{FF2B5EF4-FFF2-40B4-BE49-F238E27FC236}">
+                <a16:creationId xmlns:a16="http://schemas.microsoft.com/office/drawing/2014/main" id="{EF567853-CA24-4B68-86F4-DAB15A5244F3}"/>
+              </a:ext>
+            </a:extLst>
+          </p:cNvPr>
+          <p:cNvSpPr txBox="1"/>
+          <p:nvPr/>
+        </p:nvSpPr>
+        <p:spPr>
+          <a:xfrm>
+            <a:off x="8536692" y="3817955"/>
+            <a:ext cx="1395047" cy="646331"/>
+          </a:xfrm>
+          <a:prstGeom prst="rect">
+            <a:avLst/>
+          </a:prstGeom>
+          <a:noFill/>
+          <a:ln>
+            <a:solidFill>
+              <a:schemeClr val="tx1"/>
+            </a:solidFill>
+          </a:ln>
+        </p:spPr>
+        <p:txBody>
+          <a:bodyPr wrap="square" rtlCol="0">
+            <a:spAutoFit/>
+          </a:bodyPr>
+          <a:lstStyle/>
+          <a:p>
+            <a:r>
+              <a:rPr lang="en-CA" sz="3600" dirty="0" err="1"/>
+              <a:t>Légal</a:t>
+            </a:r>
+            <a:endParaRPr lang="en-CA" sz="4400" dirty="0"/>
+          </a:p>
+        </p:txBody>
+      </p:sp>
+      <p:cxnSp>
+        <p:nvCxnSpPr>
+          <p:cNvPr id="9" name="Straight Arrow Connector 9">
+            <a:extLst>
+              <a:ext uri="{FF2B5EF4-FFF2-40B4-BE49-F238E27FC236}">
+                <a16:creationId xmlns:a16="http://schemas.microsoft.com/office/drawing/2014/main" id="{2EE584A1-0E66-40EA-8C94-9B245FB38157}"/>
+              </a:ext>
+            </a:extLst>
+          </p:cNvPr>
+          <p:cNvCxnSpPr>
+            <a:cxnSpLocks/>
+            <a:stCxn id="5" idx="2"/>
+            <a:endCxn id="4" idx="0"/>
+          </p:cNvCxnSpPr>
+          <p:nvPr/>
+        </p:nvCxnSpPr>
+        <p:spPr>
+          <a:xfrm>
+            <a:off x="5658678" y="2435380"/>
+            <a:ext cx="1" cy="1305631"/>
+          </a:xfrm>
+          <a:prstGeom prst="straightConnector1">
+            <a:avLst/>
+          </a:prstGeom>
+          <a:ln>
+            <a:tailEnd type="triangle"/>
+          </a:ln>
+        </p:spPr>
+        <p:style>
+          <a:lnRef idx="1">
+            <a:schemeClr val="accent1"/>
+          </a:lnRef>
+          <a:fillRef idx="0">
+            <a:schemeClr val="accent1"/>
+          </a:fillRef>
+          <a:effectRef idx="0">
+            <a:schemeClr val="accent1"/>
+          </a:effectRef>
+          <a:fontRef idx="minor">
+            <a:schemeClr val="tx1"/>
+          </a:fontRef>
+        </p:style>
+      </p:cxnSp>
+      <p:cxnSp>
+        <p:nvCxnSpPr>
+          <p:cNvPr id="10" name="Straight Arrow Connector 15">
+            <a:extLst>
+              <a:ext uri="{FF2B5EF4-FFF2-40B4-BE49-F238E27FC236}">
+                <a16:creationId xmlns:a16="http://schemas.microsoft.com/office/drawing/2014/main" id="{5E75472F-169E-492A-9D99-EBA14051B34F}"/>
+              </a:ext>
+            </a:extLst>
+          </p:cNvPr>
+          <p:cNvCxnSpPr>
+            <a:stCxn id="6" idx="3"/>
+            <a:endCxn id="4" idx="1"/>
+          </p:cNvCxnSpPr>
+          <p:nvPr/>
+        </p:nvCxnSpPr>
+        <p:spPr>
+          <a:xfrm flipV="1">
+            <a:off x="2912550" y="4125732"/>
+            <a:ext cx="1896206" cy="15388"/>
+          </a:xfrm>
+          <a:prstGeom prst="straightConnector1">
+            <a:avLst/>
+          </a:prstGeom>
+          <a:ln>
+            <a:tailEnd type="triangle"/>
+          </a:ln>
+        </p:spPr>
+        <p:style>
+          <a:lnRef idx="1">
+            <a:schemeClr val="accent1"/>
+          </a:lnRef>
+          <a:fillRef idx="0">
+            <a:schemeClr val="accent1"/>
+          </a:fillRef>
+          <a:effectRef idx="0">
+            <a:schemeClr val="accent1"/>
+          </a:effectRef>
+          <a:fontRef idx="minor">
+            <a:schemeClr val="tx1"/>
+          </a:fontRef>
+        </p:style>
+      </p:cxnSp>
+      <p:cxnSp>
+        <p:nvCxnSpPr>
+          <p:cNvPr id="11" name="Straight Arrow Connector 17">
+            <a:extLst>
+              <a:ext uri="{FF2B5EF4-FFF2-40B4-BE49-F238E27FC236}">
+                <a16:creationId xmlns:a16="http://schemas.microsoft.com/office/drawing/2014/main" id="{7CBC224F-3C4D-46F3-8F85-C07D26B21F24}"/>
+              </a:ext>
+            </a:extLst>
+          </p:cNvPr>
+          <p:cNvCxnSpPr>
+            <a:stCxn id="8" idx="1"/>
+            <a:endCxn id="4" idx="3"/>
+          </p:cNvCxnSpPr>
+          <p:nvPr/>
+        </p:nvCxnSpPr>
+        <p:spPr>
+          <a:xfrm flipH="1" flipV="1">
+            <a:off x="6508602" y="4125732"/>
+            <a:ext cx="2028090" cy="15389"/>
+          </a:xfrm>
+          <a:prstGeom prst="straightConnector1">
+            <a:avLst/>
+          </a:prstGeom>
+          <a:ln>
+            <a:tailEnd type="triangle"/>
+          </a:ln>
+        </p:spPr>
+        <p:style>
+          <a:lnRef idx="1">
+            <a:schemeClr val="accent1"/>
+          </a:lnRef>
+          <a:fillRef idx="0">
+            <a:schemeClr val="accent1"/>
+          </a:fillRef>
+          <a:effectRef idx="0">
+            <a:schemeClr val="accent1"/>
+          </a:effectRef>
+          <a:fontRef idx="minor">
+            <a:schemeClr val="tx1"/>
+          </a:fontRef>
+        </p:style>
+      </p:cxnSp>
+      <p:cxnSp>
+        <p:nvCxnSpPr>
+          <p:cNvPr id="12" name="Straight Arrow Connector 19">
+            <a:extLst>
+              <a:ext uri="{FF2B5EF4-FFF2-40B4-BE49-F238E27FC236}">
+                <a16:creationId xmlns:a16="http://schemas.microsoft.com/office/drawing/2014/main" id="{D73CA8D3-E185-4434-B822-BB2612036AFC}"/>
+              </a:ext>
+            </a:extLst>
+          </p:cNvPr>
+          <p:cNvCxnSpPr>
+            <a:stCxn id="7" idx="0"/>
+            <a:endCxn id="4" idx="2"/>
+          </p:cNvCxnSpPr>
+          <p:nvPr/>
+        </p:nvCxnSpPr>
+        <p:spPr>
+          <a:xfrm flipV="1">
+            <a:off x="5658679" y="4510452"/>
+            <a:ext cx="0" cy="1336409"/>
+          </a:xfrm>
+          <a:prstGeom prst="straightConnector1">
+            <a:avLst/>
+          </a:prstGeom>
+          <a:ln>
+            <a:tailEnd type="triangle"/>
+          </a:ln>
+        </p:spPr>
+        <p:style>
+          <a:lnRef idx="1">
+            <a:schemeClr val="accent1"/>
+          </a:lnRef>
+          <a:fillRef idx="0">
+            <a:schemeClr val="accent1"/>
+          </a:fillRef>
+          <a:effectRef idx="0">
+            <a:schemeClr val="accent1"/>
+          </a:effectRef>
+          <a:fontRef idx="minor">
+            <a:schemeClr val="tx1"/>
+          </a:fontRef>
+        </p:style>
+      </p:cxnSp>
+    </p:spTree>
+    <p:extLst>
+      <p:ext uri="{BB962C8B-B14F-4D97-AF65-F5344CB8AC3E}">
+        <p14:creationId xmlns:p14="http://schemas.microsoft.com/office/powerpoint/2010/main" val="3212985870"/>
+      </p:ext>
+    </p:extLst>
+  </p:cSld>
+  <p:clrMapOvr>
+    <a:masterClrMapping/>
+  </p:clrMapOvr>
+</p:sld>
+</file>
+
 <file path=ppt/slides/slide9.xml><?xml version="1.0" encoding="utf-8"?>
 <p:sld xmlns:a="http://schemas.openxmlformats.org/drawingml/2006/main" xmlns:r="http://schemas.openxmlformats.org/officeDocument/2006/relationships" xmlns:p="http://schemas.openxmlformats.org/presentationml/2006/main">
   <p:cSld>
@@ -19095,10 +19373,10 @@
       </p:grpSpPr>
       <p:sp>
         <p:nvSpPr>
-          <p:cNvPr id="2" name="Title 1">
+          <p:cNvPr id="2" name="Titre 1">
             <a:extLst>
               <a:ext uri="{FF2B5EF4-FFF2-40B4-BE49-F238E27FC236}">
-                <a16:creationId xmlns:a16="http://schemas.microsoft.com/office/drawing/2014/main" id="{91E8F6C8-4F64-439A-A928-7D43565B1CD7}"/>
+                <a16:creationId xmlns:a16="http://schemas.microsoft.com/office/drawing/2014/main" id="{1B60BAE5-7F58-4C30-B756-DE40D9B51331}"/>
               </a:ext>
             </a:extLst>
           </p:cNvPr>
@@ -19116,17 +19394,17 @@
           <a:p>
             <a:r>
               <a:rPr lang="fr-CA" dirty="0"/>
-              <a:t>Priorisation des défis</a:t>
+              <a:t>Identifications des défis</a:t>
             </a:r>
           </a:p>
         </p:txBody>
       </p:sp>
       <p:sp>
         <p:nvSpPr>
-          <p:cNvPr id="3" name="Content Placeholder 2">
+          <p:cNvPr id="3" name="Espace réservé du contenu 2">
             <a:extLst>
               <a:ext uri="{FF2B5EF4-FFF2-40B4-BE49-F238E27FC236}">
-                <a16:creationId xmlns:a16="http://schemas.microsoft.com/office/drawing/2014/main" id="{A902CCF2-D8E0-4BD9-B641-DB4198DCC163}"/>
+                <a16:creationId xmlns:a16="http://schemas.microsoft.com/office/drawing/2014/main" id="{98FC72F3-2F06-4142-B567-17EC2FA2537F}"/>
               </a:ext>
             </a:extLst>
           </p:cNvPr>
@@ -19142,29 +19420,169 @@
           <a:bodyPr/>
           <a:lstStyle/>
           <a:p>
-            <a:r>
-              <a:rPr lang="fr-CA" dirty="0"/>
-              <a:t>Analyse et veille</a:t>
-            </a:r>
-          </a:p>
-          <a:p>
-            <a:r>
-              <a:rPr lang="fr-CA" dirty="0"/>
-              <a:t>Vecteur d’entrée</a:t>
-            </a:r>
-          </a:p>
-          <a:p>
-            <a:r>
-              <a:rPr lang="fr-CA" dirty="0"/>
-              <a:t>Valeurs et motivations des membres de l’équipe</a:t>
-            </a:r>
+            <a:endParaRPr lang="fr-CA"/>
+          </a:p>
+        </p:txBody>
+      </p:sp>
+      <p:sp>
+        <p:nvSpPr>
+          <p:cNvPr id="4" name="TextBox 3">
+            <a:extLst>
+              <a:ext uri="{FF2B5EF4-FFF2-40B4-BE49-F238E27FC236}">
+                <a16:creationId xmlns:a16="http://schemas.microsoft.com/office/drawing/2014/main" id="{67DCEB56-692C-4263-93E1-B9110D2562C9}"/>
+              </a:ext>
+            </a:extLst>
+          </p:cNvPr>
+          <p:cNvSpPr txBox="1"/>
+          <p:nvPr/>
+        </p:nvSpPr>
+        <p:spPr>
+          <a:xfrm>
+            <a:off x="2238673" y="2133600"/>
+            <a:ext cx="6734910" cy="646331"/>
+          </a:xfrm>
+          <a:prstGeom prst="rect">
+            <a:avLst/>
+          </a:prstGeom>
+          <a:noFill/>
+          <a:ln>
+            <a:solidFill>
+              <a:schemeClr val="tx1"/>
+            </a:solidFill>
+          </a:ln>
+        </p:spPr>
+        <p:txBody>
+          <a:bodyPr wrap="square" rtlCol="0">
+            <a:spAutoFit/>
+          </a:bodyPr>
+          <a:lstStyle/>
+          <a:p>
+            <a:r>
+              <a:rPr lang="en-CA" sz="3600" dirty="0"/>
+              <a:t>1 - Conservation des </a:t>
+            </a:r>
+            <a:r>
+              <a:rPr lang="en-CA" sz="3600" dirty="0" err="1"/>
+              <a:t>abeilles</a:t>
+            </a:r>
+            <a:endParaRPr lang="en-CA" sz="3600" dirty="0"/>
+          </a:p>
+        </p:txBody>
+      </p:sp>
+      <p:sp>
+        <p:nvSpPr>
+          <p:cNvPr id="5" name="TextBox 4">
+            <a:extLst>
+              <a:ext uri="{FF2B5EF4-FFF2-40B4-BE49-F238E27FC236}">
+                <a16:creationId xmlns:a16="http://schemas.microsoft.com/office/drawing/2014/main" id="{5169D858-A87B-46DE-AA4C-093FE6D6F2B2}"/>
+              </a:ext>
+            </a:extLst>
+          </p:cNvPr>
+          <p:cNvSpPr txBox="1"/>
+          <p:nvPr/>
+        </p:nvSpPr>
+        <p:spPr>
+          <a:xfrm>
+            <a:off x="2238673" y="3859823"/>
+            <a:ext cx="8229602" cy="769441"/>
+          </a:xfrm>
+          <a:prstGeom prst="rect">
+            <a:avLst/>
+          </a:prstGeom>
+          <a:noFill/>
+          <a:ln>
+            <a:solidFill>
+              <a:schemeClr val="tx1"/>
+            </a:solidFill>
+          </a:ln>
+        </p:spPr>
+        <p:txBody>
+          <a:bodyPr wrap="square" rtlCol="0">
+            <a:spAutoFit/>
+          </a:bodyPr>
+          <a:lstStyle/>
+          <a:p>
+            <a:r>
+              <a:rPr lang="en-CA" sz="4400" dirty="0"/>
+              <a:t>2 - </a:t>
+            </a:r>
+            <a:r>
+              <a:rPr lang="en-CA" sz="3600" dirty="0" err="1"/>
+              <a:t>Atteindre</a:t>
+            </a:r>
+            <a:r>
+              <a:rPr lang="en-CA" sz="3600" dirty="0"/>
+              <a:t> les </a:t>
+            </a:r>
+            <a:r>
+              <a:rPr lang="en-CA" sz="3600" dirty="0" err="1"/>
+              <a:t>objectifs</a:t>
+            </a:r>
+            <a:r>
+              <a:rPr lang="en-CA" sz="3600" dirty="0"/>
+              <a:t> de ventes</a:t>
+            </a:r>
+            <a:endParaRPr lang="en-CA" sz="4400" dirty="0"/>
+          </a:p>
+        </p:txBody>
+      </p:sp>
+      <p:sp>
+        <p:nvSpPr>
+          <p:cNvPr id="6" name="TextBox 5">
+            <a:extLst>
+              <a:ext uri="{FF2B5EF4-FFF2-40B4-BE49-F238E27FC236}">
+                <a16:creationId xmlns:a16="http://schemas.microsoft.com/office/drawing/2014/main" id="{20923840-7303-4BB0-8798-196B89213585}"/>
+              </a:ext>
+            </a:extLst>
+          </p:cNvPr>
+          <p:cNvSpPr txBox="1"/>
+          <p:nvPr/>
+        </p:nvSpPr>
+        <p:spPr>
+          <a:xfrm>
+            <a:off x="2238673" y="5577252"/>
+            <a:ext cx="7587764" cy="769441"/>
+          </a:xfrm>
+          <a:prstGeom prst="rect">
+            <a:avLst/>
+          </a:prstGeom>
+          <a:noFill/>
+          <a:ln>
+            <a:solidFill>
+              <a:schemeClr val="tx1"/>
+            </a:solidFill>
+          </a:ln>
+        </p:spPr>
+        <p:txBody>
+          <a:bodyPr wrap="square" rtlCol="0">
+            <a:spAutoFit/>
+          </a:bodyPr>
+          <a:lstStyle/>
+          <a:p>
+            <a:r>
+              <a:rPr lang="en-CA" sz="4400" dirty="0"/>
+              <a:t>3 - </a:t>
+            </a:r>
+            <a:r>
+              <a:rPr lang="en-CA" sz="3600" dirty="0" err="1"/>
+              <a:t>Faciliter</a:t>
+            </a:r>
+            <a:r>
+              <a:rPr lang="en-CA" sz="3600" dirty="0"/>
+              <a:t> la vie aux </a:t>
+            </a:r>
+            <a:r>
+              <a:rPr lang="en-CA" sz="3600" dirty="0" err="1"/>
+              <a:t>apiculteurs</a:t>
+            </a:r>
+            <a:endParaRPr lang="en-CA" sz="4400" dirty="0"/>
           </a:p>
         </p:txBody>
       </p:sp>
     </p:spTree>
     <p:extLst>
       <p:ext uri="{BB962C8B-B14F-4D97-AF65-F5344CB8AC3E}">
-        <p14:creationId xmlns:p14="http://schemas.microsoft.com/office/powerpoint/2010/main" val="2420593111"/>
+        <p14:creationId xmlns:p14="http://schemas.microsoft.com/office/powerpoint/2010/main" val="1035474033"/>
       </p:ext>
     </p:extLst>
   </p:cSld>

</xml_diff>